<commit_message>
updated notes and deck
</commit_message>
<xml_diff>
--- a/extending-vs-code.pptx
+++ b/extending-vs-code.pptx
@@ -2,10 +2,10 @@
 <file path=ppt/presentation.xml><?xml version="1.0" encoding="utf-8"?>
 <p:presentation xmlns:a="http://schemas.openxmlformats.org/drawingml/2006/main" xmlns:r="http://schemas.openxmlformats.org/officeDocument/2006/relationships" xmlns:p="http://schemas.openxmlformats.org/presentationml/2006/main" saveSubsetFonts="1" autoCompressPictures="0">
   <p:sldMasterIdLst>
-    <p:sldMasterId id="2147483648" r:id="rId1"/>
+    <p:sldMasterId id="2147483684" r:id="rId1"/>
   </p:sldMasterIdLst>
   <p:notesMasterIdLst>
-    <p:notesMasterId r:id="rId15"/>
+    <p:notesMasterId r:id="rId23"/>
   </p:notesMasterIdLst>
   <p:sldIdLst>
     <p:sldId id="258" r:id="rId2"/>
@@ -21,6 +21,14 @@
     <p:sldId id="277" r:id="rId12"/>
     <p:sldId id="279" r:id="rId13"/>
     <p:sldId id="280" r:id="rId14"/>
+    <p:sldId id="282" r:id="rId15"/>
+    <p:sldId id="284" r:id="rId16"/>
+    <p:sldId id="285" r:id="rId17"/>
+    <p:sldId id="286" r:id="rId18"/>
+    <p:sldId id="290" r:id="rId19"/>
+    <p:sldId id="292" r:id="rId20"/>
+    <p:sldId id="293" r:id="rId21"/>
+    <p:sldId id="294" r:id="rId22"/>
   </p:sldIdLst>
   <p:sldSz cx="12192000" cy="6858000"/>
   <p:notesSz cx="6858000" cy="9144000"/>
@@ -209,7 +217,7 @@
           <a:p>
             <a:fld id="{99C4D036-BDB5-5848-925A-7211684DC976}" type="datetimeFigureOut">
               <a:rPr lang="en-US" smtClean="0"/>
-              <a:t>4/23/17</a:t>
+              <a:t>5/10/17</a:t>
             </a:fld>
             <a:endParaRPr lang="en-US"/>
           </a:p>
@@ -608,7 +616,7 @@
           <a:p>
             <a:fld id="{6BBEF6B5-29B0-3843-BC6B-0F62F44C2C43}" type="datetimeFigureOut">
               <a:rPr lang="en-US" smtClean="0"/>
-              <a:t>4/23/17</a:t>
+              <a:t>5/10/17</a:t>
             </a:fld>
             <a:endParaRPr lang="en-US"/>
           </a:p>
@@ -657,11 +665,6 @@
         </p:txBody>
       </p:sp>
     </p:spTree>
-    <p:extLst>
-      <p:ext uri="{BB962C8B-B14F-4D97-AF65-F5344CB8AC3E}">
-        <p14:creationId xmlns:p14="http://schemas.microsoft.com/office/powerpoint/2010/main" val="181277813"/>
-      </p:ext>
-    </p:extLst>
   </p:cSld>
   <p:clrMapOvr>
     <a:masterClrMapping/>
@@ -778,7 +781,7 @@
           <a:p>
             <a:fld id="{6BBEF6B5-29B0-3843-BC6B-0F62F44C2C43}" type="datetimeFigureOut">
               <a:rPr lang="en-US" smtClean="0"/>
-              <a:t>4/23/17</a:t>
+              <a:t>5/10/17</a:t>
             </a:fld>
             <a:endParaRPr lang="en-US"/>
           </a:p>
@@ -827,11 +830,6 @@
         </p:txBody>
       </p:sp>
     </p:spTree>
-    <p:extLst>
-      <p:ext uri="{BB962C8B-B14F-4D97-AF65-F5344CB8AC3E}">
-        <p14:creationId xmlns:p14="http://schemas.microsoft.com/office/powerpoint/2010/main" val="1779880597"/>
-      </p:ext>
-    </p:extLst>
   </p:cSld>
   <p:clrMapOvr>
     <a:masterClrMapping/>
@@ -958,7 +956,7 @@
           <a:p>
             <a:fld id="{6BBEF6B5-29B0-3843-BC6B-0F62F44C2C43}" type="datetimeFigureOut">
               <a:rPr lang="en-US" smtClean="0"/>
-              <a:t>4/23/17</a:t>
+              <a:t>5/10/17</a:t>
             </a:fld>
             <a:endParaRPr lang="en-US"/>
           </a:p>
@@ -1007,11 +1005,6 @@
         </p:txBody>
       </p:sp>
     </p:spTree>
-    <p:extLst>
-      <p:ext uri="{BB962C8B-B14F-4D97-AF65-F5344CB8AC3E}">
-        <p14:creationId xmlns:p14="http://schemas.microsoft.com/office/powerpoint/2010/main" val="5991069"/>
-      </p:ext>
-    </p:extLst>
   </p:cSld>
   <p:clrMapOvr>
     <a:masterClrMapping/>
@@ -1128,7 +1121,7 @@
           <a:p>
             <a:fld id="{6BBEF6B5-29B0-3843-BC6B-0F62F44C2C43}" type="datetimeFigureOut">
               <a:rPr lang="en-US" smtClean="0"/>
-              <a:t>4/23/17</a:t>
+              <a:t>5/10/17</a:t>
             </a:fld>
             <a:endParaRPr lang="en-US"/>
           </a:p>
@@ -1177,11 +1170,6 @@
         </p:txBody>
       </p:sp>
     </p:spTree>
-    <p:extLst>
-      <p:ext uri="{BB962C8B-B14F-4D97-AF65-F5344CB8AC3E}">
-        <p14:creationId xmlns:p14="http://schemas.microsoft.com/office/powerpoint/2010/main" val="1604391645"/>
-      </p:ext>
-    </p:extLst>
   </p:cSld>
   <p:clrMapOvr>
     <a:masterClrMapping/>
@@ -1374,7 +1362,7 @@
           <a:p>
             <a:fld id="{6BBEF6B5-29B0-3843-BC6B-0F62F44C2C43}" type="datetimeFigureOut">
               <a:rPr lang="en-US" smtClean="0"/>
-              <a:t>4/23/17</a:t>
+              <a:t>5/10/17</a:t>
             </a:fld>
             <a:endParaRPr lang="en-US"/>
           </a:p>
@@ -1423,11 +1411,6 @@
         </p:txBody>
       </p:sp>
     </p:spTree>
-    <p:extLst>
-      <p:ext uri="{BB962C8B-B14F-4D97-AF65-F5344CB8AC3E}">
-        <p14:creationId xmlns:p14="http://schemas.microsoft.com/office/powerpoint/2010/main" val="1205705783"/>
-      </p:ext>
-    </p:extLst>
   </p:cSld>
   <p:clrMapOvr>
     <a:masterClrMapping/>
@@ -1606,7 +1589,7 @@
           <a:p>
             <a:fld id="{6BBEF6B5-29B0-3843-BC6B-0F62F44C2C43}" type="datetimeFigureOut">
               <a:rPr lang="en-US" smtClean="0"/>
-              <a:t>4/23/17</a:t>
+              <a:t>5/10/17</a:t>
             </a:fld>
             <a:endParaRPr lang="en-US"/>
           </a:p>
@@ -1655,11 +1638,6 @@
         </p:txBody>
       </p:sp>
     </p:spTree>
-    <p:extLst>
-      <p:ext uri="{BB962C8B-B14F-4D97-AF65-F5344CB8AC3E}">
-        <p14:creationId xmlns:p14="http://schemas.microsoft.com/office/powerpoint/2010/main" val="641401789"/>
-      </p:ext>
-    </p:extLst>
   </p:cSld>
   <p:clrMapOvr>
     <a:masterClrMapping/>
@@ -1973,7 +1951,7 @@
           <a:p>
             <a:fld id="{6BBEF6B5-29B0-3843-BC6B-0F62F44C2C43}" type="datetimeFigureOut">
               <a:rPr lang="en-US" smtClean="0"/>
-              <a:t>4/23/17</a:t>
+              <a:t>5/10/17</a:t>
             </a:fld>
             <a:endParaRPr lang="en-US"/>
           </a:p>
@@ -2022,11 +2000,6 @@
         </p:txBody>
       </p:sp>
     </p:spTree>
-    <p:extLst>
-      <p:ext uri="{BB962C8B-B14F-4D97-AF65-F5344CB8AC3E}">
-        <p14:creationId xmlns:p14="http://schemas.microsoft.com/office/powerpoint/2010/main" val="1819443430"/>
-      </p:ext>
-    </p:extLst>
   </p:cSld>
   <p:clrMapOvr>
     <a:masterClrMapping/>
@@ -2091,7 +2064,7 @@
           <a:p>
             <a:fld id="{6BBEF6B5-29B0-3843-BC6B-0F62F44C2C43}" type="datetimeFigureOut">
               <a:rPr lang="en-US" smtClean="0"/>
-              <a:t>4/23/17</a:t>
+              <a:t>5/10/17</a:t>
             </a:fld>
             <a:endParaRPr lang="en-US"/>
           </a:p>
@@ -2140,11 +2113,6 @@
         </p:txBody>
       </p:sp>
     </p:spTree>
-    <p:extLst>
-      <p:ext uri="{BB962C8B-B14F-4D97-AF65-F5344CB8AC3E}">
-        <p14:creationId xmlns:p14="http://schemas.microsoft.com/office/powerpoint/2010/main" val="1366078377"/>
-      </p:ext>
-    </p:extLst>
   </p:cSld>
   <p:clrMapOvr>
     <a:masterClrMapping/>
@@ -2186,7 +2154,7 @@
           <a:p>
             <a:fld id="{6BBEF6B5-29B0-3843-BC6B-0F62F44C2C43}" type="datetimeFigureOut">
               <a:rPr lang="en-US" smtClean="0"/>
-              <a:t>4/23/17</a:t>
+              <a:t>5/10/17</a:t>
             </a:fld>
             <a:endParaRPr lang="en-US"/>
           </a:p>
@@ -2235,11 +2203,6 @@
         </p:txBody>
       </p:sp>
     </p:spTree>
-    <p:extLst>
-      <p:ext uri="{BB962C8B-B14F-4D97-AF65-F5344CB8AC3E}">
-        <p14:creationId xmlns:p14="http://schemas.microsoft.com/office/powerpoint/2010/main" val="931612162"/>
-      </p:ext>
-    </p:extLst>
   </p:cSld>
   <p:clrMapOvr>
     <a:masterClrMapping/>
@@ -2463,7 +2426,7 @@
           <a:p>
             <a:fld id="{6BBEF6B5-29B0-3843-BC6B-0F62F44C2C43}" type="datetimeFigureOut">
               <a:rPr lang="en-US" smtClean="0"/>
-              <a:t>4/23/17</a:t>
+              <a:t>5/10/17</a:t>
             </a:fld>
             <a:endParaRPr lang="en-US"/>
           </a:p>
@@ -2512,11 +2475,6 @@
         </p:txBody>
       </p:sp>
     </p:spTree>
-    <p:extLst>
-      <p:ext uri="{BB962C8B-B14F-4D97-AF65-F5344CB8AC3E}">
-        <p14:creationId xmlns:p14="http://schemas.microsoft.com/office/powerpoint/2010/main" val="302336457"/>
-      </p:ext>
-    </p:extLst>
   </p:cSld>
   <p:clrMapOvr>
     <a:masterClrMapping/>
@@ -2716,7 +2674,7 @@
           <a:p>
             <a:fld id="{6BBEF6B5-29B0-3843-BC6B-0F62F44C2C43}" type="datetimeFigureOut">
               <a:rPr lang="en-US" smtClean="0"/>
-              <a:t>4/23/17</a:t>
+              <a:t>5/10/17</a:t>
             </a:fld>
             <a:endParaRPr lang="en-US"/>
           </a:p>
@@ -2765,11 +2723,6 @@
         </p:txBody>
       </p:sp>
     </p:spTree>
-    <p:extLst>
-      <p:ext uri="{BB962C8B-B14F-4D97-AF65-F5344CB8AC3E}">
-        <p14:creationId xmlns:p14="http://schemas.microsoft.com/office/powerpoint/2010/main" val="422523997"/>
-      </p:ext>
-    </p:extLst>
   </p:cSld>
   <p:clrMapOvr>
     <a:masterClrMapping/>
@@ -2929,7 +2882,7 @@
           <a:p>
             <a:fld id="{6BBEF6B5-29B0-3843-BC6B-0F62F44C2C43}" type="datetimeFigureOut">
               <a:rPr lang="en-US" smtClean="0"/>
-              <a:t>4/23/17</a:t>
+              <a:t>5/10/17</a:t>
             </a:fld>
             <a:endParaRPr lang="en-US"/>
           </a:p>
@@ -3016,23 +2969,23 @@
     </p:spTree>
     <p:extLst>
       <p:ext uri="{BB962C8B-B14F-4D97-AF65-F5344CB8AC3E}">
-        <p14:creationId xmlns:p14="http://schemas.microsoft.com/office/powerpoint/2010/main" val="985269690"/>
+        <p14:creationId xmlns:p14="http://schemas.microsoft.com/office/powerpoint/2010/main" val="1867566307"/>
       </p:ext>
     </p:extLst>
   </p:cSld>
   <p:clrMap bg1="lt1" tx1="dk1" bg2="lt2" tx2="dk2" accent1="accent1" accent2="accent2" accent3="accent3" accent4="accent4" accent5="accent5" accent6="accent6" hlink="hlink" folHlink="folHlink"/>
   <p:sldLayoutIdLst>
-    <p:sldLayoutId id="2147483649" r:id="rId1"/>
-    <p:sldLayoutId id="2147483650" r:id="rId2"/>
-    <p:sldLayoutId id="2147483651" r:id="rId3"/>
-    <p:sldLayoutId id="2147483652" r:id="rId4"/>
-    <p:sldLayoutId id="2147483653" r:id="rId5"/>
-    <p:sldLayoutId id="2147483654" r:id="rId6"/>
-    <p:sldLayoutId id="2147483655" r:id="rId7"/>
-    <p:sldLayoutId id="2147483656" r:id="rId8"/>
-    <p:sldLayoutId id="2147483657" r:id="rId9"/>
-    <p:sldLayoutId id="2147483658" r:id="rId10"/>
-    <p:sldLayoutId id="2147483659" r:id="rId11"/>
+    <p:sldLayoutId id="2147483685" r:id="rId1"/>
+    <p:sldLayoutId id="2147483686" r:id="rId2"/>
+    <p:sldLayoutId id="2147483687" r:id="rId3"/>
+    <p:sldLayoutId id="2147483688" r:id="rId4"/>
+    <p:sldLayoutId id="2147483689" r:id="rId5"/>
+    <p:sldLayoutId id="2147483690" r:id="rId6"/>
+    <p:sldLayoutId id="2147483691" r:id="rId7"/>
+    <p:sldLayoutId id="2147483692" r:id="rId8"/>
+    <p:sldLayoutId id="2147483693" r:id="rId9"/>
+    <p:sldLayoutId id="2147483694" r:id="rId10"/>
+    <p:sldLayoutId id="2147483695" r:id="rId11"/>
   </p:sldLayoutIdLst>
   <p:txStyles>
     <p:titleStyle>
@@ -3350,8 +3303,12 @@
           <a:lstStyle/>
           <a:p>
             <a:r>
+              <a:rPr lang="en-US" dirty="0"/>
+              <a:t>e</a:t>
+            </a:r>
+            <a:r>
               <a:rPr lang="en-US" dirty="0" smtClean="0"/>
-              <a:t>Extending Visual Studio Code</a:t>
+              <a:t>xtending visual studio code</a:t>
             </a:r>
             <a:endParaRPr lang="en-US" dirty="0"/>
           </a:p>
@@ -3373,17 +3330,29 @@
           <a:lstStyle/>
           <a:p>
             <a:r>
+              <a:rPr lang="en-US" dirty="0" err="1"/>
+              <a:t>b</a:t>
+            </a:r>
+            <a:r>
+              <a:rPr lang="en-US" dirty="0" err="1" smtClean="0"/>
+              <a:t>rady</a:t>
+            </a:r>
+            <a:r>
               <a:rPr lang="en-US" dirty="0" smtClean="0"/>
-              <a:t>Brady Gaster</a:t>
-            </a:r>
-          </a:p>
-          <a:p>
+              <a:t> </a:t>
+            </a:r>
+            <a:r>
+              <a:rPr lang="en-US" dirty="0" err="1"/>
+              <a:t>g</a:t>
+            </a:r>
+            <a:r>
+              <a:rPr lang="en-US" dirty="0" err="1" smtClean="0"/>
+              <a:t>aster</a:t>
+            </a:r>
             <a:r>
               <a:rPr lang="en-US" dirty="0" smtClean="0"/>
-              <a:t>Senior Program Manager</a:t>
-            </a:r>
-          </a:p>
-          <a:p>
+              <a:t>     |     senior program manager     |    </a:t>
+            </a:r>
             <a:r>
               <a:rPr lang="en-US" dirty="0" err="1" smtClean="0"/>
               <a:t>docs.microsoft.com</a:t>
@@ -3740,6 +3709,2639 @@
 </p:sld>
 </file>
 
+<file path=ppt/slides/slide14.xml><?xml version="1.0" encoding="utf-8"?>
+<p:sld xmlns:a="http://schemas.openxmlformats.org/drawingml/2006/main" xmlns:r="http://schemas.openxmlformats.org/officeDocument/2006/relationships" xmlns:p="http://schemas.openxmlformats.org/presentationml/2006/main">
+  <p:cSld>
+    <p:spTree>
+      <p:nvGrpSpPr>
+        <p:cNvPr id="1" name=""/>
+        <p:cNvGrpSpPr/>
+        <p:nvPr/>
+      </p:nvGrpSpPr>
+      <p:grpSpPr>
+        <a:xfrm>
+          <a:off x="0" y="0"/>
+          <a:ext cx="0" cy="0"/>
+          <a:chOff x="0" y="0"/>
+          <a:chExt cx="0" cy="0"/>
+        </a:xfrm>
+      </p:grpSpPr>
+      <p:pic>
+        <p:nvPicPr>
+          <p:cNvPr id="14" name="Picture 13"/>
+          <p:cNvPicPr>
+            <a:picLocks noChangeAspect="1"/>
+          </p:cNvPicPr>
+          <p:nvPr/>
+        </p:nvPicPr>
+        <p:blipFill>
+          <a:blip r:embed="rId2"/>
+          <a:stretch>
+            <a:fillRect/>
+          </a:stretch>
+        </p:blipFill>
+        <p:spPr>
+          <a:xfrm>
+            <a:off x="1781175" y="1756603"/>
+            <a:ext cx="8629650" cy="4298950"/>
+          </a:xfrm>
+          <a:prstGeom prst="rect">
+            <a:avLst/>
+          </a:prstGeom>
+        </p:spPr>
+      </p:pic>
+      <p:sp>
+        <p:nvSpPr>
+          <p:cNvPr id="12" name="Title 11"/>
+          <p:cNvSpPr>
+            <a:spLocks noGrp="1"/>
+          </p:cNvSpPr>
+          <p:nvPr>
+            <p:ph type="title"/>
+          </p:nvPr>
+        </p:nvSpPr>
+        <p:spPr/>
+        <p:txBody>
+          <a:bodyPr/>
+          <a:lstStyle/>
+          <a:p>
+            <a:r>
+              <a:rPr lang="en-US" dirty="0" smtClean="0"/>
+              <a:t>uploading new marketplace entries</a:t>
+            </a:r>
+            <a:endParaRPr lang="en-US" dirty="0"/>
+          </a:p>
+        </p:txBody>
+      </p:sp>
+      <p:sp>
+        <p:nvSpPr>
+          <p:cNvPr id="13" name="Content Placeholder 12"/>
+          <p:cNvSpPr>
+            <a:spLocks noGrp="1"/>
+          </p:cNvSpPr>
+          <p:nvPr>
+            <p:ph idx="1"/>
+          </p:nvPr>
+        </p:nvSpPr>
+        <p:spPr>
+          <a:xfrm>
+            <a:off x="838200" y="1340595"/>
+            <a:ext cx="10515600" cy="4351338"/>
+          </a:xfrm>
+        </p:spPr>
+        <p:txBody>
+          <a:bodyPr/>
+          <a:lstStyle/>
+          <a:p>
+            <a:pPr marL="0" indent="0">
+              <a:buNone/>
+            </a:pPr>
+            <a:r>
+              <a:rPr lang="en-US" dirty="0" smtClean="0"/>
+              <a:t>https</a:t>
+            </a:r>
+            <a:r>
+              <a:rPr lang="en-US" dirty="0"/>
+              <a:t>://</a:t>
+            </a:r>
+            <a:r>
+              <a:rPr lang="en-US" dirty="0" err="1"/>
+              <a:t>marketplace.visualstudio.com</a:t>
+            </a:r>
+            <a:r>
+              <a:rPr lang="en-US" dirty="0"/>
+              <a:t>/manage/publishers</a:t>
+            </a:r>
+            <a:r>
+              <a:rPr lang="en-US" dirty="0" smtClean="0"/>
+              <a:t>/</a:t>
+            </a:r>
+            <a:r>
+              <a:rPr lang="en-US" dirty="0" smtClean="0">
+                <a:solidFill>
+                  <a:schemeClr val="accent1"/>
+                </a:solidFill>
+              </a:rPr>
+              <a:t>{publisher}</a:t>
+            </a:r>
+            <a:endParaRPr lang="en-US" dirty="0">
+              <a:solidFill>
+                <a:schemeClr val="accent1"/>
+              </a:solidFill>
+            </a:endParaRPr>
+          </a:p>
+        </p:txBody>
+      </p:sp>
+      <p:cxnSp>
+        <p:nvCxnSpPr>
+          <p:cNvPr id="16" name="Straight Arrow Connector 15"/>
+          <p:cNvCxnSpPr/>
+          <p:nvPr/>
+        </p:nvCxnSpPr>
+        <p:spPr>
+          <a:xfrm flipH="1" flipV="1">
+            <a:off x="9740348" y="3516264"/>
+            <a:ext cx="1741335" cy="1175006"/>
+          </a:xfrm>
+          <a:prstGeom prst="straightConnector1">
+            <a:avLst/>
+          </a:prstGeom>
+          <a:ln w="76200">
+            <a:solidFill>
+              <a:srgbClr val="FF0000"/>
+            </a:solidFill>
+            <a:tailEnd type="triangle"/>
+          </a:ln>
+        </p:spPr>
+        <p:style>
+          <a:lnRef idx="1">
+            <a:schemeClr val="accent1"/>
+          </a:lnRef>
+          <a:fillRef idx="0">
+            <a:schemeClr val="accent1"/>
+          </a:fillRef>
+          <a:effectRef idx="0">
+            <a:schemeClr val="accent1"/>
+          </a:effectRef>
+          <a:fontRef idx="minor">
+            <a:schemeClr val="tx1"/>
+          </a:fontRef>
+        </p:style>
+      </p:cxnSp>
+    </p:spTree>
+    <p:extLst>
+      <p:ext uri="{BB962C8B-B14F-4D97-AF65-F5344CB8AC3E}">
+        <p14:creationId xmlns:p14="http://schemas.microsoft.com/office/powerpoint/2010/main" val="1247864619"/>
+      </p:ext>
+    </p:extLst>
+  </p:cSld>
+  <p:clrMapOvr>
+    <a:masterClrMapping/>
+  </p:clrMapOvr>
+  <p:transition spd="slow">
+    <p:push dir="u"/>
+  </p:transition>
+  <p:timing>
+    <p:tnLst>
+      <p:par>
+        <p:cTn id="1" dur="indefinite" restart="never" nodeType="tmRoot">
+          <p:childTnLst>
+            <p:seq concurrent="1" nextAc="seek">
+              <p:cTn id="2" dur="indefinite" nodeType="mainSeq">
+                <p:childTnLst>
+                  <p:par>
+                    <p:cTn id="3" fill="hold">
+                      <p:stCondLst>
+                        <p:cond delay="indefinite"/>
+                      </p:stCondLst>
+                      <p:childTnLst>
+                        <p:par>
+                          <p:cTn id="4" fill="hold">
+                            <p:stCondLst>
+                              <p:cond delay="0"/>
+                            </p:stCondLst>
+                            <p:childTnLst>
+                              <p:par>
+                                <p:cTn id="5" presetID="22" presetClass="entr" presetSubtype="2" fill="hold" nodeType="clickEffect">
+                                  <p:stCondLst>
+                                    <p:cond delay="0"/>
+                                  </p:stCondLst>
+                                  <p:childTnLst>
+                                    <p:set>
+                                      <p:cBhvr>
+                                        <p:cTn id="6" dur="1" fill="hold">
+                                          <p:stCondLst>
+                                            <p:cond delay="0"/>
+                                          </p:stCondLst>
+                                        </p:cTn>
+                                        <p:tgtEl>
+                                          <p:spTgt spid="16"/>
+                                        </p:tgtEl>
+                                        <p:attrNameLst>
+                                          <p:attrName>style.visibility</p:attrName>
+                                        </p:attrNameLst>
+                                      </p:cBhvr>
+                                      <p:to>
+                                        <p:strVal val="visible"/>
+                                      </p:to>
+                                    </p:set>
+                                    <p:animEffect transition="in" filter="wipe(right)">
+                                      <p:cBhvr>
+                                        <p:cTn id="7" dur="500"/>
+                                        <p:tgtEl>
+                                          <p:spTgt spid="16"/>
+                                        </p:tgtEl>
+                                      </p:cBhvr>
+                                    </p:animEffect>
+                                  </p:childTnLst>
+                                </p:cTn>
+                              </p:par>
+                            </p:childTnLst>
+                          </p:cTn>
+                        </p:par>
+                      </p:childTnLst>
+                    </p:cTn>
+                  </p:par>
+                </p:childTnLst>
+              </p:cTn>
+              <p:prevCondLst>
+                <p:cond evt="onPrev" delay="0">
+                  <p:tgtEl>
+                    <p:sldTgt/>
+                  </p:tgtEl>
+                </p:cond>
+              </p:prevCondLst>
+              <p:nextCondLst>
+                <p:cond evt="onNext" delay="0">
+                  <p:tgtEl>
+                    <p:sldTgt/>
+                  </p:tgtEl>
+                </p:cond>
+              </p:nextCondLst>
+            </p:seq>
+          </p:childTnLst>
+        </p:cTn>
+      </p:par>
+    </p:tnLst>
+  </p:timing>
+</p:sld>
+</file>
+
+<file path=ppt/slides/slide15.xml><?xml version="1.0" encoding="utf-8"?>
+<p:sld xmlns:a="http://schemas.openxmlformats.org/drawingml/2006/main" xmlns:r="http://schemas.openxmlformats.org/officeDocument/2006/relationships" xmlns:p="http://schemas.openxmlformats.org/presentationml/2006/main">
+  <p:cSld>
+    <p:spTree>
+      <p:nvGrpSpPr>
+        <p:cNvPr id="1" name=""/>
+        <p:cNvGrpSpPr/>
+        <p:nvPr/>
+      </p:nvGrpSpPr>
+      <p:grpSpPr>
+        <a:xfrm>
+          <a:off x="0" y="0"/>
+          <a:ext cx="0" cy="0"/>
+          <a:chOff x="0" y="0"/>
+          <a:chExt cx="0" cy="0"/>
+        </a:xfrm>
+      </p:grpSpPr>
+      <p:pic>
+        <p:nvPicPr>
+          <p:cNvPr id="14" name="Picture 13"/>
+          <p:cNvPicPr>
+            <a:picLocks noChangeAspect="1"/>
+          </p:cNvPicPr>
+          <p:nvPr/>
+        </p:nvPicPr>
+        <p:blipFill>
+          <a:blip r:embed="rId2"/>
+          <a:stretch>
+            <a:fillRect/>
+          </a:stretch>
+        </p:blipFill>
+        <p:spPr>
+          <a:xfrm>
+            <a:off x="1781175" y="1756603"/>
+            <a:ext cx="8629650" cy="4298950"/>
+          </a:xfrm>
+          <a:prstGeom prst="rect">
+            <a:avLst/>
+          </a:prstGeom>
+        </p:spPr>
+      </p:pic>
+      <p:sp>
+        <p:nvSpPr>
+          <p:cNvPr id="12" name="Title 11"/>
+          <p:cNvSpPr>
+            <a:spLocks noGrp="1"/>
+          </p:cNvSpPr>
+          <p:nvPr>
+            <p:ph type="title"/>
+          </p:nvPr>
+        </p:nvSpPr>
+        <p:spPr/>
+        <p:txBody>
+          <a:bodyPr/>
+          <a:lstStyle/>
+          <a:p>
+            <a:r>
+              <a:rPr lang="en-US" dirty="0" smtClean="0"/>
+              <a:t>managing your marketplace entries</a:t>
+            </a:r>
+            <a:endParaRPr lang="en-US" dirty="0"/>
+          </a:p>
+        </p:txBody>
+      </p:sp>
+      <p:sp>
+        <p:nvSpPr>
+          <p:cNvPr id="13" name="Content Placeholder 12"/>
+          <p:cNvSpPr>
+            <a:spLocks noGrp="1"/>
+          </p:cNvSpPr>
+          <p:nvPr>
+            <p:ph idx="1"/>
+          </p:nvPr>
+        </p:nvSpPr>
+        <p:spPr>
+          <a:xfrm>
+            <a:off x="838200" y="1340595"/>
+            <a:ext cx="10515600" cy="4351338"/>
+          </a:xfrm>
+        </p:spPr>
+        <p:txBody>
+          <a:bodyPr/>
+          <a:lstStyle/>
+          <a:p>
+            <a:pPr marL="0" indent="0">
+              <a:buNone/>
+            </a:pPr>
+            <a:r>
+              <a:rPr lang="en-US" dirty="0" smtClean="0"/>
+              <a:t>https</a:t>
+            </a:r>
+            <a:r>
+              <a:rPr lang="en-US" dirty="0"/>
+              <a:t>://</a:t>
+            </a:r>
+            <a:r>
+              <a:rPr lang="en-US" dirty="0" err="1"/>
+              <a:t>marketplace.visualstudio.com</a:t>
+            </a:r>
+            <a:r>
+              <a:rPr lang="en-US" dirty="0"/>
+              <a:t>/manage/publishers</a:t>
+            </a:r>
+            <a:r>
+              <a:rPr lang="en-US" dirty="0" smtClean="0"/>
+              <a:t>/</a:t>
+            </a:r>
+            <a:r>
+              <a:rPr lang="en-US" dirty="0" smtClean="0">
+                <a:solidFill>
+                  <a:schemeClr val="accent1"/>
+                </a:solidFill>
+              </a:rPr>
+              <a:t>{publisher}</a:t>
+            </a:r>
+            <a:endParaRPr lang="en-US" dirty="0">
+              <a:solidFill>
+                <a:schemeClr val="accent1"/>
+              </a:solidFill>
+            </a:endParaRPr>
+          </a:p>
+        </p:txBody>
+      </p:sp>
+      <p:pic>
+        <p:nvPicPr>
+          <p:cNvPr id="17" name="Picture 16"/>
+          <p:cNvPicPr>
+            <a:picLocks noChangeAspect="1"/>
+          </p:cNvPicPr>
+          <p:nvPr/>
+        </p:nvPicPr>
+        <p:blipFill>
+          <a:blip r:embed="rId3"/>
+          <a:stretch>
+            <a:fillRect/>
+          </a:stretch>
+        </p:blipFill>
+        <p:spPr>
+          <a:xfrm>
+            <a:off x="1908645" y="1885480"/>
+            <a:ext cx="8915400" cy="4375150"/>
+          </a:xfrm>
+          <a:prstGeom prst="rect">
+            <a:avLst/>
+          </a:prstGeom>
+        </p:spPr>
+      </p:pic>
+    </p:spTree>
+    <p:extLst>
+      <p:ext uri="{BB962C8B-B14F-4D97-AF65-F5344CB8AC3E}">
+        <p14:creationId xmlns:p14="http://schemas.microsoft.com/office/powerpoint/2010/main" val="129482994"/>
+      </p:ext>
+    </p:extLst>
+  </p:cSld>
+  <p:clrMapOvr>
+    <a:masterClrMapping/>
+  </p:clrMapOvr>
+  <p:timing>
+    <p:tnLst>
+      <p:par>
+        <p:cTn id="1" dur="indefinite" restart="never" nodeType="tmRoot"/>
+      </p:par>
+    </p:tnLst>
+  </p:timing>
+</p:sld>
+</file>
+
+<file path=ppt/slides/slide16.xml><?xml version="1.0" encoding="utf-8"?>
+<p:sld xmlns:a="http://schemas.openxmlformats.org/drawingml/2006/main" xmlns:r="http://schemas.openxmlformats.org/officeDocument/2006/relationships" xmlns:p="http://schemas.openxmlformats.org/presentationml/2006/main">
+  <p:cSld>
+    <p:spTree>
+      <p:nvGrpSpPr>
+        <p:cNvPr id="1" name=""/>
+        <p:cNvGrpSpPr/>
+        <p:nvPr/>
+      </p:nvGrpSpPr>
+      <p:grpSpPr>
+        <a:xfrm>
+          <a:off x="0" y="0"/>
+          <a:ext cx="0" cy="0"/>
+          <a:chOff x="0" y="0"/>
+          <a:chExt cx="0" cy="0"/>
+        </a:xfrm>
+      </p:grpSpPr>
+      <p:pic>
+        <p:nvPicPr>
+          <p:cNvPr id="14" name="Picture 13"/>
+          <p:cNvPicPr>
+            <a:picLocks noChangeAspect="1"/>
+          </p:cNvPicPr>
+          <p:nvPr/>
+        </p:nvPicPr>
+        <p:blipFill>
+          <a:blip r:embed="rId2"/>
+          <a:stretch>
+            <a:fillRect/>
+          </a:stretch>
+        </p:blipFill>
+        <p:spPr>
+          <a:xfrm>
+            <a:off x="1781175" y="1756603"/>
+            <a:ext cx="8629650" cy="4298950"/>
+          </a:xfrm>
+          <a:prstGeom prst="rect">
+            <a:avLst/>
+          </a:prstGeom>
+        </p:spPr>
+      </p:pic>
+      <p:sp>
+        <p:nvSpPr>
+          <p:cNvPr id="12" name="Title 11"/>
+          <p:cNvSpPr>
+            <a:spLocks noGrp="1"/>
+          </p:cNvSpPr>
+          <p:nvPr>
+            <p:ph type="title"/>
+          </p:nvPr>
+        </p:nvSpPr>
+        <p:spPr/>
+        <p:txBody>
+          <a:bodyPr/>
+          <a:lstStyle/>
+          <a:p>
+            <a:r>
+              <a:rPr lang="en-US" dirty="0" smtClean="0"/>
+              <a:t>managing your marketplace entries</a:t>
+            </a:r>
+            <a:endParaRPr lang="en-US" dirty="0"/>
+          </a:p>
+        </p:txBody>
+      </p:sp>
+      <p:sp>
+        <p:nvSpPr>
+          <p:cNvPr id="13" name="Content Placeholder 12"/>
+          <p:cNvSpPr>
+            <a:spLocks noGrp="1"/>
+          </p:cNvSpPr>
+          <p:nvPr>
+            <p:ph idx="1"/>
+          </p:nvPr>
+        </p:nvSpPr>
+        <p:spPr>
+          <a:xfrm>
+            <a:off x="838200" y="1340595"/>
+            <a:ext cx="10515600" cy="4351338"/>
+          </a:xfrm>
+        </p:spPr>
+        <p:txBody>
+          <a:bodyPr/>
+          <a:lstStyle/>
+          <a:p>
+            <a:pPr marL="0" indent="0">
+              <a:buNone/>
+            </a:pPr>
+            <a:r>
+              <a:rPr lang="en-US" dirty="0" smtClean="0"/>
+              <a:t>https</a:t>
+            </a:r>
+            <a:r>
+              <a:rPr lang="en-US" dirty="0"/>
+              <a:t>://</a:t>
+            </a:r>
+            <a:r>
+              <a:rPr lang="en-US" dirty="0" err="1"/>
+              <a:t>marketplace.visualstudio.com</a:t>
+            </a:r>
+            <a:r>
+              <a:rPr lang="en-US" dirty="0"/>
+              <a:t>/manage/publishers</a:t>
+            </a:r>
+            <a:r>
+              <a:rPr lang="en-US" dirty="0" smtClean="0"/>
+              <a:t>/</a:t>
+            </a:r>
+            <a:r>
+              <a:rPr lang="en-US" dirty="0" smtClean="0">
+                <a:solidFill>
+                  <a:schemeClr val="accent1"/>
+                </a:solidFill>
+              </a:rPr>
+              <a:t>{publisher}</a:t>
+            </a:r>
+            <a:endParaRPr lang="en-US" dirty="0">
+              <a:solidFill>
+                <a:schemeClr val="accent1"/>
+              </a:solidFill>
+            </a:endParaRPr>
+          </a:p>
+        </p:txBody>
+      </p:sp>
+      <p:cxnSp>
+        <p:nvCxnSpPr>
+          <p:cNvPr id="16" name="Straight Arrow Connector 15"/>
+          <p:cNvCxnSpPr/>
+          <p:nvPr/>
+        </p:nvCxnSpPr>
+        <p:spPr>
+          <a:xfrm flipH="1" flipV="1">
+            <a:off x="4731026" y="4946462"/>
+            <a:ext cx="1741335" cy="1175006"/>
+          </a:xfrm>
+          <a:prstGeom prst="straightConnector1">
+            <a:avLst/>
+          </a:prstGeom>
+          <a:ln w="76200">
+            <a:solidFill>
+              <a:srgbClr val="FF0000"/>
+            </a:solidFill>
+            <a:tailEnd type="triangle"/>
+          </a:ln>
+        </p:spPr>
+        <p:style>
+          <a:lnRef idx="1">
+            <a:schemeClr val="accent1"/>
+          </a:lnRef>
+          <a:fillRef idx="0">
+            <a:schemeClr val="accent1"/>
+          </a:fillRef>
+          <a:effectRef idx="0">
+            <a:schemeClr val="accent1"/>
+          </a:effectRef>
+          <a:fontRef idx="minor">
+            <a:schemeClr val="tx1"/>
+          </a:fontRef>
+        </p:style>
+      </p:cxnSp>
+    </p:spTree>
+    <p:extLst>
+      <p:ext uri="{BB962C8B-B14F-4D97-AF65-F5344CB8AC3E}">
+        <p14:creationId xmlns:p14="http://schemas.microsoft.com/office/powerpoint/2010/main" val="1163862100"/>
+      </p:ext>
+    </p:extLst>
+  </p:cSld>
+  <p:clrMapOvr>
+    <a:masterClrMapping/>
+  </p:clrMapOvr>
+  <p:timing>
+    <p:tnLst>
+      <p:par>
+        <p:cTn id="1" dur="indefinite" restart="never" nodeType="tmRoot">
+          <p:childTnLst>
+            <p:seq concurrent="1" nextAc="seek">
+              <p:cTn id="2" dur="indefinite" nodeType="mainSeq">
+                <p:childTnLst>
+                  <p:par>
+                    <p:cTn id="3" fill="hold">
+                      <p:stCondLst>
+                        <p:cond delay="indefinite"/>
+                      </p:stCondLst>
+                      <p:childTnLst>
+                        <p:par>
+                          <p:cTn id="4" fill="hold">
+                            <p:stCondLst>
+                              <p:cond delay="0"/>
+                            </p:stCondLst>
+                            <p:childTnLst>
+                              <p:par>
+                                <p:cTn id="5" presetID="22" presetClass="entr" presetSubtype="2" fill="hold" nodeType="clickEffect">
+                                  <p:stCondLst>
+                                    <p:cond delay="0"/>
+                                  </p:stCondLst>
+                                  <p:childTnLst>
+                                    <p:set>
+                                      <p:cBhvr>
+                                        <p:cTn id="6" dur="1" fill="hold">
+                                          <p:stCondLst>
+                                            <p:cond delay="0"/>
+                                          </p:stCondLst>
+                                        </p:cTn>
+                                        <p:tgtEl>
+                                          <p:spTgt spid="16"/>
+                                        </p:tgtEl>
+                                        <p:attrNameLst>
+                                          <p:attrName>style.visibility</p:attrName>
+                                        </p:attrNameLst>
+                                      </p:cBhvr>
+                                      <p:to>
+                                        <p:strVal val="visible"/>
+                                      </p:to>
+                                    </p:set>
+                                    <p:animEffect transition="in" filter="wipe(right)">
+                                      <p:cBhvr>
+                                        <p:cTn id="7" dur="500"/>
+                                        <p:tgtEl>
+                                          <p:spTgt spid="16"/>
+                                        </p:tgtEl>
+                                      </p:cBhvr>
+                                    </p:animEffect>
+                                  </p:childTnLst>
+                                </p:cTn>
+                              </p:par>
+                            </p:childTnLst>
+                          </p:cTn>
+                        </p:par>
+                      </p:childTnLst>
+                    </p:cTn>
+                  </p:par>
+                </p:childTnLst>
+              </p:cTn>
+              <p:prevCondLst>
+                <p:cond evt="onPrev" delay="0">
+                  <p:tgtEl>
+                    <p:sldTgt/>
+                  </p:tgtEl>
+                </p:cond>
+              </p:prevCondLst>
+              <p:nextCondLst>
+                <p:cond evt="onNext" delay="0">
+                  <p:tgtEl>
+                    <p:sldTgt/>
+                  </p:tgtEl>
+                </p:cond>
+              </p:nextCondLst>
+            </p:seq>
+          </p:childTnLst>
+        </p:cTn>
+      </p:par>
+    </p:tnLst>
+  </p:timing>
+</p:sld>
+</file>
+
+<file path=ppt/slides/slide17.xml><?xml version="1.0" encoding="utf-8"?>
+<p:sld xmlns:a="http://schemas.openxmlformats.org/drawingml/2006/main" xmlns:r="http://schemas.openxmlformats.org/officeDocument/2006/relationships" xmlns:p="http://schemas.openxmlformats.org/presentationml/2006/main">
+  <p:cSld>
+    <p:spTree>
+      <p:nvGrpSpPr>
+        <p:cNvPr id="1" name=""/>
+        <p:cNvGrpSpPr/>
+        <p:nvPr/>
+      </p:nvGrpSpPr>
+      <p:grpSpPr>
+        <a:xfrm>
+          <a:off x="0" y="0"/>
+          <a:ext cx="0" cy="0"/>
+          <a:chOff x="0" y="0"/>
+          <a:chExt cx="0" cy="0"/>
+        </a:xfrm>
+      </p:grpSpPr>
+      <p:sp>
+        <p:nvSpPr>
+          <p:cNvPr id="12" name="Title 11"/>
+          <p:cNvSpPr>
+            <a:spLocks noGrp="1"/>
+          </p:cNvSpPr>
+          <p:nvPr>
+            <p:ph type="title"/>
+          </p:nvPr>
+        </p:nvSpPr>
+        <p:spPr/>
+        <p:txBody>
+          <a:bodyPr/>
+          <a:lstStyle/>
+          <a:p>
+            <a:r>
+              <a:rPr lang="en-US" dirty="0" smtClean="0"/>
+              <a:t>managing your marketplace entries</a:t>
+            </a:r>
+            <a:endParaRPr lang="en-US" dirty="0"/>
+          </a:p>
+        </p:txBody>
+      </p:sp>
+      <p:sp>
+        <p:nvSpPr>
+          <p:cNvPr id="13" name="Content Placeholder 12"/>
+          <p:cNvSpPr>
+            <a:spLocks noGrp="1"/>
+          </p:cNvSpPr>
+          <p:nvPr>
+            <p:ph idx="1"/>
+          </p:nvPr>
+        </p:nvSpPr>
+        <p:spPr>
+          <a:xfrm>
+            <a:off x="838200" y="1340595"/>
+            <a:ext cx="10515600" cy="4351338"/>
+          </a:xfrm>
+        </p:spPr>
+        <p:txBody>
+          <a:bodyPr/>
+          <a:lstStyle/>
+          <a:p>
+            <a:pPr marL="0" indent="0">
+              <a:buNone/>
+            </a:pPr>
+            <a:r>
+              <a:rPr lang="en-US" dirty="0" smtClean="0"/>
+              <a:t>https</a:t>
+            </a:r>
+            <a:r>
+              <a:rPr lang="en-US" dirty="0"/>
+              <a:t>://</a:t>
+            </a:r>
+            <a:r>
+              <a:rPr lang="en-US" dirty="0" err="1"/>
+              <a:t>marketplace.visualstudio.com</a:t>
+            </a:r>
+            <a:r>
+              <a:rPr lang="en-US" dirty="0"/>
+              <a:t>/manage/publishers</a:t>
+            </a:r>
+            <a:r>
+              <a:rPr lang="en-US" dirty="0" smtClean="0"/>
+              <a:t>/</a:t>
+            </a:r>
+            <a:r>
+              <a:rPr lang="en-US" dirty="0" smtClean="0">
+                <a:solidFill>
+                  <a:schemeClr val="accent1"/>
+                </a:solidFill>
+              </a:rPr>
+              <a:t>{publisher}</a:t>
+            </a:r>
+            <a:endParaRPr lang="en-US" dirty="0">
+              <a:solidFill>
+                <a:schemeClr val="accent1"/>
+              </a:solidFill>
+            </a:endParaRPr>
+          </a:p>
+        </p:txBody>
+      </p:sp>
+      <p:pic>
+        <p:nvPicPr>
+          <p:cNvPr id="6" name="Picture 5"/>
+          <p:cNvPicPr>
+            <a:picLocks noChangeAspect="1"/>
+          </p:cNvPicPr>
+          <p:nvPr/>
+        </p:nvPicPr>
+        <p:blipFill>
+          <a:blip r:embed="rId2"/>
+          <a:stretch>
+            <a:fillRect/>
+          </a:stretch>
+        </p:blipFill>
+        <p:spPr>
+          <a:xfrm>
+            <a:off x="1862396" y="1887000"/>
+            <a:ext cx="8769350" cy="4292600"/>
+          </a:xfrm>
+          <a:prstGeom prst="rect">
+            <a:avLst/>
+          </a:prstGeom>
+        </p:spPr>
+      </p:pic>
+    </p:spTree>
+    <p:extLst>
+      <p:ext uri="{BB962C8B-B14F-4D97-AF65-F5344CB8AC3E}">
+        <p14:creationId xmlns:p14="http://schemas.microsoft.com/office/powerpoint/2010/main" val="767226676"/>
+      </p:ext>
+    </p:extLst>
+  </p:cSld>
+  <p:clrMapOvr>
+    <a:masterClrMapping/>
+  </p:clrMapOvr>
+  <p:timing>
+    <p:tnLst>
+      <p:par>
+        <p:cTn id="1" dur="indefinite" restart="never" nodeType="tmRoot"/>
+      </p:par>
+    </p:tnLst>
+  </p:timing>
+</p:sld>
+</file>
+
+<file path=ppt/slides/slide18.xml><?xml version="1.0" encoding="utf-8"?>
+<p:sld xmlns:a="http://schemas.openxmlformats.org/drawingml/2006/main" xmlns:r="http://schemas.openxmlformats.org/officeDocument/2006/relationships" xmlns:p="http://schemas.openxmlformats.org/presentationml/2006/main">
+  <p:cSld>
+    <p:spTree>
+      <p:nvGrpSpPr>
+        <p:cNvPr id="1" name=""/>
+        <p:cNvGrpSpPr/>
+        <p:nvPr/>
+      </p:nvGrpSpPr>
+      <p:grpSpPr>
+        <a:xfrm>
+          <a:off x="0" y="0"/>
+          <a:ext cx="0" cy="0"/>
+          <a:chOff x="0" y="0"/>
+          <a:chExt cx="0" cy="0"/>
+        </a:xfrm>
+      </p:grpSpPr>
+      <p:sp>
+        <p:nvSpPr>
+          <p:cNvPr id="2" name="Title 1"/>
+          <p:cNvSpPr>
+            <a:spLocks noGrp="1"/>
+          </p:cNvSpPr>
+          <p:nvPr>
+            <p:ph type="title"/>
+          </p:nvPr>
+        </p:nvSpPr>
+        <p:spPr>
+          <a:xfrm>
+            <a:off x="1221450" y="711644"/>
+            <a:ext cx="3932237" cy="1600200"/>
+          </a:xfrm>
+        </p:spPr>
+        <p:txBody>
+          <a:bodyPr/>
+          <a:lstStyle/>
+          <a:p>
+            <a:r>
+              <a:rPr lang="en-US" dirty="0" smtClean="0"/>
+              <a:t>command-line focused</a:t>
+            </a:r>
+            <a:endParaRPr lang="en-US" dirty="0"/>
+          </a:p>
+        </p:txBody>
+      </p:sp>
+      <p:sp>
+        <p:nvSpPr>
+          <p:cNvPr id="4" name="Text Placeholder 3"/>
+          <p:cNvSpPr>
+            <a:spLocks noGrp="1"/>
+          </p:cNvSpPr>
+          <p:nvPr>
+            <p:ph type="body" sz="half" idx="2"/>
+          </p:nvPr>
+        </p:nvSpPr>
+        <p:spPr>
+          <a:xfrm>
+            <a:off x="1221450" y="2311844"/>
+            <a:ext cx="3932237" cy="3811588"/>
+          </a:xfrm>
+        </p:spPr>
+        <p:txBody>
+          <a:bodyPr/>
+          <a:lstStyle/>
+          <a:p>
+            <a:r>
+              <a:rPr lang="en-US" dirty="0" smtClean="0"/>
+              <a:t>most vs code users demonstrate comfort at the command line, so try not to make the user need to use the mouse</a:t>
+            </a:r>
+            <a:endParaRPr lang="en-US" dirty="0"/>
+          </a:p>
+        </p:txBody>
+      </p:sp>
+      <p:sp>
+        <p:nvSpPr>
+          <p:cNvPr id="6" name="Title 1"/>
+          <p:cNvSpPr txBox="1">
+            <a:spLocks/>
+          </p:cNvSpPr>
+          <p:nvPr/>
+        </p:nvSpPr>
+        <p:spPr>
+          <a:xfrm>
+            <a:off x="6788689" y="711644"/>
+            <a:ext cx="3932237" cy="1600200"/>
+          </a:xfrm>
+          <a:prstGeom prst="rect">
+            <a:avLst/>
+          </a:prstGeom>
+        </p:spPr>
+        <p:txBody>
+          <a:bodyPr vert="horz" lIns="91440" tIns="45720" rIns="91440" bIns="45720" rtlCol="0" anchor="b">
+            <a:normAutofit/>
+          </a:bodyPr>
+          <a:lstStyle>
+            <a:lvl1pPr algn="l" defTabSz="914400" rtl="0" eaLnBrk="1" latinLnBrk="0" hangingPunct="1">
+              <a:lnSpc>
+                <a:spcPct val="90000"/>
+              </a:lnSpc>
+              <a:spcBef>
+                <a:spcPct val="0"/>
+              </a:spcBef>
+              <a:buNone/>
+              <a:defRPr sz="3200" kern="1200">
+                <a:solidFill>
+                  <a:schemeClr val="tx1"/>
+                </a:solidFill>
+                <a:latin typeface="+mj-lt"/>
+                <a:ea typeface="+mj-ea"/>
+                <a:cs typeface="+mj-cs"/>
+              </a:defRPr>
+            </a:lvl1pPr>
+          </a:lstStyle>
+          <a:p>
+            <a:r>
+              <a:rPr lang="en-US" dirty="0" smtClean="0"/>
+              <a:t>embrace extension</a:t>
+            </a:r>
+            <a:endParaRPr lang="en-US" dirty="0" smtClean="0"/>
+          </a:p>
+        </p:txBody>
+      </p:sp>
+      <p:sp>
+        <p:nvSpPr>
+          <p:cNvPr id="7" name="Text Placeholder 3"/>
+          <p:cNvSpPr txBox="1">
+            <a:spLocks/>
+          </p:cNvSpPr>
+          <p:nvPr/>
+        </p:nvSpPr>
+        <p:spPr>
+          <a:xfrm>
+            <a:off x="6788689" y="2311844"/>
+            <a:ext cx="3932237" cy="3811588"/>
+          </a:xfrm>
+          <a:prstGeom prst="rect">
+            <a:avLst/>
+          </a:prstGeom>
+        </p:spPr>
+        <p:txBody>
+          <a:bodyPr vert="horz" lIns="91440" tIns="45720" rIns="91440" bIns="45720" rtlCol="0">
+            <a:normAutofit/>
+          </a:bodyPr>
+          <a:lstStyle>
+            <a:lvl1pPr marL="0" indent="0" algn="l" defTabSz="914400" rtl="0" eaLnBrk="1" latinLnBrk="0" hangingPunct="1">
+              <a:lnSpc>
+                <a:spcPct val="90000"/>
+              </a:lnSpc>
+              <a:spcBef>
+                <a:spcPts val="1000"/>
+              </a:spcBef>
+              <a:buFont typeface="Arial"/>
+              <a:buNone/>
+              <a:defRPr sz="1600" kern="1200">
+                <a:solidFill>
+                  <a:schemeClr val="tx1"/>
+                </a:solidFill>
+                <a:latin typeface="+mn-lt"/>
+                <a:ea typeface="+mn-ea"/>
+                <a:cs typeface="+mn-cs"/>
+              </a:defRPr>
+            </a:lvl1pPr>
+            <a:lvl2pPr marL="457200" indent="0" algn="l" defTabSz="914400" rtl="0" eaLnBrk="1" latinLnBrk="0" hangingPunct="1">
+              <a:lnSpc>
+                <a:spcPct val="90000"/>
+              </a:lnSpc>
+              <a:spcBef>
+                <a:spcPts val="500"/>
+              </a:spcBef>
+              <a:buFont typeface="Arial"/>
+              <a:buNone/>
+              <a:defRPr sz="1400" kern="1200">
+                <a:solidFill>
+                  <a:schemeClr val="tx1"/>
+                </a:solidFill>
+                <a:latin typeface="+mn-lt"/>
+                <a:ea typeface="+mn-ea"/>
+                <a:cs typeface="+mn-cs"/>
+              </a:defRPr>
+            </a:lvl2pPr>
+            <a:lvl3pPr marL="914400" indent="0" algn="l" defTabSz="914400" rtl="0" eaLnBrk="1" latinLnBrk="0" hangingPunct="1">
+              <a:lnSpc>
+                <a:spcPct val="90000"/>
+              </a:lnSpc>
+              <a:spcBef>
+                <a:spcPts val="500"/>
+              </a:spcBef>
+              <a:buFont typeface="Arial"/>
+              <a:buNone/>
+              <a:defRPr sz="1200" kern="1200">
+                <a:solidFill>
+                  <a:schemeClr val="tx1"/>
+                </a:solidFill>
+                <a:latin typeface="+mn-lt"/>
+                <a:ea typeface="+mn-ea"/>
+                <a:cs typeface="+mn-cs"/>
+              </a:defRPr>
+            </a:lvl3pPr>
+            <a:lvl4pPr marL="1371600" indent="0" algn="l" defTabSz="914400" rtl="0" eaLnBrk="1" latinLnBrk="0" hangingPunct="1">
+              <a:lnSpc>
+                <a:spcPct val="90000"/>
+              </a:lnSpc>
+              <a:spcBef>
+                <a:spcPts val="500"/>
+              </a:spcBef>
+              <a:buFont typeface="Arial"/>
+              <a:buNone/>
+              <a:defRPr sz="1000" kern="1200">
+                <a:solidFill>
+                  <a:schemeClr val="tx1"/>
+                </a:solidFill>
+                <a:latin typeface="+mn-lt"/>
+                <a:ea typeface="+mn-ea"/>
+                <a:cs typeface="+mn-cs"/>
+              </a:defRPr>
+            </a:lvl4pPr>
+            <a:lvl5pPr marL="1828800" indent="0" algn="l" defTabSz="914400" rtl="0" eaLnBrk="1" latinLnBrk="0" hangingPunct="1">
+              <a:lnSpc>
+                <a:spcPct val="90000"/>
+              </a:lnSpc>
+              <a:spcBef>
+                <a:spcPts val="500"/>
+              </a:spcBef>
+              <a:buFont typeface="Arial"/>
+              <a:buNone/>
+              <a:defRPr sz="1000" kern="1200">
+                <a:solidFill>
+                  <a:schemeClr val="tx1"/>
+                </a:solidFill>
+                <a:latin typeface="+mn-lt"/>
+                <a:ea typeface="+mn-ea"/>
+                <a:cs typeface="+mn-cs"/>
+              </a:defRPr>
+            </a:lvl5pPr>
+            <a:lvl6pPr marL="2286000" indent="0" algn="l" defTabSz="914400" rtl="0" eaLnBrk="1" latinLnBrk="0" hangingPunct="1">
+              <a:lnSpc>
+                <a:spcPct val="90000"/>
+              </a:lnSpc>
+              <a:spcBef>
+                <a:spcPts val="500"/>
+              </a:spcBef>
+              <a:buFont typeface="Arial"/>
+              <a:buNone/>
+              <a:defRPr sz="1000" kern="1200">
+                <a:solidFill>
+                  <a:schemeClr val="tx1"/>
+                </a:solidFill>
+                <a:latin typeface="+mn-lt"/>
+                <a:ea typeface="+mn-ea"/>
+                <a:cs typeface="+mn-cs"/>
+              </a:defRPr>
+            </a:lvl6pPr>
+            <a:lvl7pPr marL="2743200" indent="0" algn="l" defTabSz="914400" rtl="0" eaLnBrk="1" latinLnBrk="0" hangingPunct="1">
+              <a:lnSpc>
+                <a:spcPct val="90000"/>
+              </a:lnSpc>
+              <a:spcBef>
+                <a:spcPts val="500"/>
+              </a:spcBef>
+              <a:buFont typeface="Arial"/>
+              <a:buNone/>
+              <a:defRPr sz="1000" kern="1200">
+                <a:solidFill>
+                  <a:schemeClr val="tx1"/>
+                </a:solidFill>
+                <a:latin typeface="+mn-lt"/>
+                <a:ea typeface="+mn-ea"/>
+                <a:cs typeface="+mn-cs"/>
+              </a:defRPr>
+            </a:lvl7pPr>
+            <a:lvl8pPr marL="3200400" indent="0" algn="l" defTabSz="914400" rtl="0" eaLnBrk="1" latinLnBrk="0" hangingPunct="1">
+              <a:lnSpc>
+                <a:spcPct val="90000"/>
+              </a:lnSpc>
+              <a:spcBef>
+                <a:spcPts val="500"/>
+              </a:spcBef>
+              <a:buFont typeface="Arial"/>
+              <a:buNone/>
+              <a:defRPr sz="1000" kern="1200">
+                <a:solidFill>
+                  <a:schemeClr val="tx1"/>
+                </a:solidFill>
+                <a:latin typeface="+mn-lt"/>
+                <a:ea typeface="+mn-ea"/>
+                <a:cs typeface="+mn-cs"/>
+              </a:defRPr>
+            </a:lvl8pPr>
+            <a:lvl9pPr marL="3657600" indent="0" algn="l" defTabSz="914400" rtl="0" eaLnBrk="1" latinLnBrk="0" hangingPunct="1">
+              <a:lnSpc>
+                <a:spcPct val="90000"/>
+              </a:lnSpc>
+              <a:spcBef>
+                <a:spcPts val="500"/>
+              </a:spcBef>
+              <a:buFont typeface="Arial"/>
+              <a:buNone/>
+              <a:defRPr sz="1000" kern="1200">
+                <a:solidFill>
+                  <a:schemeClr val="tx1"/>
+                </a:solidFill>
+                <a:latin typeface="+mn-lt"/>
+                <a:ea typeface="+mn-ea"/>
+                <a:cs typeface="+mn-cs"/>
+              </a:defRPr>
+            </a:lvl9pPr>
+          </a:lstStyle>
+          <a:p>
+            <a:r>
+              <a:rPr lang="en-US" dirty="0" smtClean="0"/>
+              <a:t>if you realize a component of your extension could be used by another extension, break your extension up and take an extension dependency on the componentized part</a:t>
+            </a:r>
+            <a:endParaRPr lang="en-US" dirty="0" smtClean="0"/>
+          </a:p>
+        </p:txBody>
+      </p:sp>
+      <p:sp>
+        <p:nvSpPr>
+          <p:cNvPr id="8" name="Title 1"/>
+          <p:cNvSpPr txBox="1">
+            <a:spLocks/>
+          </p:cNvSpPr>
+          <p:nvPr/>
+        </p:nvSpPr>
+        <p:spPr>
+          <a:xfrm>
+            <a:off x="1151213" y="2764409"/>
+            <a:ext cx="3932237" cy="1600200"/>
+          </a:xfrm>
+          <a:prstGeom prst="rect">
+            <a:avLst/>
+          </a:prstGeom>
+        </p:spPr>
+        <p:txBody>
+          <a:bodyPr vert="horz" lIns="91440" tIns="45720" rIns="91440" bIns="45720" rtlCol="0" anchor="b">
+            <a:normAutofit/>
+          </a:bodyPr>
+          <a:lstStyle>
+            <a:lvl1pPr algn="l" defTabSz="914400" rtl="0" eaLnBrk="1" latinLnBrk="0" hangingPunct="1">
+              <a:lnSpc>
+                <a:spcPct val="90000"/>
+              </a:lnSpc>
+              <a:spcBef>
+                <a:spcPct val="0"/>
+              </a:spcBef>
+              <a:buNone/>
+              <a:defRPr sz="3200" kern="1200">
+                <a:solidFill>
+                  <a:schemeClr val="tx1"/>
+                </a:solidFill>
+                <a:latin typeface="+mj-lt"/>
+                <a:ea typeface="+mj-ea"/>
+                <a:cs typeface="+mj-cs"/>
+              </a:defRPr>
+            </a:lvl1pPr>
+          </a:lstStyle>
+          <a:p>
+            <a:r>
+              <a:rPr lang="en-US" dirty="0" smtClean="0"/>
+              <a:t>open-source at heart</a:t>
+            </a:r>
+            <a:endParaRPr lang="en-US" dirty="0" smtClean="0"/>
+          </a:p>
+        </p:txBody>
+      </p:sp>
+      <p:sp>
+        <p:nvSpPr>
+          <p:cNvPr id="9" name="Text Placeholder 3"/>
+          <p:cNvSpPr txBox="1">
+            <a:spLocks/>
+          </p:cNvSpPr>
+          <p:nvPr/>
+        </p:nvSpPr>
+        <p:spPr>
+          <a:xfrm>
+            <a:off x="1151213" y="4364609"/>
+            <a:ext cx="3932237" cy="3811588"/>
+          </a:xfrm>
+          <a:prstGeom prst="rect">
+            <a:avLst/>
+          </a:prstGeom>
+        </p:spPr>
+        <p:txBody>
+          <a:bodyPr vert="horz" lIns="91440" tIns="45720" rIns="91440" bIns="45720" rtlCol="0">
+            <a:normAutofit/>
+          </a:bodyPr>
+          <a:lstStyle>
+            <a:lvl1pPr marL="0" indent="0" algn="l" defTabSz="914400" rtl="0" eaLnBrk="1" latinLnBrk="0" hangingPunct="1">
+              <a:lnSpc>
+                <a:spcPct val="90000"/>
+              </a:lnSpc>
+              <a:spcBef>
+                <a:spcPts val="1000"/>
+              </a:spcBef>
+              <a:buFont typeface="Arial"/>
+              <a:buNone/>
+              <a:defRPr sz="1600" kern="1200">
+                <a:solidFill>
+                  <a:schemeClr val="tx1"/>
+                </a:solidFill>
+                <a:latin typeface="+mn-lt"/>
+                <a:ea typeface="+mn-ea"/>
+                <a:cs typeface="+mn-cs"/>
+              </a:defRPr>
+            </a:lvl1pPr>
+            <a:lvl2pPr marL="457200" indent="0" algn="l" defTabSz="914400" rtl="0" eaLnBrk="1" latinLnBrk="0" hangingPunct="1">
+              <a:lnSpc>
+                <a:spcPct val="90000"/>
+              </a:lnSpc>
+              <a:spcBef>
+                <a:spcPts val="500"/>
+              </a:spcBef>
+              <a:buFont typeface="Arial"/>
+              <a:buNone/>
+              <a:defRPr sz="1400" kern="1200">
+                <a:solidFill>
+                  <a:schemeClr val="tx1"/>
+                </a:solidFill>
+                <a:latin typeface="+mn-lt"/>
+                <a:ea typeface="+mn-ea"/>
+                <a:cs typeface="+mn-cs"/>
+              </a:defRPr>
+            </a:lvl2pPr>
+            <a:lvl3pPr marL="914400" indent="0" algn="l" defTabSz="914400" rtl="0" eaLnBrk="1" latinLnBrk="0" hangingPunct="1">
+              <a:lnSpc>
+                <a:spcPct val="90000"/>
+              </a:lnSpc>
+              <a:spcBef>
+                <a:spcPts val="500"/>
+              </a:spcBef>
+              <a:buFont typeface="Arial"/>
+              <a:buNone/>
+              <a:defRPr sz="1200" kern="1200">
+                <a:solidFill>
+                  <a:schemeClr val="tx1"/>
+                </a:solidFill>
+                <a:latin typeface="+mn-lt"/>
+                <a:ea typeface="+mn-ea"/>
+                <a:cs typeface="+mn-cs"/>
+              </a:defRPr>
+            </a:lvl3pPr>
+            <a:lvl4pPr marL="1371600" indent="0" algn="l" defTabSz="914400" rtl="0" eaLnBrk="1" latinLnBrk="0" hangingPunct="1">
+              <a:lnSpc>
+                <a:spcPct val="90000"/>
+              </a:lnSpc>
+              <a:spcBef>
+                <a:spcPts val="500"/>
+              </a:spcBef>
+              <a:buFont typeface="Arial"/>
+              <a:buNone/>
+              <a:defRPr sz="1000" kern="1200">
+                <a:solidFill>
+                  <a:schemeClr val="tx1"/>
+                </a:solidFill>
+                <a:latin typeface="+mn-lt"/>
+                <a:ea typeface="+mn-ea"/>
+                <a:cs typeface="+mn-cs"/>
+              </a:defRPr>
+            </a:lvl4pPr>
+            <a:lvl5pPr marL="1828800" indent="0" algn="l" defTabSz="914400" rtl="0" eaLnBrk="1" latinLnBrk="0" hangingPunct="1">
+              <a:lnSpc>
+                <a:spcPct val="90000"/>
+              </a:lnSpc>
+              <a:spcBef>
+                <a:spcPts val="500"/>
+              </a:spcBef>
+              <a:buFont typeface="Arial"/>
+              <a:buNone/>
+              <a:defRPr sz="1000" kern="1200">
+                <a:solidFill>
+                  <a:schemeClr val="tx1"/>
+                </a:solidFill>
+                <a:latin typeface="+mn-lt"/>
+                <a:ea typeface="+mn-ea"/>
+                <a:cs typeface="+mn-cs"/>
+              </a:defRPr>
+            </a:lvl5pPr>
+            <a:lvl6pPr marL="2286000" indent="0" algn="l" defTabSz="914400" rtl="0" eaLnBrk="1" latinLnBrk="0" hangingPunct="1">
+              <a:lnSpc>
+                <a:spcPct val="90000"/>
+              </a:lnSpc>
+              <a:spcBef>
+                <a:spcPts val="500"/>
+              </a:spcBef>
+              <a:buFont typeface="Arial"/>
+              <a:buNone/>
+              <a:defRPr sz="1000" kern="1200">
+                <a:solidFill>
+                  <a:schemeClr val="tx1"/>
+                </a:solidFill>
+                <a:latin typeface="+mn-lt"/>
+                <a:ea typeface="+mn-ea"/>
+                <a:cs typeface="+mn-cs"/>
+              </a:defRPr>
+            </a:lvl6pPr>
+            <a:lvl7pPr marL="2743200" indent="0" algn="l" defTabSz="914400" rtl="0" eaLnBrk="1" latinLnBrk="0" hangingPunct="1">
+              <a:lnSpc>
+                <a:spcPct val="90000"/>
+              </a:lnSpc>
+              <a:spcBef>
+                <a:spcPts val="500"/>
+              </a:spcBef>
+              <a:buFont typeface="Arial"/>
+              <a:buNone/>
+              <a:defRPr sz="1000" kern="1200">
+                <a:solidFill>
+                  <a:schemeClr val="tx1"/>
+                </a:solidFill>
+                <a:latin typeface="+mn-lt"/>
+                <a:ea typeface="+mn-ea"/>
+                <a:cs typeface="+mn-cs"/>
+              </a:defRPr>
+            </a:lvl7pPr>
+            <a:lvl8pPr marL="3200400" indent="0" algn="l" defTabSz="914400" rtl="0" eaLnBrk="1" latinLnBrk="0" hangingPunct="1">
+              <a:lnSpc>
+                <a:spcPct val="90000"/>
+              </a:lnSpc>
+              <a:spcBef>
+                <a:spcPts val="500"/>
+              </a:spcBef>
+              <a:buFont typeface="Arial"/>
+              <a:buNone/>
+              <a:defRPr sz="1000" kern="1200">
+                <a:solidFill>
+                  <a:schemeClr val="tx1"/>
+                </a:solidFill>
+                <a:latin typeface="+mn-lt"/>
+                <a:ea typeface="+mn-ea"/>
+                <a:cs typeface="+mn-cs"/>
+              </a:defRPr>
+            </a:lvl8pPr>
+            <a:lvl9pPr marL="3657600" indent="0" algn="l" defTabSz="914400" rtl="0" eaLnBrk="1" latinLnBrk="0" hangingPunct="1">
+              <a:lnSpc>
+                <a:spcPct val="90000"/>
+              </a:lnSpc>
+              <a:spcBef>
+                <a:spcPts val="500"/>
+              </a:spcBef>
+              <a:buFont typeface="Arial"/>
+              <a:buNone/>
+              <a:defRPr sz="1000" kern="1200">
+                <a:solidFill>
+                  <a:schemeClr val="tx1"/>
+                </a:solidFill>
+                <a:latin typeface="+mn-lt"/>
+                <a:ea typeface="+mn-ea"/>
+                <a:cs typeface="+mn-cs"/>
+              </a:defRPr>
+            </a:lvl9pPr>
+          </a:lstStyle>
+          <a:p>
+            <a:r>
+              <a:rPr lang="en-US" dirty="0" smtClean="0"/>
+              <a:t>whenever possible try to publicize your extension’s code in a public </a:t>
+            </a:r>
+            <a:r>
+              <a:rPr lang="en-US" dirty="0" err="1" smtClean="0"/>
+              <a:t>Git</a:t>
+            </a:r>
+            <a:r>
+              <a:rPr lang="en-US" dirty="0" smtClean="0"/>
+              <a:t> repository and include the repository’s URL in your </a:t>
+            </a:r>
+            <a:r>
+              <a:rPr lang="en-US" dirty="0" err="1" smtClean="0"/>
+              <a:t>package.json</a:t>
+            </a:r>
+            <a:r>
+              <a:rPr lang="en-US" dirty="0" smtClean="0"/>
+              <a:t> file</a:t>
+            </a:r>
+            <a:endParaRPr lang="en-US" dirty="0" smtClean="0"/>
+          </a:p>
+        </p:txBody>
+      </p:sp>
+      <p:sp>
+        <p:nvSpPr>
+          <p:cNvPr id="10" name="Title 1"/>
+          <p:cNvSpPr txBox="1">
+            <a:spLocks/>
+          </p:cNvSpPr>
+          <p:nvPr/>
+        </p:nvSpPr>
+        <p:spPr>
+          <a:xfrm>
+            <a:off x="6718452" y="2764409"/>
+            <a:ext cx="4826841" cy="1600200"/>
+          </a:xfrm>
+          <a:prstGeom prst="rect">
+            <a:avLst/>
+          </a:prstGeom>
+        </p:spPr>
+        <p:txBody>
+          <a:bodyPr vert="horz" lIns="91440" tIns="45720" rIns="91440" bIns="45720" rtlCol="0" anchor="b">
+            <a:normAutofit/>
+          </a:bodyPr>
+          <a:lstStyle>
+            <a:lvl1pPr algn="l" defTabSz="914400" rtl="0" eaLnBrk="1" latinLnBrk="0" hangingPunct="1">
+              <a:lnSpc>
+                <a:spcPct val="90000"/>
+              </a:lnSpc>
+              <a:spcBef>
+                <a:spcPct val="0"/>
+              </a:spcBef>
+              <a:buNone/>
+              <a:defRPr sz="3200" kern="1200">
+                <a:solidFill>
+                  <a:schemeClr val="tx1"/>
+                </a:solidFill>
+                <a:latin typeface="+mj-lt"/>
+                <a:ea typeface="+mj-ea"/>
+                <a:cs typeface="+mj-cs"/>
+              </a:defRPr>
+            </a:lvl1pPr>
+          </a:lstStyle>
+          <a:p>
+            <a:r>
+              <a:rPr lang="en-US" dirty="0" smtClean="0"/>
+              <a:t>data-drive feature decisions</a:t>
+            </a:r>
+            <a:endParaRPr lang="en-US" dirty="0" smtClean="0"/>
+          </a:p>
+        </p:txBody>
+      </p:sp>
+      <p:sp>
+        <p:nvSpPr>
+          <p:cNvPr id="11" name="Text Placeholder 3"/>
+          <p:cNvSpPr txBox="1">
+            <a:spLocks/>
+          </p:cNvSpPr>
+          <p:nvPr/>
+        </p:nvSpPr>
+        <p:spPr>
+          <a:xfrm>
+            <a:off x="6718452" y="4364609"/>
+            <a:ext cx="3932237" cy="3811588"/>
+          </a:xfrm>
+          <a:prstGeom prst="rect">
+            <a:avLst/>
+          </a:prstGeom>
+        </p:spPr>
+        <p:txBody>
+          <a:bodyPr vert="horz" lIns="91440" tIns="45720" rIns="91440" bIns="45720" rtlCol="0">
+            <a:normAutofit/>
+          </a:bodyPr>
+          <a:lstStyle>
+            <a:lvl1pPr marL="0" indent="0" algn="l" defTabSz="914400" rtl="0" eaLnBrk="1" latinLnBrk="0" hangingPunct="1">
+              <a:lnSpc>
+                <a:spcPct val="90000"/>
+              </a:lnSpc>
+              <a:spcBef>
+                <a:spcPts val="1000"/>
+              </a:spcBef>
+              <a:buFont typeface="Arial"/>
+              <a:buNone/>
+              <a:defRPr sz="1600" kern="1200">
+                <a:solidFill>
+                  <a:schemeClr val="tx1"/>
+                </a:solidFill>
+                <a:latin typeface="+mn-lt"/>
+                <a:ea typeface="+mn-ea"/>
+                <a:cs typeface="+mn-cs"/>
+              </a:defRPr>
+            </a:lvl1pPr>
+            <a:lvl2pPr marL="457200" indent="0" algn="l" defTabSz="914400" rtl="0" eaLnBrk="1" latinLnBrk="0" hangingPunct="1">
+              <a:lnSpc>
+                <a:spcPct val="90000"/>
+              </a:lnSpc>
+              <a:spcBef>
+                <a:spcPts val="500"/>
+              </a:spcBef>
+              <a:buFont typeface="Arial"/>
+              <a:buNone/>
+              <a:defRPr sz="1400" kern="1200">
+                <a:solidFill>
+                  <a:schemeClr val="tx1"/>
+                </a:solidFill>
+                <a:latin typeface="+mn-lt"/>
+                <a:ea typeface="+mn-ea"/>
+                <a:cs typeface="+mn-cs"/>
+              </a:defRPr>
+            </a:lvl2pPr>
+            <a:lvl3pPr marL="914400" indent="0" algn="l" defTabSz="914400" rtl="0" eaLnBrk="1" latinLnBrk="0" hangingPunct="1">
+              <a:lnSpc>
+                <a:spcPct val="90000"/>
+              </a:lnSpc>
+              <a:spcBef>
+                <a:spcPts val="500"/>
+              </a:spcBef>
+              <a:buFont typeface="Arial"/>
+              <a:buNone/>
+              <a:defRPr sz="1200" kern="1200">
+                <a:solidFill>
+                  <a:schemeClr val="tx1"/>
+                </a:solidFill>
+                <a:latin typeface="+mn-lt"/>
+                <a:ea typeface="+mn-ea"/>
+                <a:cs typeface="+mn-cs"/>
+              </a:defRPr>
+            </a:lvl3pPr>
+            <a:lvl4pPr marL="1371600" indent="0" algn="l" defTabSz="914400" rtl="0" eaLnBrk="1" latinLnBrk="0" hangingPunct="1">
+              <a:lnSpc>
+                <a:spcPct val="90000"/>
+              </a:lnSpc>
+              <a:spcBef>
+                <a:spcPts val="500"/>
+              </a:spcBef>
+              <a:buFont typeface="Arial"/>
+              <a:buNone/>
+              <a:defRPr sz="1000" kern="1200">
+                <a:solidFill>
+                  <a:schemeClr val="tx1"/>
+                </a:solidFill>
+                <a:latin typeface="+mn-lt"/>
+                <a:ea typeface="+mn-ea"/>
+                <a:cs typeface="+mn-cs"/>
+              </a:defRPr>
+            </a:lvl4pPr>
+            <a:lvl5pPr marL="1828800" indent="0" algn="l" defTabSz="914400" rtl="0" eaLnBrk="1" latinLnBrk="0" hangingPunct="1">
+              <a:lnSpc>
+                <a:spcPct val="90000"/>
+              </a:lnSpc>
+              <a:spcBef>
+                <a:spcPts val="500"/>
+              </a:spcBef>
+              <a:buFont typeface="Arial"/>
+              <a:buNone/>
+              <a:defRPr sz="1000" kern="1200">
+                <a:solidFill>
+                  <a:schemeClr val="tx1"/>
+                </a:solidFill>
+                <a:latin typeface="+mn-lt"/>
+                <a:ea typeface="+mn-ea"/>
+                <a:cs typeface="+mn-cs"/>
+              </a:defRPr>
+            </a:lvl5pPr>
+            <a:lvl6pPr marL="2286000" indent="0" algn="l" defTabSz="914400" rtl="0" eaLnBrk="1" latinLnBrk="0" hangingPunct="1">
+              <a:lnSpc>
+                <a:spcPct val="90000"/>
+              </a:lnSpc>
+              <a:spcBef>
+                <a:spcPts val="500"/>
+              </a:spcBef>
+              <a:buFont typeface="Arial"/>
+              <a:buNone/>
+              <a:defRPr sz="1000" kern="1200">
+                <a:solidFill>
+                  <a:schemeClr val="tx1"/>
+                </a:solidFill>
+                <a:latin typeface="+mn-lt"/>
+                <a:ea typeface="+mn-ea"/>
+                <a:cs typeface="+mn-cs"/>
+              </a:defRPr>
+            </a:lvl6pPr>
+            <a:lvl7pPr marL="2743200" indent="0" algn="l" defTabSz="914400" rtl="0" eaLnBrk="1" latinLnBrk="0" hangingPunct="1">
+              <a:lnSpc>
+                <a:spcPct val="90000"/>
+              </a:lnSpc>
+              <a:spcBef>
+                <a:spcPts val="500"/>
+              </a:spcBef>
+              <a:buFont typeface="Arial"/>
+              <a:buNone/>
+              <a:defRPr sz="1000" kern="1200">
+                <a:solidFill>
+                  <a:schemeClr val="tx1"/>
+                </a:solidFill>
+                <a:latin typeface="+mn-lt"/>
+                <a:ea typeface="+mn-ea"/>
+                <a:cs typeface="+mn-cs"/>
+              </a:defRPr>
+            </a:lvl7pPr>
+            <a:lvl8pPr marL="3200400" indent="0" algn="l" defTabSz="914400" rtl="0" eaLnBrk="1" latinLnBrk="0" hangingPunct="1">
+              <a:lnSpc>
+                <a:spcPct val="90000"/>
+              </a:lnSpc>
+              <a:spcBef>
+                <a:spcPts val="500"/>
+              </a:spcBef>
+              <a:buFont typeface="Arial"/>
+              <a:buNone/>
+              <a:defRPr sz="1000" kern="1200">
+                <a:solidFill>
+                  <a:schemeClr val="tx1"/>
+                </a:solidFill>
+                <a:latin typeface="+mn-lt"/>
+                <a:ea typeface="+mn-ea"/>
+                <a:cs typeface="+mn-cs"/>
+              </a:defRPr>
+            </a:lvl8pPr>
+            <a:lvl9pPr marL="3657600" indent="0" algn="l" defTabSz="914400" rtl="0" eaLnBrk="1" latinLnBrk="0" hangingPunct="1">
+              <a:lnSpc>
+                <a:spcPct val="90000"/>
+              </a:lnSpc>
+              <a:spcBef>
+                <a:spcPts val="500"/>
+              </a:spcBef>
+              <a:buFont typeface="Arial"/>
+              <a:buNone/>
+              <a:defRPr sz="1000" kern="1200">
+                <a:solidFill>
+                  <a:schemeClr val="tx1"/>
+                </a:solidFill>
+                <a:latin typeface="+mn-lt"/>
+                <a:ea typeface="+mn-ea"/>
+                <a:cs typeface="+mn-cs"/>
+              </a:defRPr>
+            </a:lvl9pPr>
+          </a:lstStyle>
+          <a:p>
+            <a:r>
+              <a:rPr lang="en-US" dirty="0" smtClean="0"/>
+              <a:t>use telemetry wisely to understand how customers are using your feature and frequently review that telemetry to understand where problem areas exist</a:t>
+            </a:r>
+            <a:endParaRPr lang="en-US" dirty="0" smtClean="0"/>
+          </a:p>
+        </p:txBody>
+      </p:sp>
+      <p:sp>
+        <p:nvSpPr>
+          <p:cNvPr id="14" name="Title 3"/>
+          <p:cNvSpPr txBox="1">
+            <a:spLocks/>
+          </p:cNvSpPr>
+          <p:nvPr/>
+        </p:nvSpPr>
+        <p:spPr>
+          <a:xfrm>
+            <a:off x="838200" y="57462"/>
+            <a:ext cx="10515600" cy="1325563"/>
+          </a:xfrm>
+          <a:prstGeom prst="rect">
+            <a:avLst/>
+          </a:prstGeom>
+        </p:spPr>
+        <p:txBody>
+          <a:bodyPr vert="horz" lIns="91440" tIns="45720" rIns="91440" bIns="45720" rtlCol="0" anchor="b">
+            <a:normAutofit/>
+          </a:bodyPr>
+          <a:lstStyle>
+            <a:lvl1pPr algn="l" defTabSz="914400" rtl="0" eaLnBrk="1" latinLnBrk="0" hangingPunct="1">
+              <a:lnSpc>
+                <a:spcPct val="90000"/>
+              </a:lnSpc>
+              <a:spcBef>
+                <a:spcPct val="0"/>
+              </a:spcBef>
+              <a:buNone/>
+              <a:defRPr sz="3200" kern="1200">
+                <a:solidFill>
+                  <a:schemeClr val="tx1"/>
+                </a:solidFill>
+                <a:latin typeface="+mj-lt"/>
+                <a:ea typeface="+mj-ea"/>
+                <a:cs typeface="+mj-cs"/>
+              </a:defRPr>
+            </a:lvl1pPr>
+          </a:lstStyle>
+          <a:p>
+            <a:r>
+              <a:rPr lang="en-US" sz="4400" dirty="0" smtClean="0"/>
+              <a:t>design considerations</a:t>
+            </a:r>
+            <a:endParaRPr lang="en-US" sz="4400" dirty="0" smtClean="0"/>
+          </a:p>
+        </p:txBody>
+      </p:sp>
+    </p:spTree>
+    <p:extLst>
+      <p:ext uri="{BB962C8B-B14F-4D97-AF65-F5344CB8AC3E}">
+        <p14:creationId xmlns:p14="http://schemas.microsoft.com/office/powerpoint/2010/main" val="14291601"/>
+      </p:ext>
+    </p:extLst>
+  </p:cSld>
+  <p:clrMapOvr>
+    <a:masterClrMapping/>
+  </p:clrMapOvr>
+  <p:timing>
+    <p:tnLst>
+      <p:par>
+        <p:cTn id="1" dur="indefinite" restart="never" nodeType="tmRoot">
+          <p:childTnLst>
+            <p:seq concurrent="1" nextAc="seek">
+              <p:cTn id="2" dur="indefinite" nodeType="mainSeq">
+                <p:childTnLst>
+                  <p:par>
+                    <p:cTn id="3" fill="hold">
+                      <p:stCondLst>
+                        <p:cond delay="indefinite"/>
+                      </p:stCondLst>
+                      <p:childTnLst>
+                        <p:par>
+                          <p:cTn id="4" fill="hold">
+                            <p:stCondLst>
+                              <p:cond delay="0"/>
+                            </p:stCondLst>
+                            <p:childTnLst>
+                              <p:par>
+                                <p:cTn id="5" presetID="2" presetClass="entr" presetSubtype="4" fill="hold" grpId="0" nodeType="clickEffect">
+                                  <p:stCondLst>
+                                    <p:cond delay="0"/>
+                                  </p:stCondLst>
+                                  <p:childTnLst>
+                                    <p:set>
+                                      <p:cBhvr>
+                                        <p:cTn id="6" dur="1" fill="hold">
+                                          <p:stCondLst>
+                                            <p:cond delay="0"/>
+                                          </p:stCondLst>
+                                        </p:cTn>
+                                        <p:tgtEl>
+                                          <p:spTgt spid="2"/>
+                                        </p:tgtEl>
+                                        <p:attrNameLst>
+                                          <p:attrName>style.visibility</p:attrName>
+                                        </p:attrNameLst>
+                                      </p:cBhvr>
+                                      <p:to>
+                                        <p:strVal val="visible"/>
+                                      </p:to>
+                                    </p:set>
+                                    <p:anim calcmode="lin" valueType="num">
+                                      <p:cBhvr additive="base">
+                                        <p:cTn id="7" dur="500" fill="hold"/>
+                                        <p:tgtEl>
+                                          <p:spTgt spid="2"/>
+                                        </p:tgtEl>
+                                        <p:attrNameLst>
+                                          <p:attrName>ppt_x</p:attrName>
+                                        </p:attrNameLst>
+                                      </p:cBhvr>
+                                      <p:tavLst>
+                                        <p:tav tm="0">
+                                          <p:val>
+                                            <p:strVal val="#ppt_x"/>
+                                          </p:val>
+                                        </p:tav>
+                                        <p:tav tm="100000">
+                                          <p:val>
+                                            <p:strVal val="#ppt_x"/>
+                                          </p:val>
+                                        </p:tav>
+                                      </p:tavLst>
+                                    </p:anim>
+                                    <p:anim calcmode="lin" valueType="num">
+                                      <p:cBhvr additive="base">
+                                        <p:cTn id="8" dur="500" fill="hold"/>
+                                        <p:tgtEl>
+                                          <p:spTgt spid="2"/>
+                                        </p:tgtEl>
+                                        <p:attrNameLst>
+                                          <p:attrName>ppt_y</p:attrName>
+                                        </p:attrNameLst>
+                                      </p:cBhvr>
+                                      <p:tavLst>
+                                        <p:tav tm="0">
+                                          <p:val>
+                                            <p:strVal val="1+#ppt_h/2"/>
+                                          </p:val>
+                                        </p:tav>
+                                        <p:tav tm="100000">
+                                          <p:val>
+                                            <p:strVal val="#ppt_y"/>
+                                          </p:val>
+                                        </p:tav>
+                                      </p:tavLst>
+                                    </p:anim>
+                                  </p:childTnLst>
+                                </p:cTn>
+                              </p:par>
+                              <p:par>
+                                <p:cTn id="9" presetID="2" presetClass="entr" presetSubtype="4" fill="hold" grpId="0" nodeType="withEffect">
+                                  <p:stCondLst>
+                                    <p:cond delay="0"/>
+                                  </p:stCondLst>
+                                  <p:childTnLst>
+                                    <p:set>
+                                      <p:cBhvr>
+                                        <p:cTn id="10" dur="1" fill="hold">
+                                          <p:stCondLst>
+                                            <p:cond delay="0"/>
+                                          </p:stCondLst>
+                                        </p:cTn>
+                                        <p:tgtEl>
+                                          <p:spTgt spid="4">
+                                            <p:txEl>
+                                              <p:pRg st="0" end="0"/>
+                                            </p:txEl>
+                                          </p:spTgt>
+                                        </p:tgtEl>
+                                        <p:attrNameLst>
+                                          <p:attrName>style.visibility</p:attrName>
+                                        </p:attrNameLst>
+                                      </p:cBhvr>
+                                      <p:to>
+                                        <p:strVal val="visible"/>
+                                      </p:to>
+                                    </p:set>
+                                    <p:anim calcmode="lin" valueType="num">
+                                      <p:cBhvr additive="base">
+                                        <p:cTn id="11" dur="500" fill="hold"/>
+                                        <p:tgtEl>
+                                          <p:spTgt spid="4">
+                                            <p:txEl>
+                                              <p:pRg st="0" end="0"/>
+                                            </p:txEl>
+                                          </p:spTgt>
+                                        </p:tgtEl>
+                                        <p:attrNameLst>
+                                          <p:attrName>ppt_x</p:attrName>
+                                        </p:attrNameLst>
+                                      </p:cBhvr>
+                                      <p:tavLst>
+                                        <p:tav tm="0">
+                                          <p:val>
+                                            <p:strVal val="#ppt_x"/>
+                                          </p:val>
+                                        </p:tav>
+                                        <p:tav tm="100000">
+                                          <p:val>
+                                            <p:strVal val="#ppt_x"/>
+                                          </p:val>
+                                        </p:tav>
+                                      </p:tavLst>
+                                    </p:anim>
+                                    <p:anim calcmode="lin" valueType="num">
+                                      <p:cBhvr additive="base">
+                                        <p:cTn id="12" dur="500" fill="hold"/>
+                                        <p:tgtEl>
+                                          <p:spTgt spid="4">
+                                            <p:txEl>
+                                              <p:pRg st="0" end="0"/>
+                                            </p:txEl>
+                                          </p:spTgt>
+                                        </p:tgtEl>
+                                        <p:attrNameLst>
+                                          <p:attrName>ppt_y</p:attrName>
+                                        </p:attrNameLst>
+                                      </p:cBhvr>
+                                      <p:tavLst>
+                                        <p:tav tm="0">
+                                          <p:val>
+                                            <p:strVal val="1+#ppt_h/2"/>
+                                          </p:val>
+                                        </p:tav>
+                                        <p:tav tm="100000">
+                                          <p:val>
+                                            <p:strVal val="#ppt_y"/>
+                                          </p:val>
+                                        </p:tav>
+                                      </p:tavLst>
+                                    </p:anim>
+                                  </p:childTnLst>
+                                </p:cTn>
+                              </p:par>
+                            </p:childTnLst>
+                          </p:cTn>
+                        </p:par>
+                      </p:childTnLst>
+                    </p:cTn>
+                  </p:par>
+                  <p:par>
+                    <p:cTn id="13" fill="hold">
+                      <p:stCondLst>
+                        <p:cond delay="indefinite"/>
+                      </p:stCondLst>
+                      <p:childTnLst>
+                        <p:par>
+                          <p:cTn id="14" fill="hold">
+                            <p:stCondLst>
+                              <p:cond delay="0"/>
+                            </p:stCondLst>
+                            <p:childTnLst>
+                              <p:par>
+                                <p:cTn id="15" presetID="2" presetClass="entr" presetSubtype="4" fill="hold" grpId="0" nodeType="clickEffect">
+                                  <p:stCondLst>
+                                    <p:cond delay="0"/>
+                                  </p:stCondLst>
+                                  <p:childTnLst>
+                                    <p:set>
+                                      <p:cBhvr>
+                                        <p:cTn id="16" dur="1" fill="hold">
+                                          <p:stCondLst>
+                                            <p:cond delay="0"/>
+                                          </p:stCondLst>
+                                        </p:cTn>
+                                        <p:tgtEl>
+                                          <p:spTgt spid="6"/>
+                                        </p:tgtEl>
+                                        <p:attrNameLst>
+                                          <p:attrName>style.visibility</p:attrName>
+                                        </p:attrNameLst>
+                                      </p:cBhvr>
+                                      <p:to>
+                                        <p:strVal val="visible"/>
+                                      </p:to>
+                                    </p:set>
+                                    <p:anim calcmode="lin" valueType="num">
+                                      <p:cBhvr additive="base">
+                                        <p:cTn id="17" dur="500" fill="hold"/>
+                                        <p:tgtEl>
+                                          <p:spTgt spid="6"/>
+                                        </p:tgtEl>
+                                        <p:attrNameLst>
+                                          <p:attrName>ppt_x</p:attrName>
+                                        </p:attrNameLst>
+                                      </p:cBhvr>
+                                      <p:tavLst>
+                                        <p:tav tm="0">
+                                          <p:val>
+                                            <p:strVal val="#ppt_x"/>
+                                          </p:val>
+                                        </p:tav>
+                                        <p:tav tm="100000">
+                                          <p:val>
+                                            <p:strVal val="#ppt_x"/>
+                                          </p:val>
+                                        </p:tav>
+                                      </p:tavLst>
+                                    </p:anim>
+                                    <p:anim calcmode="lin" valueType="num">
+                                      <p:cBhvr additive="base">
+                                        <p:cTn id="18" dur="500" fill="hold"/>
+                                        <p:tgtEl>
+                                          <p:spTgt spid="6"/>
+                                        </p:tgtEl>
+                                        <p:attrNameLst>
+                                          <p:attrName>ppt_y</p:attrName>
+                                        </p:attrNameLst>
+                                      </p:cBhvr>
+                                      <p:tavLst>
+                                        <p:tav tm="0">
+                                          <p:val>
+                                            <p:strVal val="1+#ppt_h/2"/>
+                                          </p:val>
+                                        </p:tav>
+                                        <p:tav tm="100000">
+                                          <p:val>
+                                            <p:strVal val="#ppt_y"/>
+                                          </p:val>
+                                        </p:tav>
+                                      </p:tavLst>
+                                    </p:anim>
+                                  </p:childTnLst>
+                                </p:cTn>
+                              </p:par>
+                              <p:par>
+                                <p:cTn id="19" presetID="2" presetClass="entr" presetSubtype="4" fill="hold" grpId="0" nodeType="withEffect">
+                                  <p:stCondLst>
+                                    <p:cond delay="0"/>
+                                  </p:stCondLst>
+                                  <p:childTnLst>
+                                    <p:set>
+                                      <p:cBhvr>
+                                        <p:cTn id="20" dur="1" fill="hold">
+                                          <p:stCondLst>
+                                            <p:cond delay="0"/>
+                                          </p:stCondLst>
+                                        </p:cTn>
+                                        <p:tgtEl>
+                                          <p:spTgt spid="7"/>
+                                        </p:tgtEl>
+                                        <p:attrNameLst>
+                                          <p:attrName>style.visibility</p:attrName>
+                                        </p:attrNameLst>
+                                      </p:cBhvr>
+                                      <p:to>
+                                        <p:strVal val="visible"/>
+                                      </p:to>
+                                    </p:set>
+                                    <p:anim calcmode="lin" valueType="num">
+                                      <p:cBhvr additive="base">
+                                        <p:cTn id="21" dur="500" fill="hold"/>
+                                        <p:tgtEl>
+                                          <p:spTgt spid="7"/>
+                                        </p:tgtEl>
+                                        <p:attrNameLst>
+                                          <p:attrName>ppt_x</p:attrName>
+                                        </p:attrNameLst>
+                                      </p:cBhvr>
+                                      <p:tavLst>
+                                        <p:tav tm="0">
+                                          <p:val>
+                                            <p:strVal val="#ppt_x"/>
+                                          </p:val>
+                                        </p:tav>
+                                        <p:tav tm="100000">
+                                          <p:val>
+                                            <p:strVal val="#ppt_x"/>
+                                          </p:val>
+                                        </p:tav>
+                                      </p:tavLst>
+                                    </p:anim>
+                                    <p:anim calcmode="lin" valueType="num">
+                                      <p:cBhvr additive="base">
+                                        <p:cTn id="22" dur="500" fill="hold"/>
+                                        <p:tgtEl>
+                                          <p:spTgt spid="7"/>
+                                        </p:tgtEl>
+                                        <p:attrNameLst>
+                                          <p:attrName>ppt_y</p:attrName>
+                                        </p:attrNameLst>
+                                      </p:cBhvr>
+                                      <p:tavLst>
+                                        <p:tav tm="0">
+                                          <p:val>
+                                            <p:strVal val="1+#ppt_h/2"/>
+                                          </p:val>
+                                        </p:tav>
+                                        <p:tav tm="100000">
+                                          <p:val>
+                                            <p:strVal val="#ppt_y"/>
+                                          </p:val>
+                                        </p:tav>
+                                      </p:tavLst>
+                                    </p:anim>
+                                  </p:childTnLst>
+                                </p:cTn>
+                              </p:par>
+                            </p:childTnLst>
+                          </p:cTn>
+                        </p:par>
+                      </p:childTnLst>
+                    </p:cTn>
+                  </p:par>
+                  <p:par>
+                    <p:cTn id="23" fill="hold">
+                      <p:stCondLst>
+                        <p:cond delay="indefinite"/>
+                      </p:stCondLst>
+                      <p:childTnLst>
+                        <p:par>
+                          <p:cTn id="24" fill="hold">
+                            <p:stCondLst>
+                              <p:cond delay="0"/>
+                            </p:stCondLst>
+                            <p:childTnLst>
+                              <p:par>
+                                <p:cTn id="25" presetID="2" presetClass="entr" presetSubtype="4" fill="hold" grpId="0" nodeType="clickEffect">
+                                  <p:stCondLst>
+                                    <p:cond delay="0"/>
+                                  </p:stCondLst>
+                                  <p:childTnLst>
+                                    <p:set>
+                                      <p:cBhvr>
+                                        <p:cTn id="26" dur="1" fill="hold">
+                                          <p:stCondLst>
+                                            <p:cond delay="0"/>
+                                          </p:stCondLst>
+                                        </p:cTn>
+                                        <p:tgtEl>
+                                          <p:spTgt spid="8"/>
+                                        </p:tgtEl>
+                                        <p:attrNameLst>
+                                          <p:attrName>style.visibility</p:attrName>
+                                        </p:attrNameLst>
+                                      </p:cBhvr>
+                                      <p:to>
+                                        <p:strVal val="visible"/>
+                                      </p:to>
+                                    </p:set>
+                                    <p:anim calcmode="lin" valueType="num">
+                                      <p:cBhvr additive="base">
+                                        <p:cTn id="27" dur="500" fill="hold"/>
+                                        <p:tgtEl>
+                                          <p:spTgt spid="8"/>
+                                        </p:tgtEl>
+                                        <p:attrNameLst>
+                                          <p:attrName>ppt_x</p:attrName>
+                                        </p:attrNameLst>
+                                      </p:cBhvr>
+                                      <p:tavLst>
+                                        <p:tav tm="0">
+                                          <p:val>
+                                            <p:strVal val="#ppt_x"/>
+                                          </p:val>
+                                        </p:tav>
+                                        <p:tav tm="100000">
+                                          <p:val>
+                                            <p:strVal val="#ppt_x"/>
+                                          </p:val>
+                                        </p:tav>
+                                      </p:tavLst>
+                                    </p:anim>
+                                    <p:anim calcmode="lin" valueType="num">
+                                      <p:cBhvr additive="base">
+                                        <p:cTn id="28" dur="500" fill="hold"/>
+                                        <p:tgtEl>
+                                          <p:spTgt spid="8"/>
+                                        </p:tgtEl>
+                                        <p:attrNameLst>
+                                          <p:attrName>ppt_y</p:attrName>
+                                        </p:attrNameLst>
+                                      </p:cBhvr>
+                                      <p:tavLst>
+                                        <p:tav tm="0">
+                                          <p:val>
+                                            <p:strVal val="1+#ppt_h/2"/>
+                                          </p:val>
+                                        </p:tav>
+                                        <p:tav tm="100000">
+                                          <p:val>
+                                            <p:strVal val="#ppt_y"/>
+                                          </p:val>
+                                        </p:tav>
+                                      </p:tavLst>
+                                    </p:anim>
+                                  </p:childTnLst>
+                                </p:cTn>
+                              </p:par>
+                              <p:par>
+                                <p:cTn id="29" presetID="2" presetClass="entr" presetSubtype="4" fill="hold" grpId="0" nodeType="withEffect">
+                                  <p:stCondLst>
+                                    <p:cond delay="0"/>
+                                  </p:stCondLst>
+                                  <p:childTnLst>
+                                    <p:set>
+                                      <p:cBhvr>
+                                        <p:cTn id="30" dur="1" fill="hold">
+                                          <p:stCondLst>
+                                            <p:cond delay="0"/>
+                                          </p:stCondLst>
+                                        </p:cTn>
+                                        <p:tgtEl>
+                                          <p:spTgt spid="9"/>
+                                        </p:tgtEl>
+                                        <p:attrNameLst>
+                                          <p:attrName>style.visibility</p:attrName>
+                                        </p:attrNameLst>
+                                      </p:cBhvr>
+                                      <p:to>
+                                        <p:strVal val="visible"/>
+                                      </p:to>
+                                    </p:set>
+                                    <p:anim calcmode="lin" valueType="num">
+                                      <p:cBhvr additive="base">
+                                        <p:cTn id="31" dur="500" fill="hold"/>
+                                        <p:tgtEl>
+                                          <p:spTgt spid="9"/>
+                                        </p:tgtEl>
+                                        <p:attrNameLst>
+                                          <p:attrName>ppt_x</p:attrName>
+                                        </p:attrNameLst>
+                                      </p:cBhvr>
+                                      <p:tavLst>
+                                        <p:tav tm="0">
+                                          <p:val>
+                                            <p:strVal val="#ppt_x"/>
+                                          </p:val>
+                                        </p:tav>
+                                        <p:tav tm="100000">
+                                          <p:val>
+                                            <p:strVal val="#ppt_x"/>
+                                          </p:val>
+                                        </p:tav>
+                                      </p:tavLst>
+                                    </p:anim>
+                                    <p:anim calcmode="lin" valueType="num">
+                                      <p:cBhvr additive="base">
+                                        <p:cTn id="32" dur="500" fill="hold"/>
+                                        <p:tgtEl>
+                                          <p:spTgt spid="9"/>
+                                        </p:tgtEl>
+                                        <p:attrNameLst>
+                                          <p:attrName>ppt_y</p:attrName>
+                                        </p:attrNameLst>
+                                      </p:cBhvr>
+                                      <p:tavLst>
+                                        <p:tav tm="0">
+                                          <p:val>
+                                            <p:strVal val="1+#ppt_h/2"/>
+                                          </p:val>
+                                        </p:tav>
+                                        <p:tav tm="100000">
+                                          <p:val>
+                                            <p:strVal val="#ppt_y"/>
+                                          </p:val>
+                                        </p:tav>
+                                      </p:tavLst>
+                                    </p:anim>
+                                  </p:childTnLst>
+                                </p:cTn>
+                              </p:par>
+                            </p:childTnLst>
+                          </p:cTn>
+                        </p:par>
+                      </p:childTnLst>
+                    </p:cTn>
+                  </p:par>
+                  <p:par>
+                    <p:cTn id="33" fill="hold">
+                      <p:stCondLst>
+                        <p:cond delay="indefinite"/>
+                      </p:stCondLst>
+                      <p:childTnLst>
+                        <p:par>
+                          <p:cTn id="34" fill="hold">
+                            <p:stCondLst>
+                              <p:cond delay="0"/>
+                            </p:stCondLst>
+                            <p:childTnLst>
+                              <p:par>
+                                <p:cTn id="35" presetID="2" presetClass="entr" presetSubtype="4" fill="hold" grpId="0" nodeType="clickEffect">
+                                  <p:stCondLst>
+                                    <p:cond delay="0"/>
+                                  </p:stCondLst>
+                                  <p:childTnLst>
+                                    <p:set>
+                                      <p:cBhvr>
+                                        <p:cTn id="36" dur="1" fill="hold">
+                                          <p:stCondLst>
+                                            <p:cond delay="0"/>
+                                          </p:stCondLst>
+                                        </p:cTn>
+                                        <p:tgtEl>
+                                          <p:spTgt spid="10"/>
+                                        </p:tgtEl>
+                                        <p:attrNameLst>
+                                          <p:attrName>style.visibility</p:attrName>
+                                        </p:attrNameLst>
+                                      </p:cBhvr>
+                                      <p:to>
+                                        <p:strVal val="visible"/>
+                                      </p:to>
+                                    </p:set>
+                                    <p:anim calcmode="lin" valueType="num">
+                                      <p:cBhvr additive="base">
+                                        <p:cTn id="37" dur="500" fill="hold"/>
+                                        <p:tgtEl>
+                                          <p:spTgt spid="10"/>
+                                        </p:tgtEl>
+                                        <p:attrNameLst>
+                                          <p:attrName>ppt_x</p:attrName>
+                                        </p:attrNameLst>
+                                      </p:cBhvr>
+                                      <p:tavLst>
+                                        <p:tav tm="0">
+                                          <p:val>
+                                            <p:strVal val="#ppt_x"/>
+                                          </p:val>
+                                        </p:tav>
+                                        <p:tav tm="100000">
+                                          <p:val>
+                                            <p:strVal val="#ppt_x"/>
+                                          </p:val>
+                                        </p:tav>
+                                      </p:tavLst>
+                                    </p:anim>
+                                    <p:anim calcmode="lin" valueType="num">
+                                      <p:cBhvr additive="base">
+                                        <p:cTn id="38" dur="500" fill="hold"/>
+                                        <p:tgtEl>
+                                          <p:spTgt spid="10"/>
+                                        </p:tgtEl>
+                                        <p:attrNameLst>
+                                          <p:attrName>ppt_y</p:attrName>
+                                        </p:attrNameLst>
+                                      </p:cBhvr>
+                                      <p:tavLst>
+                                        <p:tav tm="0">
+                                          <p:val>
+                                            <p:strVal val="1+#ppt_h/2"/>
+                                          </p:val>
+                                        </p:tav>
+                                        <p:tav tm="100000">
+                                          <p:val>
+                                            <p:strVal val="#ppt_y"/>
+                                          </p:val>
+                                        </p:tav>
+                                      </p:tavLst>
+                                    </p:anim>
+                                  </p:childTnLst>
+                                </p:cTn>
+                              </p:par>
+                              <p:par>
+                                <p:cTn id="39" presetID="2" presetClass="entr" presetSubtype="4" fill="hold" grpId="0" nodeType="withEffect">
+                                  <p:stCondLst>
+                                    <p:cond delay="0"/>
+                                  </p:stCondLst>
+                                  <p:childTnLst>
+                                    <p:set>
+                                      <p:cBhvr>
+                                        <p:cTn id="40" dur="1" fill="hold">
+                                          <p:stCondLst>
+                                            <p:cond delay="0"/>
+                                          </p:stCondLst>
+                                        </p:cTn>
+                                        <p:tgtEl>
+                                          <p:spTgt spid="11"/>
+                                        </p:tgtEl>
+                                        <p:attrNameLst>
+                                          <p:attrName>style.visibility</p:attrName>
+                                        </p:attrNameLst>
+                                      </p:cBhvr>
+                                      <p:to>
+                                        <p:strVal val="visible"/>
+                                      </p:to>
+                                    </p:set>
+                                    <p:anim calcmode="lin" valueType="num">
+                                      <p:cBhvr additive="base">
+                                        <p:cTn id="41" dur="500" fill="hold"/>
+                                        <p:tgtEl>
+                                          <p:spTgt spid="11"/>
+                                        </p:tgtEl>
+                                        <p:attrNameLst>
+                                          <p:attrName>ppt_x</p:attrName>
+                                        </p:attrNameLst>
+                                      </p:cBhvr>
+                                      <p:tavLst>
+                                        <p:tav tm="0">
+                                          <p:val>
+                                            <p:strVal val="#ppt_x"/>
+                                          </p:val>
+                                        </p:tav>
+                                        <p:tav tm="100000">
+                                          <p:val>
+                                            <p:strVal val="#ppt_x"/>
+                                          </p:val>
+                                        </p:tav>
+                                      </p:tavLst>
+                                    </p:anim>
+                                    <p:anim calcmode="lin" valueType="num">
+                                      <p:cBhvr additive="base">
+                                        <p:cTn id="42" dur="500" fill="hold"/>
+                                        <p:tgtEl>
+                                          <p:spTgt spid="11"/>
+                                        </p:tgtEl>
+                                        <p:attrNameLst>
+                                          <p:attrName>ppt_y</p:attrName>
+                                        </p:attrNameLst>
+                                      </p:cBhvr>
+                                      <p:tavLst>
+                                        <p:tav tm="0">
+                                          <p:val>
+                                            <p:strVal val="1+#ppt_h/2"/>
+                                          </p:val>
+                                        </p:tav>
+                                        <p:tav tm="100000">
+                                          <p:val>
+                                            <p:strVal val="#ppt_y"/>
+                                          </p:val>
+                                        </p:tav>
+                                      </p:tavLst>
+                                    </p:anim>
+                                  </p:childTnLst>
+                                </p:cTn>
+                              </p:par>
+                            </p:childTnLst>
+                          </p:cTn>
+                        </p:par>
+                      </p:childTnLst>
+                    </p:cTn>
+                  </p:par>
+                </p:childTnLst>
+              </p:cTn>
+              <p:prevCondLst>
+                <p:cond evt="onPrev" delay="0">
+                  <p:tgtEl>
+                    <p:sldTgt/>
+                  </p:tgtEl>
+                </p:cond>
+              </p:prevCondLst>
+              <p:nextCondLst>
+                <p:cond evt="onNext" delay="0">
+                  <p:tgtEl>
+                    <p:sldTgt/>
+                  </p:tgtEl>
+                </p:cond>
+              </p:nextCondLst>
+            </p:seq>
+          </p:childTnLst>
+        </p:cTn>
+      </p:par>
+    </p:tnLst>
+    <p:bldLst>
+      <p:bldP spid="2" grpId="0"/>
+      <p:bldP spid="4" grpId="0" build="p"/>
+      <p:bldP spid="6" grpId="0"/>
+      <p:bldP spid="7" grpId="0"/>
+      <p:bldP spid="8" grpId="0"/>
+      <p:bldP spid="9" grpId="0"/>
+      <p:bldP spid="10" grpId="0"/>
+      <p:bldP spid="11" grpId="0"/>
+    </p:bldLst>
+  </p:timing>
+</p:sld>
+</file>
+
+<file path=ppt/slides/slide19.xml><?xml version="1.0" encoding="utf-8"?>
+<p:sld xmlns:a="http://schemas.openxmlformats.org/drawingml/2006/main" xmlns:r="http://schemas.openxmlformats.org/officeDocument/2006/relationships" xmlns:p="http://schemas.openxmlformats.org/presentationml/2006/main">
+  <p:cSld>
+    <p:spTree>
+      <p:nvGrpSpPr>
+        <p:cNvPr id="1" name=""/>
+        <p:cNvGrpSpPr/>
+        <p:nvPr/>
+      </p:nvGrpSpPr>
+      <p:grpSpPr>
+        <a:xfrm>
+          <a:off x="0" y="0"/>
+          <a:ext cx="0" cy="0"/>
+          <a:chOff x="0" y="0"/>
+          <a:chExt cx="0" cy="0"/>
+        </a:xfrm>
+      </p:grpSpPr>
+      <p:sp>
+        <p:nvSpPr>
+          <p:cNvPr id="2" name="Title 1"/>
+          <p:cNvSpPr>
+            <a:spLocks noGrp="1"/>
+          </p:cNvSpPr>
+          <p:nvPr>
+            <p:ph type="title"/>
+          </p:nvPr>
+        </p:nvSpPr>
+        <p:spPr/>
+        <p:txBody>
+          <a:bodyPr/>
+          <a:lstStyle/>
+          <a:p>
+            <a:r>
+              <a:rPr lang="en-US" dirty="0" smtClean="0"/>
+              <a:t>thanks</a:t>
+            </a:r>
+            <a:endParaRPr lang="en-US" dirty="0"/>
+          </a:p>
+        </p:txBody>
+      </p:sp>
+      <p:sp>
+        <p:nvSpPr>
+          <p:cNvPr id="3" name="Text Placeholder 2"/>
+          <p:cNvSpPr>
+            <a:spLocks noGrp="1"/>
+          </p:cNvSpPr>
+          <p:nvPr>
+            <p:ph type="body" idx="1"/>
+          </p:nvPr>
+        </p:nvSpPr>
+        <p:spPr>
+          <a:xfrm>
+            <a:off x="3156667" y="3905651"/>
+            <a:ext cx="8294149" cy="1500187"/>
+          </a:xfrm>
+        </p:spPr>
+        <p:txBody>
+          <a:bodyPr/>
+          <a:lstStyle/>
+          <a:p>
+            <a:r>
+              <a:rPr lang="en-US" dirty="0" smtClean="0"/>
+              <a:t>I hope you enjoyed this journey on extending vs code together!</a:t>
+            </a:r>
+          </a:p>
+        </p:txBody>
+      </p:sp>
+    </p:spTree>
+    <p:extLst>
+      <p:ext uri="{BB962C8B-B14F-4D97-AF65-F5344CB8AC3E}">
+        <p14:creationId xmlns:p14="http://schemas.microsoft.com/office/powerpoint/2010/main" val="541267753"/>
+      </p:ext>
+    </p:extLst>
+  </p:cSld>
+  <p:clrMapOvr>
+    <a:masterClrMapping/>
+  </p:clrMapOvr>
+  <p:transition spd="slow">
+    <p:push/>
+  </p:transition>
+  <p:timing>
+    <p:tnLst>
+      <p:par>
+        <p:cTn id="1" dur="indefinite" restart="never" nodeType="tmRoot">
+          <p:childTnLst>
+            <p:seq concurrent="1" nextAc="seek">
+              <p:cTn id="2" dur="indefinite" nodeType="mainSeq">
+                <p:childTnLst>
+                  <p:par>
+                    <p:cTn id="3" fill="hold">
+                      <p:stCondLst>
+                        <p:cond delay="indefinite"/>
+                        <p:cond evt="onBegin" delay="0">
+                          <p:tn val="2"/>
+                        </p:cond>
+                      </p:stCondLst>
+                      <p:childTnLst>
+                        <p:par>
+                          <p:cTn id="4" fill="hold">
+                            <p:stCondLst>
+                              <p:cond delay="0"/>
+                            </p:stCondLst>
+                            <p:childTnLst>
+                              <p:par>
+                                <p:cTn id="5" presetID="2" presetClass="entr" presetSubtype="2" fill="hold" grpId="0" nodeType="afterEffect">
+                                  <p:stCondLst>
+                                    <p:cond delay="0"/>
+                                  </p:stCondLst>
+                                  <p:childTnLst>
+                                    <p:set>
+                                      <p:cBhvr>
+                                        <p:cTn id="6" dur="1" fill="hold">
+                                          <p:stCondLst>
+                                            <p:cond delay="0"/>
+                                          </p:stCondLst>
+                                        </p:cTn>
+                                        <p:tgtEl>
+                                          <p:spTgt spid="3">
+                                            <p:txEl>
+                                              <p:pRg st="0" end="0"/>
+                                            </p:txEl>
+                                          </p:spTgt>
+                                        </p:tgtEl>
+                                        <p:attrNameLst>
+                                          <p:attrName>style.visibility</p:attrName>
+                                        </p:attrNameLst>
+                                      </p:cBhvr>
+                                      <p:to>
+                                        <p:strVal val="visible"/>
+                                      </p:to>
+                                    </p:set>
+                                    <p:anim calcmode="lin" valueType="num">
+                                      <p:cBhvr additive="base">
+                                        <p:cTn id="7" dur="500" fill="hold"/>
+                                        <p:tgtEl>
+                                          <p:spTgt spid="3">
+                                            <p:txEl>
+                                              <p:pRg st="0" end="0"/>
+                                            </p:txEl>
+                                          </p:spTgt>
+                                        </p:tgtEl>
+                                        <p:attrNameLst>
+                                          <p:attrName>ppt_x</p:attrName>
+                                        </p:attrNameLst>
+                                      </p:cBhvr>
+                                      <p:tavLst>
+                                        <p:tav tm="0">
+                                          <p:val>
+                                            <p:strVal val="1+#ppt_w/2"/>
+                                          </p:val>
+                                        </p:tav>
+                                        <p:tav tm="100000">
+                                          <p:val>
+                                            <p:strVal val="#ppt_x"/>
+                                          </p:val>
+                                        </p:tav>
+                                      </p:tavLst>
+                                    </p:anim>
+                                    <p:anim calcmode="lin" valueType="num">
+                                      <p:cBhvr additive="base">
+                                        <p:cTn id="8" dur="500" fill="hold"/>
+                                        <p:tgtEl>
+                                          <p:spTgt spid="3">
+                                            <p:txEl>
+                                              <p:pRg st="0" end="0"/>
+                                            </p:txEl>
+                                          </p:spTgt>
+                                        </p:tgtEl>
+                                        <p:attrNameLst>
+                                          <p:attrName>ppt_y</p:attrName>
+                                        </p:attrNameLst>
+                                      </p:cBhvr>
+                                      <p:tavLst>
+                                        <p:tav tm="0">
+                                          <p:val>
+                                            <p:strVal val="#ppt_y"/>
+                                          </p:val>
+                                        </p:tav>
+                                        <p:tav tm="100000">
+                                          <p:val>
+                                            <p:strVal val="#ppt_y"/>
+                                          </p:val>
+                                        </p:tav>
+                                      </p:tavLst>
+                                    </p:anim>
+                                  </p:childTnLst>
+                                </p:cTn>
+                              </p:par>
+                            </p:childTnLst>
+                          </p:cTn>
+                        </p:par>
+                      </p:childTnLst>
+                    </p:cTn>
+                  </p:par>
+                </p:childTnLst>
+              </p:cTn>
+              <p:prevCondLst>
+                <p:cond evt="onPrev" delay="0">
+                  <p:tgtEl>
+                    <p:sldTgt/>
+                  </p:tgtEl>
+                </p:cond>
+              </p:prevCondLst>
+              <p:nextCondLst>
+                <p:cond evt="onNext" delay="0">
+                  <p:tgtEl>
+                    <p:sldTgt/>
+                  </p:tgtEl>
+                </p:cond>
+              </p:nextCondLst>
+            </p:seq>
+          </p:childTnLst>
+        </p:cTn>
+      </p:par>
+    </p:tnLst>
+    <p:bldLst>
+      <p:bldP spid="3" grpId="0" build="p"/>
+    </p:bldLst>
+  </p:timing>
+</p:sld>
+</file>
+
 <file path=ppt/slides/slide2.xml><?xml version="1.0" encoding="utf-8"?>
 <p:sld xmlns:a="http://schemas.openxmlformats.org/drawingml/2006/main" xmlns:r="http://schemas.openxmlformats.org/officeDocument/2006/relationships" xmlns:p="http://schemas.openxmlformats.org/presentationml/2006/main">
   <p:cSld>
@@ -3773,8 +6375,12 @@
           <a:lstStyle/>
           <a:p>
             <a:r>
+              <a:rPr lang="en-US" dirty="0"/>
+              <a:t>a</a:t>
+            </a:r>
+            <a:r>
               <a:rPr lang="en-US" dirty="0" smtClean="0"/>
-              <a:t>Agenda</a:t>
+              <a:t>genda</a:t>
             </a:r>
             <a:endParaRPr lang="en-US" dirty="0"/>
           </a:p>
@@ -3796,44 +6402,79 @@
           <a:lstStyle/>
           <a:p>
             <a:r>
+              <a:rPr lang="en-US" dirty="0"/>
+              <a:t>p</a:t>
+            </a:r>
+            <a:r>
               <a:rPr lang="en-US" dirty="0" smtClean="0"/>
-              <a:t>Prerequisites</a:t>
-            </a:r>
-          </a:p>
-          <a:p>
+              <a:t>rerequisites</a:t>
+            </a:r>
+            <a:endParaRPr lang="en-US" dirty="0" smtClean="0"/>
+          </a:p>
+          <a:p>
+            <a:r>
+              <a:rPr lang="en-US" dirty="0"/>
+              <a:t>s</a:t>
+            </a:r>
             <a:r>
               <a:rPr lang="en-US" dirty="0" smtClean="0"/>
-              <a:t>Scaffolding extension projects</a:t>
-            </a:r>
-          </a:p>
-          <a:p>
+              <a:t>caffolding </a:t>
+            </a:r>
             <a:r>
               <a:rPr lang="en-US" dirty="0" smtClean="0"/>
-              <a:t>Snippets</a:t>
+              <a:t>extension projects</a:t>
             </a:r>
           </a:p>
           <a:p>
             <a:r>
               <a:rPr lang="en-US" dirty="0" smtClean="0"/>
-              <a:t>Commands</a:t>
-            </a:r>
-          </a:p>
-          <a:p>
+              <a:t>snippets</a:t>
+            </a:r>
+            <a:endParaRPr lang="en-US" dirty="0" smtClean="0"/>
+          </a:p>
+          <a:p>
+            <a:r>
+              <a:rPr lang="en-US" dirty="0"/>
+              <a:t>c</a:t>
+            </a:r>
             <a:r>
               <a:rPr lang="en-US" dirty="0" smtClean="0"/>
-              <a:t>User Experience</a:t>
-            </a:r>
+              <a:t>ommands</a:t>
+            </a:r>
+            <a:endParaRPr lang="en-US" dirty="0" smtClean="0"/>
           </a:p>
           <a:p>
             <a:r>
               <a:rPr lang="en-US" dirty="0" smtClean="0"/>
-              <a:t>Editor Interaction</a:t>
-            </a:r>
-          </a:p>
-          <a:p>
+              <a:t>user experience</a:t>
+            </a:r>
+            <a:endParaRPr lang="en-US" dirty="0" smtClean="0"/>
+          </a:p>
+          <a:p>
+            <a:r>
+              <a:rPr lang="en-US" dirty="0"/>
+              <a:t>e</a:t>
+            </a:r>
             <a:r>
               <a:rPr lang="en-US" dirty="0" smtClean="0"/>
-              <a:t>Publishing</a:t>
+              <a:t>ditor interaction</a:t>
+            </a:r>
+            <a:endParaRPr lang="en-US" dirty="0" smtClean="0"/>
+          </a:p>
+          <a:p>
+            <a:r>
+              <a:rPr lang="en-US" dirty="0" smtClean="0"/>
+              <a:t>publishing</a:t>
+            </a:r>
+          </a:p>
+          <a:p>
+            <a:r>
+              <a:rPr lang="en-US" dirty="0"/>
+              <a:t>d</a:t>
+            </a:r>
+            <a:r>
+              <a:rPr lang="en-US" dirty="0" smtClean="0"/>
+              <a:t>esign considerations</a:t>
             </a:r>
             <a:endParaRPr lang="en-US" dirty="0"/>
           </a:p>
@@ -3849,6 +6490,319 @@
   <p:clrMapOvr>
     <a:masterClrMapping/>
   </p:clrMapOvr>
+  <p:timing>
+    <p:tnLst>
+      <p:par>
+        <p:cTn id="1" dur="indefinite" restart="never" nodeType="tmRoot"/>
+      </p:par>
+    </p:tnLst>
+  </p:timing>
+</p:sld>
+</file>
+
+<file path=ppt/slides/slide20.xml><?xml version="1.0" encoding="utf-8"?>
+<p:sld xmlns:a="http://schemas.openxmlformats.org/drawingml/2006/main" xmlns:r="http://schemas.openxmlformats.org/officeDocument/2006/relationships" xmlns:p="http://schemas.openxmlformats.org/presentationml/2006/main">
+  <p:cSld>
+    <p:spTree>
+      <p:nvGrpSpPr>
+        <p:cNvPr id="1" name=""/>
+        <p:cNvGrpSpPr/>
+        <p:nvPr/>
+      </p:nvGrpSpPr>
+      <p:grpSpPr>
+        <a:xfrm>
+          <a:off x="0" y="0"/>
+          <a:ext cx="0" cy="0"/>
+          <a:chOff x="0" y="0"/>
+          <a:chExt cx="0" cy="0"/>
+        </a:xfrm>
+      </p:grpSpPr>
+      <p:sp>
+        <p:nvSpPr>
+          <p:cNvPr id="2" name="Title 1"/>
+          <p:cNvSpPr>
+            <a:spLocks noGrp="1"/>
+          </p:cNvSpPr>
+          <p:nvPr>
+            <p:ph type="title"/>
+          </p:nvPr>
+        </p:nvSpPr>
+        <p:spPr/>
+        <p:txBody>
+          <a:bodyPr/>
+          <a:lstStyle/>
+          <a:p>
+            <a:r>
+              <a:rPr lang="en-US" dirty="0" smtClean="0"/>
+              <a:t>add value</a:t>
+            </a:r>
+            <a:endParaRPr lang="en-US" dirty="0"/>
+          </a:p>
+        </p:txBody>
+      </p:sp>
+      <p:sp>
+        <p:nvSpPr>
+          <p:cNvPr id="3" name="Text Placeholder 2"/>
+          <p:cNvSpPr>
+            <a:spLocks noGrp="1"/>
+          </p:cNvSpPr>
+          <p:nvPr>
+            <p:ph type="body" idx="1"/>
+          </p:nvPr>
+        </p:nvSpPr>
+        <p:spPr>
+          <a:xfrm>
+            <a:off x="4047215" y="3914964"/>
+            <a:ext cx="7300235" cy="1295021"/>
+          </a:xfrm>
+        </p:spPr>
+        <p:txBody>
+          <a:bodyPr/>
+          <a:lstStyle/>
+          <a:p>
+            <a:r>
+              <a:rPr lang="en-US" dirty="0"/>
+              <a:t>i</a:t>
+            </a:r>
+            <a:r>
+              <a:rPr lang="en-US" dirty="0" smtClean="0"/>
+              <a:t>f you need the feature, someone else </a:t>
+            </a:r>
+            <a:r>
+              <a:rPr lang="en-US" smtClean="0"/>
+              <a:t>does too!</a:t>
+            </a:r>
+            <a:endParaRPr lang="en-US" dirty="0" smtClean="0"/>
+          </a:p>
+        </p:txBody>
+      </p:sp>
+    </p:spTree>
+    <p:extLst>
+      <p:ext uri="{BB962C8B-B14F-4D97-AF65-F5344CB8AC3E}">
+        <p14:creationId xmlns:p14="http://schemas.microsoft.com/office/powerpoint/2010/main" val="1921171253"/>
+      </p:ext>
+    </p:extLst>
+  </p:cSld>
+  <p:clrMapOvr>
+    <a:masterClrMapping/>
+  </p:clrMapOvr>
+  <p:transition spd="slow">
+    <p:push/>
+  </p:transition>
+  <p:timing>
+    <p:tnLst>
+      <p:par>
+        <p:cTn id="1" dur="indefinite" restart="never" nodeType="tmRoot">
+          <p:childTnLst>
+            <p:seq concurrent="1" nextAc="seek">
+              <p:cTn id="2" dur="indefinite" nodeType="mainSeq">
+                <p:childTnLst>
+                  <p:par>
+                    <p:cTn id="3" fill="hold">
+                      <p:stCondLst>
+                        <p:cond delay="indefinite"/>
+                        <p:cond evt="onBegin" delay="0">
+                          <p:tn val="2"/>
+                        </p:cond>
+                      </p:stCondLst>
+                      <p:childTnLst>
+                        <p:par>
+                          <p:cTn id="4" fill="hold">
+                            <p:stCondLst>
+                              <p:cond delay="0"/>
+                            </p:stCondLst>
+                            <p:childTnLst>
+                              <p:par>
+                                <p:cTn id="5" presetID="2" presetClass="entr" presetSubtype="2" fill="hold" grpId="0" nodeType="afterEffect">
+                                  <p:stCondLst>
+                                    <p:cond delay="0"/>
+                                  </p:stCondLst>
+                                  <p:childTnLst>
+                                    <p:set>
+                                      <p:cBhvr>
+                                        <p:cTn id="6" dur="1" fill="hold">
+                                          <p:stCondLst>
+                                            <p:cond delay="0"/>
+                                          </p:stCondLst>
+                                        </p:cTn>
+                                        <p:tgtEl>
+                                          <p:spTgt spid="3">
+                                            <p:txEl>
+                                              <p:pRg st="0" end="0"/>
+                                            </p:txEl>
+                                          </p:spTgt>
+                                        </p:tgtEl>
+                                        <p:attrNameLst>
+                                          <p:attrName>style.visibility</p:attrName>
+                                        </p:attrNameLst>
+                                      </p:cBhvr>
+                                      <p:to>
+                                        <p:strVal val="visible"/>
+                                      </p:to>
+                                    </p:set>
+                                    <p:anim calcmode="lin" valueType="num">
+                                      <p:cBhvr additive="base">
+                                        <p:cTn id="7" dur="500" fill="hold"/>
+                                        <p:tgtEl>
+                                          <p:spTgt spid="3">
+                                            <p:txEl>
+                                              <p:pRg st="0" end="0"/>
+                                            </p:txEl>
+                                          </p:spTgt>
+                                        </p:tgtEl>
+                                        <p:attrNameLst>
+                                          <p:attrName>ppt_x</p:attrName>
+                                        </p:attrNameLst>
+                                      </p:cBhvr>
+                                      <p:tavLst>
+                                        <p:tav tm="0">
+                                          <p:val>
+                                            <p:strVal val="1+#ppt_w/2"/>
+                                          </p:val>
+                                        </p:tav>
+                                        <p:tav tm="100000">
+                                          <p:val>
+                                            <p:strVal val="#ppt_x"/>
+                                          </p:val>
+                                        </p:tav>
+                                      </p:tavLst>
+                                    </p:anim>
+                                    <p:anim calcmode="lin" valueType="num">
+                                      <p:cBhvr additive="base">
+                                        <p:cTn id="8" dur="500" fill="hold"/>
+                                        <p:tgtEl>
+                                          <p:spTgt spid="3">
+                                            <p:txEl>
+                                              <p:pRg st="0" end="0"/>
+                                            </p:txEl>
+                                          </p:spTgt>
+                                        </p:tgtEl>
+                                        <p:attrNameLst>
+                                          <p:attrName>ppt_y</p:attrName>
+                                        </p:attrNameLst>
+                                      </p:cBhvr>
+                                      <p:tavLst>
+                                        <p:tav tm="0">
+                                          <p:val>
+                                            <p:strVal val="#ppt_y"/>
+                                          </p:val>
+                                        </p:tav>
+                                        <p:tav tm="100000">
+                                          <p:val>
+                                            <p:strVal val="#ppt_y"/>
+                                          </p:val>
+                                        </p:tav>
+                                      </p:tavLst>
+                                    </p:anim>
+                                  </p:childTnLst>
+                                </p:cTn>
+                              </p:par>
+                            </p:childTnLst>
+                          </p:cTn>
+                        </p:par>
+                      </p:childTnLst>
+                    </p:cTn>
+                  </p:par>
+                </p:childTnLst>
+              </p:cTn>
+              <p:prevCondLst>
+                <p:cond evt="onPrev" delay="0">
+                  <p:tgtEl>
+                    <p:sldTgt/>
+                  </p:tgtEl>
+                </p:cond>
+              </p:prevCondLst>
+              <p:nextCondLst>
+                <p:cond evt="onNext" delay="0">
+                  <p:tgtEl>
+                    <p:sldTgt/>
+                  </p:tgtEl>
+                </p:cond>
+              </p:nextCondLst>
+            </p:seq>
+          </p:childTnLst>
+        </p:cTn>
+      </p:par>
+    </p:tnLst>
+    <p:bldLst>
+      <p:bldP spid="3" grpId="0" build="p"/>
+    </p:bldLst>
+  </p:timing>
+</p:sld>
+</file>
+
+<file path=ppt/slides/slide21.xml><?xml version="1.0" encoding="utf-8"?>
+<p:sld xmlns:a="http://schemas.openxmlformats.org/drawingml/2006/main" xmlns:r="http://schemas.openxmlformats.org/officeDocument/2006/relationships" xmlns:p="http://schemas.openxmlformats.org/presentationml/2006/main">
+  <p:cSld>
+    <p:spTree>
+      <p:nvGrpSpPr>
+        <p:cNvPr id="1" name=""/>
+        <p:cNvGrpSpPr/>
+        <p:nvPr/>
+      </p:nvGrpSpPr>
+      <p:grpSpPr>
+        <a:xfrm>
+          <a:off x="0" y="0"/>
+          <a:ext cx="0" cy="0"/>
+          <a:chOff x="0" y="0"/>
+          <a:chExt cx="0" cy="0"/>
+        </a:xfrm>
+      </p:grpSpPr>
+      <p:sp>
+        <p:nvSpPr>
+          <p:cNvPr id="2" name="Title 1"/>
+          <p:cNvSpPr>
+            <a:spLocks noGrp="1"/>
+          </p:cNvSpPr>
+          <p:nvPr>
+            <p:ph type="title"/>
+          </p:nvPr>
+        </p:nvSpPr>
+        <p:spPr/>
+        <p:txBody>
+          <a:bodyPr/>
+          <a:lstStyle/>
+          <a:p>
+            <a:r>
+              <a:rPr lang="en-US" dirty="0" smtClean="0"/>
+              <a:t>go build it</a:t>
+            </a:r>
+            <a:endParaRPr lang="en-US" dirty="0"/>
+          </a:p>
+        </p:txBody>
+      </p:sp>
+      <p:sp>
+        <p:nvSpPr>
+          <p:cNvPr id="4" name="Text Placeholder 3"/>
+          <p:cNvSpPr>
+            <a:spLocks noGrp="1"/>
+          </p:cNvSpPr>
+          <p:nvPr>
+            <p:ph type="body" idx="1"/>
+          </p:nvPr>
+        </p:nvSpPr>
+        <p:spPr/>
+        <p:txBody>
+          <a:bodyPr/>
+          <a:lstStyle/>
+          <a:p>
+            <a:endParaRPr lang="en-US"/>
+          </a:p>
+        </p:txBody>
+      </p:sp>
+    </p:spTree>
+    <p:extLst>
+      <p:ext uri="{BB962C8B-B14F-4D97-AF65-F5344CB8AC3E}">
+        <p14:creationId xmlns:p14="http://schemas.microsoft.com/office/powerpoint/2010/main" val="1891061775"/>
+      </p:ext>
+    </p:extLst>
+  </p:cSld>
+  <p:clrMapOvr>
+    <a:masterClrMapping/>
+  </p:clrMapOvr>
+  <p:transition spd="slow">
+    <p:push/>
+  </p:transition>
   <p:timing>
     <p:tnLst>
       <p:par>
@@ -3916,8 +6870,12 @@
           <a:lstStyle/>
           <a:p>
             <a:r>
+              <a:rPr lang="en-US" dirty="0"/>
+              <a:t>p</a:t>
+            </a:r>
+            <a:r>
               <a:rPr lang="en-US" dirty="0" smtClean="0"/>
-              <a:t>Prerequisites</a:t>
+              <a:t>rerequisites</a:t>
             </a:r>
             <a:endParaRPr lang="en-US" dirty="0"/>
           </a:p>
@@ -4000,8 +6958,12 @@
           <a:lstStyle/>
           <a:p>
             <a:r>
+              <a:rPr lang="en-US" dirty="0"/>
+              <a:t>p</a:t>
+            </a:r>
+            <a:r>
               <a:rPr lang="en-US" dirty="0" smtClean="0"/>
-              <a:t>Prerequisites</a:t>
+              <a:t>rerequisites</a:t>
             </a:r>
             <a:endParaRPr lang="en-US" dirty="0"/>
           </a:p>
@@ -4084,8 +7046,12 @@
           <a:lstStyle/>
           <a:p>
             <a:r>
+              <a:rPr lang="en-US" dirty="0"/>
+              <a:t>p</a:t>
+            </a:r>
+            <a:r>
               <a:rPr lang="en-US" dirty="0" smtClean="0"/>
-              <a:t>Prerequisites</a:t>
+              <a:t>rerequisites</a:t>
             </a:r>
             <a:endParaRPr lang="en-US" dirty="0"/>
           </a:p>
@@ -5249,11 +8215,11 @@
   <p:clrMapOvr>
     <a:masterClrMapping/>
   </p:clrMapOvr>
-  <mc:AlternateContent xmlns:mc="http://schemas.openxmlformats.org/markup-compatibility/2006">
-    <mc:Choice xmlns:p14="http://schemas.microsoft.com/office/powerpoint/2010/main" Requires="p14">
+  <mc:AlternateContent xmlns:mc="http://schemas.openxmlformats.org/markup-compatibility/2006" xmlns:p14="http://schemas.microsoft.com/office/powerpoint/2010/main">
+    <mc:Choice Requires="p14">
       <p:transition p14:dur="0" advClick="0" advTm="1000"/>
     </mc:Choice>
-    <mc:Fallback>
+    <mc:Fallback xmlns="">
       <p:transition advClick="0" advTm="1000"/>
     </mc:Fallback>
   </mc:AlternateContent>

</xml_diff>

<commit_message>
removed old sample, cleaned up snippets
</commit_message>
<xml_diff>
--- a/extending-vs-code.pptx
+++ b/extending-vs-code.pptx
@@ -5,7 +5,7 @@
     <p:sldMasterId id="2147483684" r:id="rId1"/>
   </p:sldMasterIdLst>
   <p:notesMasterIdLst>
-    <p:notesMasterId r:id="rId23"/>
+    <p:notesMasterId r:id="rId33"/>
   </p:notesMasterIdLst>
   <p:sldIdLst>
     <p:sldId id="258" r:id="rId2"/>
@@ -17,18 +17,28 @@
     <p:sldId id="266" r:id="rId8"/>
     <p:sldId id="281" r:id="rId9"/>
     <p:sldId id="275" r:id="rId10"/>
-    <p:sldId id="278" r:id="rId11"/>
-    <p:sldId id="277" r:id="rId12"/>
-    <p:sldId id="279" r:id="rId13"/>
-    <p:sldId id="280" r:id="rId14"/>
-    <p:sldId id="282" r:id="rId15"/>
-    <p:sldId id="284" r:id="rId16"/>
-    <p:sldId id="285" r:id="rId17"/>
-    <p:sldId id="286" r:id="rId18"/>
-    <p:sldId id="290" r:id="rId19"/>
-    <p:sldId id="292" r:id="rId20"/>
-    <p:sldId id="293" r:id="rId21"/>
-    <p:sldId id="294" r:id="rId22"/>
+    <p:sldId id="295" r:id="rId11"/>
+    <p:sldId id="278" r:id="rId12"/>
+    <p:sldId id="297" r:id="rId13"/>
+    <p:sldId id="296" r:id="rId14"/>
+    <p:sldId id="298" r:id="rId15"/>
+    <p:sldId id="277" r:id="rId16"/>
+    <p:sldId id="300" r:id="rId17"/>
+    <p:sldId id="299" r:id="rId18"/>
+    <p:sldId id="301" r:id="rId19"/>
+    <p:sldId id="302" r:id="rId20"/>
+    <p:sldId id="279" r:id="rId21"/>
+    <p:sldId id="304" r:id="rId22"/>
+    <p:sldId id="303" r:id="rId23"/>
+    <p:sldId id="280" r:id="rId24"/>
+    <p:sldId id="282" r:id="rId25"/>
+    <p:sldId id="284" r:id="rId26"/>
+    <p:sldId id="285" r:id="rId27"/>
+    <p:sldId id="286" r:id="rId28"/>
+    <p:sldId id="290" r:id="rId29"/>
+    <p:sldId id="292" r:id="rId30"/>
+    <p:sldId id="293" r:id="rId31"/>
+    <p:sldId id="294" r:id="rId32"/>
   </p:sldIdLst>
   <p:sldSz cx="12192000" cy="6858000"/>
   <p:notesSz cx="6858000" cy="9144000"/>
@@ -217,7 +227,7 @@
           <a:p>
             <a:fld id="{99C4D036-BDB5-5848-925A-7211684DC976}" type="datetimeFigureOut">
               <a:rPr lang="en-US" smtClean="0"/>
-              <a:t>5/10/17</a:t>
+              <a:t>6/22/17</a:t>
             </a:fld>
             <a:endParaRPr lang="en-US"/>
           </a:p>
@@ -485,6 +495,918 @@
 </p:notesMaster>
 </file>
 
+<file path=ppt/notesSlides/notesSlide1.xml><?xml version="1.0" encoding="utf-8"?>
+<p:notes xmlns:a="http://schemas.openxmlformats.org/drawingml/2006/main" xmlns:r="http://schemas.openxmlformats.org/officeDocument/2006/relationships" xmlns:p="http://schemas.openxmlformats.org/presentationml/2006/main">
+  <p:cSld>
+    <p:spTree>
+      <p:nvGrpSpPr>
+        <p:cNvPr id="1" name=""/>
+        <p:cNvGrpSpPr/>
+        <p:nvPr/>
+      </p:nvGrpSpPr>
+      <p:grpSpPr>
+        <a:xfrm>
+          <a:off x="0" y="0"/>
+          <a:ext cx="0" cy="0"/>
+          <a:chOff x="0" y="0"/>
+          <a:chExt cx="0" cy="0"/>
+        </a:xfrm>
+      </p:grpSpPr>
+      <p:sp>
+        <p:nvSpPr>
+          <p:cNvPr id="2" name="Slide Image Placeholder 1"/>
+          <p:cNvSpPr>
+            <a:spLocks noGrp="1" noRot="1" noChangeAspect="1"/>
+          </p:cNvSpPr>
+          <p:nvPr>
+            <p:ph type="sldImg"/>
+          </p:nvPr>
+        </p:nvSpPr>
+        <p:spPr/>
+      </p:sp>
+      <p:sp>
+        <p:nvSpPr>
+          <p:cNvPr id="3" name="Notes Placeholder 2"/>
+          <p:cNvSpPr>
+            <a:spLocks noGrp="1"/>
+          </p:cNvSpPr>
+          <p:nvPr>
+            <p:ph type="body" idx="1"/>
+          </p:nvPr>
+        </p:nvSpPr>
+        <p:spPr/>
+        <p:txBody>
+          <a:bodyPr/>
+          <a:lstStyle/>
+          <a:p>
+            <a:r>
+              <a:rPr lang="en-US" dirty="0" smtClean="0"/>
+              <a:t>Demo</a:t>
+            </a:r>
+            <a:r>
+              <a:rPr lang="en-US" baseline="0" dirty="0" smtClean="0"/>
+              <a:t> 1</a:t>
+            </a:r>
+            <a:endParaRPr lang="en-US" dirty="0"/>
+          </a:p>
+        </p:txBody>
+      </p:sp>
+      <p:sp>
+        <p:nvSpPr>
+          <p:cNvPr id="4" name="Slide Number Placeholder 3"/>
+          <p:cNvSpPr>
+            <a:spLocks noGrp="1"/>
+          </p:cNvSpPr>
+          <p:nvPr>
+            <p:ph type="sldNum" sz="quarter" idx="10"/>
+          </p:nvPr>
+        </p:nvSpPr>
+        <p:spPr/>
+        <p:txBody>
+          <a:bodyPr/>
+          <a:lstStyle/>
+          <a:p>
+            <a:fld id="{432C2F01-3235-F748-B4E8-E3F35CE72FA9}" type="slidenum">
+              <a:rPr lang="en-US" smtClean="0"/>
+              <a:t>9</a:t>
+            </a:fld>
+            <a:endParaRPr lang="en-US"/>
+          </a:p>
+        </p:txBody>
+      </p:sp>
+    </p:spTree>
+    <p:extLst>
+      <p:ext uri="{BB962C8B-B14F-4D97-AF65-F5344CB8AC3E}">
+        <p14:creationId xmlns:p14="http://schemas.microsoft.com/office/powerpoint/2010/main" val="950731574"/>
+      </p:ext>
+    </p:extLst>
+  </p:cSld>
+  <p:clrMapOvr>
+    <a:masterClrMapping/>
+  </p:clrMapOvr>
+</p:notes>
+</file>
+
+<file path=ppt/notesSlides/notesSlide10.xml><?xml version="1.0" encoding="utf-8"?>
+<p:notes xmlns:a="http://schemas.openxmlformats.org/drawingml/2006/main" xmlns:r="http://schemas.openxmlformats.org/officeDocument/2006/relationships" xmlns:p="http://schemas.openxmlformats.org/presentationml/2006/main">
+  <p:cSld>
+    <p:spTree>
+      <p:nvGrpSpPr>
+        <p:cNvPr id="1" name=""/>
+        <p:cNvGrpSpPr/>
+        <p:nvPr/>
+      </p:nvGrpSpPr>
+      <p:grpSpPr>
+        <a:xfrm>
+          <a:off x="0" y="0"/>
+          <a:ext cx="0" cy="0"/>
+          <a:chOff x="0" y="0"/>
+          <a:chExt cx="0" cy="0"/>
+        </a:xfrm>
+      </p:grpSpPr>
+      <p:sp>
+        <p:nvSpPr>
+          <p:cNvPr id="2" name="Slide Image Placeholder 1"/>
+          <p:cNvSpPr>
+            <a:spLocks noGrp="1" noRot="1" noChangeAspect="1"/>
+          </p:cNvSpPr>
+          <p:nvPr>
+            <p:ph type="sldImg"/>
+          </p:nvPr>
+        </p:nvSpPr>
+        <p:spPr/>
+      </p:sp>
+      <p:sp>
+        <p:nvSpPr>
+          <p:cNvPr id="3" name="Notes Placeholder 2"/>
+          <p:cNvSpPr>
+            <a:spLocks noGrp="1"/>
+          </p:cNvSpPr>
+          <p:nvPr>
+            <p:ph type="body" idx="1"/>
+          </p:nvPr>
+        </p:nvSpPr>
+        <p:spPr/>
+        <p:txBody>
+          <a:bodyPr/>
+          <a:lstStyle/>
+          <a:p>
+            <a:r>
+              <a:rPr lang="en-US" dirty="0" smtClean="0"/>
+              <a:t>Demo</a:t>
+            </a:r>
+            <a:r>
+              <a:rPr lang="en-US" baseline="0" dirty="0" smtClean="0"/>
+              <a:t> 10</a:t>
+            </a:r>
+            <a:endParaRPr lang="en-US" dirty="0"/>
+          </a:p>
+        </p:txBody>
+      </p:sp>
+      <p:sp>
+        <p:nvSpPr>
+          <p:cNvPr id="4" name="Slide Number Placeholder 3"/>
+          <p:cNvSpPr>
+            <a:spLocks noGrp="1"/>
+          </p:cNvSpPr>
+          <p:nvPr>
+            <p:ph type="sldNum" sz="quarter" idx="10"/>
+          </p:nvPr>
+        </p:nvSpPr>
+        <p:spPr/>
+        <p:txBody>
+          <a:bodyPr/>
+          <a:lstStyle/>
+          <a:p>
+            <a:fld id="{432C2F01-3235-F748-B4E8-E3F35CE72FA9}" type="slidenum">
+              <a:rPr lang="en-US" smtClean="0"/>
+              <a:t>22</a:t>
+            </a:fld>
+            <a:endParaRPr lang="en-US"/>
+          </a:p>
+        </p:txBody>
+      </p:sp>
+    </p:spTree>
+    <p:extLst>
+      <p:ext uri="{BB962C8B-B14F-4D97-AF65-F5344CB8AC3E}">
+        <p14:creationId xmlns:p14="http://schemas.microsoft.com/office/powerpoint/2010/main" val="406460176"/>
+      </p:ext>
+    </p:extLst>
+  </p:cSld>
+  <p:clrMapOvr>
+    <a:masterClrMapping/>
+  </p:clrMapOvr>
+</p:notes>
+</file>
+
+<file path=ppt/notesSlides/notesSlide2.xml><?xml version="1.0" encoding="utf-8"?>
+<p:notes xmlns:a="http://schemas.openxmlformats.org/drawingml/2006/main" xmlns:r="http://schemas.openxmlformats.org/officeDocument/2006/relationships" xmlns:p="http://schemas.openxmlformats.org/presentationml/2006/main">
+  <p:cSld>
+    <p:spTree>
+      <p:nvGrpSpPr>
+        <p:cNvPr id="1" name=""/>
+        <p:cNvGrpSpPr/>
+        <p:nvPr/>
+      </p:nvGrpSpPr>
+      <p:grpSpPr>
+        <a:xfrm>
+          <a:off x="0" y="0"/>
+          <a:ext cx="0" cy="0"/>
+          <a:chOff x="0" y="0"/>
+          <a:chExt cx="0" cy="0"/>
+        </a:xfrm>
+      </p:grpSpPr>
+      <p:sp>
+        <p:nvSpPr>
+          <p:cNvPr id="2" name="Slide Image Placeholder 1"/>
+          <p:cNvSpPr>
+            <a:spLocks noGrp="1" noRot="1" noChangeAspect="1"/>
+          </p:cNvSpPr>
+          <p:nvPr>
+            <p:ph type="sldImg"/>
+          </p:nvPr>
+        </p:nvSpPr>
+        <p:spPr/>
+      </p:sp>
+      <p:sp>
+        <p:nvSpPr>
+          <p:cNvPr id="3" name="Notes Placeholder 2"/>
+          <p:cNvSpPr>
+            <a:spLocks noGrp="1"/>
+          </p:cNvSpPr>
+          <p:nvPr>
+            <p:ph type="body" idx="1"/>
+          </p:nvPr>
+        </p:nvSpPr>
+        <p:spPr/>
+        <p:txBody>
+          <a:bodyPr/>
+          <a:lstStyle/>
+          <a:p>
+            <a:r>
+              <a:rPr lang="en-US" dirty="0" smtClean="0"/>
+              <a:t>Demo</a:t>
+            </a:r>
+            <a:r>
+              <a:rPr lang="en-US" baseline="0" dirty="0" smtClean="0"/>
+              <a:t> 2</a:t>
+            </a:r>
+            <a:endParaRPr lang="en-US" dirty="0"/>
+          </a:p>
+        </p:txBody>
+      </p:sp>
+      <p:sp>
+        <p:nvSpPr>
+          <p:cNvPr id="4" name="Slide Number Placeholder 3"/>
+          <p:cNvSpPr>
+            <a:spLocks noGrp="1"/>
+          </p:cNvSpPr>
+          <p:nvPr>
+            <p:ph type="sldNum" sz="quarter" idx="10"/>
+          </p:nvPr>
+        </p:nvSpPr>
+        <p:spPr/>
+        <p:txBody>
+          <a:bodyPr/>
+          <a:lstStyle/>
+          <a:p>
+            <a:fld id="{432C2F01-3235-F748-B4E8-E3F35CE72FA9}" type="slidenum">
+              <a:rPr lang="en-US" smtClean="0"/>
+              <a:t>10</a:t>
+            </a:fld>
+            <a:endParaRPr lang="en-US"/>
+          </a:p>
+        </p:txBody>
+      </p:sp>
+    </p:spTree>
+    <p:extLst>
+      <p:ext uri="{BB962C8B-B14F-4D97-AF65-F5344CB8AC3E}">
+        <p14:creationId xmlns:p14="http://schemas.microsoft.com/office/powerpoint/2010/main" val="353134910"/>
+      </p:ext>
+    </p:extLst>
+  </p:cSld>
+  <p:clrMapOvr>
+    <a:masterClrMapping/>
+  </p:clrMapOvr>
+</p:notes>
+</file>
+
+<file path=ppt/notesSlides/notesSlide3.xml><?xml version="1.0" encoding="utf-8"?>
+<p:notes xmlns:a="http://schemas.openxmlformats.org/drawingml/2006/main" xmlns:r="http://schemas.openxmlformats.org/officeDocument/2006/relationships" xmlns:p="http://schemas.openxmlformats.org/presentationml/2006/main">
+  <p:cSld>
+    <p:spTree>
+      <p:nvGrpSpPr>
+        <p:cNvPr id="1" name=""/>
+        <p:cNvGrpSpPr/>
+        <p:nvPr/>
+      </p:nvGrpSpPr>
+      <p:grpSpPr>
+        <a:xfrm>
+          <a:off x="0" y="0"/>
+          <a:ext cx="0" cy="0"/>
+          <a:chOff x="0" y="0"/>
+          <a:chExt cx="0" cy="0"/>
+        </a:xfrm>
+      </p:grpSpPr>
+      <p:sp>
+        <p:nvSpPr>
+          <p:cNvPr id="2" name="Slide Image Placeholder 1"/>
+          <p:cNvSpPr>
+            <a:spLocks noGrp="1" noRot="1" noChangeAspect="1"/>
+          </p:cNvSpPr>
+          <p:nvPr>
+            <p:ph type="sldImg"/>
+          </p:nvPr>
+        </p:nvSpPr>
+        <p:spPr/>
+      </p:sp>
+      <p:sp>
+        <p:nvSpPr>
+          <p:cNvPr id="3" name="Notes Placeholder 2"/>
+          <p:cNvSpPr>
+            <a:spLocks noGrp="1"/>
+          </p:cNvSpPr>
+          <p:nvPr>
+            <p:ph type="body" idx="1"/>
+          </p:nvPr>
+        </p:nvSpPr>
+        <p:spPr/>
+        <p:txBody>
+          <a:bodyPr/>
+          <a:lstStyle/>
+          <a:p>
+            <a:r>
+              <a:rPr lang="en-US" dirty="0" smtClean="0"/>
+              <a:t>Demo</a:t>
+            </a:r>
+            <a:r>
+              <a:rPr lang="en-US" baseline="0" dirty="0" smtClean="0"/>
+              <a:t> 3</a:t>
+            </a:r>
+            <a:endParaRPr lang="en-US" dirty="0"/>
+          </a:p>
+        </p:txBody>
+      </p:sp>
+      <p:sp>
+        <p:nvSpPr>
+          <p:cNvPr id="4" name="Slide Number Placeholder 3"/>
+          <p:cNvSpPr>
+            <a:spLocks noGrp="1"/>
+          </p:cNvSpPr>
+          <p:nvPr>
+            <p:ph type="sldNum" sz="quarter" idx="10"/>
+          </p:nvPr>
+        </p:nvSpPr>
+        <p:spPr/>
+        <p:txBody>
+          <a:bodyPr/>
+          <a:lstStyle/>
+          <a:p>
+            <a:fld id="{432C2F01-3235-F748-B4E8-E3F35CE72FA9}" type="slidenum">
+              <a:rPr lang="en-US" smtClean="0"/>
+              <a:t>12</a:t>
+            </a:fld>
+            <a:endParaRPr lang="en-US"/>
+          </a:p>
+        </p:txBody>
+      </p:sp>
+    </p:spTree>
+    <p:extLst>
+      <p:ext uri="{BB962C8B-B14F-4D97-AF65-F5344CB8AC3E}">
+        <p14:creationId xmlns:p14="http://schemas.microsoft.com/office/powerpoint/2010/main" val="1940580691"/>
+      </p:ext>
+    </p:extLst>
+  </p:cSld>
+  <p:clrMapOvr>
+    <a:masterClrMapping/>
+  </p:clrMapOvr>
+</p:notes>
+</file>
+
+<file path=ppt/notesSlides/notesSlide4.xml><?xml version="1.0" encoding="utf-8"?>
+<p:notes xmlns:a="http://schemas.openxmlformats.org/drawingml/2006/main" xmlns:r="http://schemas.openxmlformats.org/officeDocument/2006/relationships" xmlns:p="http://schemas.openxmlformats.org/presentationml/2006/main">
+  <p:cSld>
+    <p:spTree>
+      <p:nvGrpSpPr>
+        <p:cNvPr id="1" name=""/>
+        <p:cNvGrpSpPr/>
+        <p:nvPr/>
+      </p:nvGrpSpPr>
+      <p:grpSpPr>
+        <a:xfrm>
+          <a:off x="0" y="0"/>
+          <a:ext cx="0" cy="0"/>
+          <a:chOff x="0" y="0"/>
+          <a:chExt cx="0" cy="0"/>
+        </a:xfrm>
+      </p:grpSpPr>
+      <p:sp>
+        <p:nvSpPr>
+          <p:cNvPr id="2" name="Slide Image Placeholder 1"/>
+          <p:cNvSpPr>
+            <a:spLocks noGrp="1" noRot="1" noChangeAspect="1"/>
+          </p:cNvSpPr>
+          <p:nvPr>
+            <p:ph type="sldImg"/>
+          </p:nvPr>
+        </p:nvSpPr>
+        <p:spPr/>
+      </p:sp>
+      <p:sp>
+        <p:nvSpPr>
+          <p:cNvPr id="3" name="Notes Placeholder 2"/>
+          <p:cNvSpPr>
+            <a:spLocks noGrp="1"/>
+          </p:cNvSpPr>
+          <p:nvPr>
+            <p:ph type="body" idx="1"/>
+          </p:nvPr>
+        </p:nvSpPr>
+        <p:spPr/>
+        <p:txBody>
+          <a:bodyPr/>
+          <a:lstStyle/>
+          <a:p>
+            <a:r>
+              <a:rPr lang="en-US" dirty="0" smtClean="0"/>
+              <a:t>Demo</a:t>
+            </a:r>
+            <a:r>
+              <a:rPr lang="en-US" baseline="0" dirty="0" smtClean="0"/>
+              <a:t> 4</a:t>
+            </a:r>
+            <a:endParaRPr lang="en-US" dirty="0"/>
+          </a:p>
+        </p:txBody>
+      </p:sp>
+      <p:sp>
+        <p:nvSpPr>
+          <p:cNvPr id="4" name="Slide Number Placeholder 3"/>
+          <p:cNvSpPr>
+            <a:spLocks noGrp="1"/>
+          </p:cNvSpPr>
+          <p:nvPr>
+            <p:ph type="sldNum" sz="quarter" idx="10"/>
+          </p:nvPr>
+        </p:nvSpPr>
+        <p:spPr/>
+        <p:txBody>
+          <a:bodyPr/>
+          <a:lstStyle/>
+          <a:p>
+            <a:fld id="{432C2F01-3235-F748-B4E8-E3F35CE72FA9}" type="slidenum">
+              <a:rPr lang="en-US" smtClean="0"/>
+              <a:t>13</a:t>
+            </a:fld>
+            <a:endParaRPr lang="en-US"/>
+          </a:p>
+        </p:txBody>
+      </p:sp>
+    </p:spTree>
+    <p:extLst>
+      <p:ext uri="{BB962C8B-B14F-4D97-AF65-F5344CB8AC3E}">
+        <p14:creationId xmlns:p14="http://schemas.microsoft.com/office/powerpoint/2010/main" val="506327908"/>
+      </p:ext>
+    </p:extLst>
+  </p:cSld>
+  <p:clrMapOvr>
+    <a:masterClrMapping/>
+  </p:clrMapOvr>
+</p:notes>
+</file>
+
+<file path=ppt/notesSlides/notesSlide5.xml><?xml version="1.0" encoding="utf-8"?>
+<p:notes xmlns:a="http://schemas.openxmlformats.org/drawingml/2006/main" xmlns:r="http://schemas.openxmlformats.org/officeDocument/2006/relationships" xmlns:p="http://schemas.openxmlformats.org/presentationml/2006/main">
+  <p:cSld>
+    <p:spTree>
+      <p:nvGrpSpPr>
+        <p:cNvPr id="1" name=""/>
+        <p:cNvGrpSpPr/>
+        <p:nvPr/>
+      </p:nvGrpSpPr>
+      <p:grpSpPr>
+        <a:xfrm>
+          <a:off x="0" y="0"/>
+          <a:ext cx="0" cy="0"/>
+          <a:chOff x="0" y="0"/>
+          <a:chExt cx="0" cy="0"/>
+        </a:xfrm>
+      </p:grpSpPr>
+      <p:sp>
+        <p:nvSpPr>
+          <p:cNvPr id="2" name="Slide Image Placeholder 1"/>
+          <p:cNvSpPr>
+            <a:spLocks noGrp="1" noRot="1" noChangeAspect="1"/>
+          </p:cNvSpPr>
+          <p:nvPr>
+            <p:ph type="sldImg"/>
+          </p:nvPr>
+        </p:nvSpPr>
+        <p:spPr/>
+      </p:sp>
+      <p:sp>
+        <p:nvSpPr>
+          <p:cNvPr id="3" name="Notes Placeholder 2"/>
+          <p:cNvSpPr>
+            <a:spLocks noGrp="1"/>
+          </p:cNvSpPr>
+          <p:nvPr>
+            <p:ph type="body" idx="1"/>
+          </p:nvPr>
+        </p:nvSpPr>
+        <p:spPr/>
+        <p:txBody>
+          <a:bodyPr/>
+          <a:lstStyle/>
+          <a:p>
+            <a:r>
+              <a:rPr lang="en-US" dirty="0" smtClean="0"/>
+              <a:t>Demo</a:t>
+            </a:r>
+            <a:r>
+              <a:rPr lang="en-US" baseline="0" dirty="0" smtClean="0"/>
+              <a:t> 5</a:t>
+            </a:r>
+            <a:endParaRPr lang="en-US" dirty="0"/>
+          </a:p>
+        </p:txBody>
+      </p:sp>
+      <p:sp>
+        <p:nvSpPr>
+          <p:cNvPr id="4" name="Slide Number Placeholder 3"/>
+          <p:cNvSpPr>
+            <a:spLocks noGrp="1"/>
+          </p:cNvSpPr>
+          <p:nvPr>
+            <p:ph type="sldNum" sz="quarter" idx="10"/>
+          </p:nvPr>
+        </p:nvSpPr>
+        <p:spPr/>
+        <p:txBody>
+          <a:bodyPr/>
+          <a:lstStyle/>
+          <a:p>
+            <a:fld id="{432C2F01-3235-F748-B4E8-E3F35CE72FA9}" type="slidenum">
+              <a:rPr lang="en-US" smtClean="0"/>
+              <a:t>14</a:t>
+            </a:fld>
+            <a:endParaRPr lang="en-US"/>
+          </a:p>
+        </p:txBody>
+      </p:sp>
+    </p:spTree>
+    <p:extLst>
+      <p:ext uri="{BB962C8B-B14F-4D97-AF65-F5344CB8AC3E}">
+        <p14:creationId xmlns:p14="http://schemas.microsoft.com/office/powerpoint/2010/main" val="1774535689"/>
+      </p:ext>
+    </p:extLst>
+  </p:cSld>
+  <p:clrMapOvr>
+    <a:masterClrMapping/>
+  </p:clrMapOvr>
+</p:notes>
+</file>
+
+<file path=ppt/notesSlides/notesSlide6.xml><?xml version="1.0" encoding="utf-8"?>
+<p:notes xmlns:a="http://schemas.openxmlformats.org/drawingml/2006/main" xmlns:r="http://schemas.openxmlformats.org/officeDocument/2006/relationships" xmlns:p="http://schemas.openxmlformats.org/presentationml/2006/main">
+  <p:cSld>
+    <p:spTree>
+      <p:nvGrpSpPr>
+        <p:cNvPr id="1" name=""/>
+        <p:cNvGrpSpPr/>
+        <p:nvPr/>
+      </p:nvGrpSpPr>
+      <p:grpSpPr>
+        <a:xfrm>
+          <a:off x="0" y="0"/>
+          <a:ext cx="0" cy="0"/>
+          <a:chOff x="0" y="0"/>
+          <a:chExt cx="0" cy="0"/>
+        </a:xfrm>
+      </p:grpSpPr>
+      <p:sp>
+        <p:nvSpPr>
+          <p:cNvPr id="2" name="Slide Image Placeholder 1"/>
+          <p:cNvSpPr>
+            <a:spLocks noGrp="1" noRot="1" noChangeAspect="1"/>
+          </p:cNvSpPr>
+          <p:nvPr>
+            <p:ph type="sldImg"/>
+          </p:nvPr>
+        </p:nvSpPr>
+        <p:spPr/>
+      </p:sp>
+      <p:sp>
+        <p:nvSpPr>
+          <p:cNvPr id="3" name="Notes Placeholder 2"/>
+          <p:cNvSpPr>
+            <a:spLocks noGrp="1"/>
+          </p:cNvSpPr>
+          <p:nvPr>
+            <p:ph type="body" idx="1"/>
+          </p:nvPr>
+        </p:nvSpPr>
+        <p:spPr/>
+        <p:txBody>
+          <a:bodyPr/>
+          <a:lstStyle/>
+          <a:p>
+            <a:endParaRPr lang="en-US" dirty="0"/>
+          </a:p>
+        </p:txBody>
+      </p:sp>
+      <p:sp>
+        <p:nvSpPr>
+          <p:cNvPr id="4" name="Slide Number Placeholder 3"/>
+          <p:cNvSpPr>
+            <a:spLocks noGrp="1"/>
+          </p:cNvSpPr>
+          <p:nvPr>
+            <p:ph type="sldNum" sz="quarter" idx="10"/>
+          </p:nvPr>
+        </p:nvSpPr>
+        <p:spPr/>
+        <p:txBody>
+          <a:bodyPr/>
+          <a:lstStyle/>
+          <a:p>
+            <a:fld id="{432C2F01-3235-F748-B4E8-E3F35CE72FA9}" type="slidenum">
+              <a:rPr lang="en-US" smtClean="0"/>
+              <a:t>15</a:t>
+            </a:fld>
+            <a:endParaRPr lang="en-US"/>
+          </a:p>
+        </p:txBody>
+      </p:sp>
+    </p:spTree>
+    <p:extLst>
+      <p:ext uri="{BB962C8B-B14F-4D97-AF65-F5344CB8AC3E}">
+        <p14:creationId xmlns:p14="http://schemas.microsoft.com/office/powerpoint/2010/main" val="1450583348"/>
+      </p:ext>
+    </p:extLst>
+  </p:cSld>
+  <p:clrMapOvr>
+    <a:masterClrMapping/>
+  </p:clrMapOvr>
+</p:notes>
+</file>
+
+<file path=ppt/notesSlides/notesSlide7.xml><?xml version="1.0" encoding="utf-8"?>
+<p:notes xmlns:a="http://schemas.openxmlformats.org/drawingml/2006/main" xmlns:r="http://schemas.openxmlformats.org/officeDocument/2006/relationships" xmlns:p="http://schemas.openxmlformats.org/presentationml/2006/main">
+  <p:cSld>
+    <p:spTree>
+      <p:nvGrpSpPr>
+        <p:cNvPr id="1" name=""/>
+        <p:cNvGrpSpPr/>
+        <p:nvPr/>
+      </p:nvGrpSpPr>
+      <p:grpSpPr>
+        <a:xfrm>
+          <a:off x="0" y="0"/>
+          <a:ext cx="0" cy="0"/>
+          <a:chOff x="0" y="0"/>
+          <a:chExt cx="0" cy="0"/>
+        </a:xfrm>
+      </p:grpSpPr>
+      <p:sp>
+        <p:nvSpPr>
+          <p:cNvPr id="2" name="Slide Image Placeholder 1"/>
+          <p:cNvSpPr>
+            <a:spLocks noGrp="1" noRot="1" noChangeAspect="1"/>
+          </p:cNvSpPr>
+          <p:nvPr>
+            <p:ph type="sldImg"/>
+          </p:nvPr>
+        </p:nvSpPr>
+        <p:spPr/>
+      </p:sp>
+      <p:sp>
+        <p:nvSpPr>
+          <p:cNvPr id="3" name="Notes Placeholder 2"/>
+          <p:cNvSpPr>
+            <a:spLocks noGrp="1"/>
+          </p:cNvSpPr>
+          <p:nvPr>
+            <p:ph type="body" idx="1"/>
+          </p:nvPr>
+        </p:nvSpPr>
+        <p:spPr/>
+        <p:txBody>
+          <a:bodyPr/>
+          <a:lstStyle/>
+          <a:p>
+            <a:r>
+              <a:rPr lang="en-US" dirty="0" smtClean="0"/>
+              <a:t>Demo</a:t>
+            </a:r>
+            <a:r>
+              <a:rPr lang="en-US" baseline="0" dirty="0" smtClean="0"/>
+              <a:t> 6</a:t>
+            </a:r>
+            <a:endParaRPr lang="en-US" dirty="0"/>
+          </a:p>
+        </p:txBody>
+      </p:sp>
+      <p:sp>
+        <p:nvSpPr>
+          <p:cNvPr id="4" name="Slide Number Placeholder 3"/>
+          <p:cNvSpPr>
+            <a:spLocks noGrp="1"/>
+          </p:cNvSpPr>
+          <p:nvPr>
+            <p:ph type="sldNum" sz="quarter" idx="10"/>
+          </p:nvPr>
+        </p:nvSpPr>
+        <p:spPr/>
+        <p:txBody>
+          <a:bodyPr/>
+          <a:lstStyle/>
+          <a:p>
+            <a:fld id="{432C2F01-3235-F748-B4E8-E3F35CE72FA9}" type="slidenum">
+              <a:rPr lang="en-US" smtClean="0"/>
+              <a:t>17</a:t>
+            </a:fld>
+            <a:endParaRPr lang="en-US"/>
+          </a:p>
+        </p:txBody>
+      </p:sp>
+    </p:spTree>
+    <p:extLst>
+      <p:ext uri="{BB962C8B-B14F-4D97-AF65-F5344CB8AC3E}">
+        <p14:creationId xmlns:p14="http://schemas.microsoft.com/office/powerpoint/2010/main" val="965304585"/>
+      </p:ext>
+    </p:extLst>
+  </p:cSld>
+  <p:clrMapOvr>
+    <a:masterClrMapping/>
+  </p:clrMapOvr>
+</p:notes>
+</file>
+
+<file path=ppt/notesSlides/notesSlide8.xml><?xml version="1.0" encoding="utf-8"?>
+<p:notes xmlns:a="http://schemas.openxmlformats.org/drawingml/2006/main" xmlns:r="http://schemas.openxmlformats.org/officeDocument/2006/relationships" xmlns:p="http://schemas.openxmlformats.org/presentationml/2006/main">
+  <p:cSld>
+    <p:spTree>
+      <p:nvGrpSpPr>
+        <p:cNvPr id="1" name=""/>
+        <p:cNvGrpSpPr/>
+        <p:nvPr/>
+      </p:nvGrpSpPr>
+      <p:grpSpPr>
+        <a:xfrm>
+          <a:off x="0" y="0"/>
+          <a:ext cx="0" cy="0"/>
+          <a:chOff x="0" y="0"/>
+          <a:chExt cx="0" cy="0"/>
+        </a:xfrm>
+      </p:grpSpPr>
+      <p:sp>
+        <p:nvSpPr>
+          <p:cNvPr id="2" name="Slide Image Placeholder 1"/>
+          <p:cNvSpPr>
+            <a:spLocks noGrp="1" noRot="1" noChangeAspect="1"/>
+          </p:cNvSpPr>
+          <p:nvPr>
+            <p:ph type="sldImg"/>
+          </p:nvPr>
+        </p:nvSpPr>
+        <p:spPr/>
+      </p:sp>
+      <p:sp>
+        <p:nvSpPr>
+          <p:cNvPr id="3" name="Notes Placeholder 2"/>
+          <p:cNvSpPr>
+            <a:spLocks noGrp="1"/>
+          </p:cNvSpPr>
+          <p:nvPr>
+            <p:ph type="body" idx="1"/>
+          </p:nvPr>
+        </p:nvSpPr>
+        <p:spPr/>
+        <p:txBody>
+          <a:bodyPr/>
+          <a:lstStyle/>
+          <a:p>
+            <a:r>
+              <a:rPr lang="en-US" dirty="0" smtClean="0"/>
+              <a:t>Demos</a:t>
+            </a:r>
+            <a:r>
+              <a:rPr lang="en-US" baseline="0" dirty="0" smtClean="0"/>
+              <a:t> 7-9</a:t>
+            </a:r>
+            <a:endParaRPr lang="en-US" dirty="0"/>
+          </a:p>
+        </p:txBody>
+      </p:sp>
+      <p:sp>
+        <p:nvSpPr>
+          <p:cNvPr id="4" name="Slide Number Placeholder 3"/>
+          <p:cNvSpPr>
+            <a:spLocks noGrp="1"/>
+          </p:cNvSpPr>
+          <p:nvPr>
+            <p:ph type="sldNum" sz="quarter" idx="10"/>
+          </p:nvPr>
+        </p:nvSpPr>
+        <p:spPr/>
+        <p:txBody>
+          <a:bodyPr/>
+          <a:lstStyle/>
+          <a:p>
+            <a:fld id="{432C2F01-3235-F748-B4E8-E3F35CE72FA9}" type="slidenum">
+              <a:rPr lang="en-US" smtClean="0"/>
+              <a:t>18</a:t>
+            </a:fld>
+            <a:endParaRPr lang="en-US"/>
+          </a:p>
+        </p:txBody>
+      </p:sp>
+    </p:spTree>
+    <p:extLst>
+      <p:ext uri="{BB962C8B-B14F-4D97-AF65-F5344CB8AC3E}">
+        <p14:creationId xmlns:p14="http://schemas.microsoft.com/office/powerpoint/2010/main" val="1691589189"/>
+      </p:ext>
+    </p:extLst>
+  </p:cSld>
+  <p:clrMapOvr>
+    <a:masterClrMapping/>
+  </p:clrMapOvr>
+</p:notes>
+</file>
+
+<file path=ppt/notesSlides/notesSlide9.xml><?xml version="1.0" encoding="utf-8"?>
+<p:notes xmlns:a="http://schemas.openxmlformats.org/drawingml/2006/main" xmlns:r="http://schemas.openxmlformats.org/officeDocument/2006/relationships" xmlns:p="http://schemas.openxmlformats.org/presentationml/2006/main">
+  <p:cSld>
+    <p:spTree>
+      <p:nvGrpSpPr>
+        <p:cNvPr id="1" name=""/>
+        <p:cNvGrpSpPr/>
+        <p:nvPr/>
+      </p:nvGrpSpPr>
+      <p:grpSpPr>
+        <a:xfrm>
+          <a:off x="0" y="0"/>
+          <a:ext cx="0" cy="0"/>
+          <a:chOff x="0" y="0"/>
+          <a:chExt cx="0" cy="0"/>
+        </a:xfrm>
+      </p:grpSpPr>
+      <p:sp>
+        <p:nvSpPr>
+          <p:cNvPr id="2" name="Slide Image Placeholder 1"/>
+          <p:cNvSpPr>
+            <a:spLocks noGrp="1" noRot="1" noChangeAspect="1"/>
+          </p:cNvSpPr>
+          <p:nvPr>
+            <p:ph type="sldImg"/>
+          </p:nvPr>
+        </p:nvSpPr>
+        <p:spPr/>
+      </p:sp>
+      <p:sp>
+        <p:nvSpPr>
+          <p:cNvPr id="3" name="Notes Placeholder 2"/>
+          <p:cNvSpPr>
+            <a:spLocks noGrp="1"/>
+          </p:cNvSpPr>
+          <p:nvPr>
+            <p:ph type="body" idx="1"/>
+          </p:nvPr>
+        </p:nvSpPr>
+        <p:spPr/>
+        <p:txBody>
+          <a:bodyPr/>
+          <a:lstStyle/>
+          <a:p>
+            <a:r>
+              <a:rPr lang="en-US" dirty="0" smtClean="0"/>
+              <a:t>Demo</a:t>
+            </a:r>
+            <a:r>
+              <a:rPr lang="en-US" baseline="0" dirty="0" smtClean="0"/>
+              <a:t> 10</a:t>
+            </a:r>
+            <a:endParaRPr lang="en-US" dirty="0"/>
+          </a:p>
+        </p:txBody>
+      </p:sp>
+      <p:sp>
+        <p:nvSpPr>
+          <p:cNvPr id="4" name="Slide Number Placeholder 3"/>
+          <p:cNvSpPr>
+            <a:spLocks noGrp="1"/>
+          </p:cNvSpPr>
+          <p:nvPr>
+            <p:ph type="sldNum" sz="quarter" idx="10"/>
+          </p:nvPr>
+        </p:nvSpPr>
+        <p:spPr/>
+        <p:txBody>
+          <a:bodyPr/>
+          <a:lstStyle/>
+          <a:p>
+            <a:fld id="{432C2F01-3235-F748-B4E8-E3F35CE72FA9}" type="slidenum">
+              <a:rPr lang="en-US" smtClean="0"/>
+              <a:t>19</a:t>
+            </a:fld>
+            <a:endParaRPr lang="en-US"/>
+          </a:p>
+        </p:txBody>
+      </p:sp>
+    </p:spTree>
+    <p:extLst>
+      <p:ext uri="{BB962C8B-B14F-4D97-AF65-F5344CB8AC3E}">
+        <p14:creationId xmlns:p14="http://schemas.microsoft.com/office/powerpoint/2010/main" val="135041932"/>
+      </p:ext>
+    </p:extLst>
+  </p:cSld>
+  <p:clrMapOvr>
+    <a:masterClrMapping/>
+  </p:clrMapOvr>
+</p:notes>
+</file>
+
 <file path=ppt/slideLayouts/slideLayout1.xml><?xml version="1.0" encoding="utf-8"?>
 <p:sldLayout xmlns:a="http://schemas.openxmlformats.org/drawingml/2006/main" xmlns:r="http://schemas.openxmlformats.org/officeDocument/2006/relationships" xmlns:p="http://schemas.openxmlformats.org/presentationml/2006/main" type="title" preserve="1">
   <p:cSld name="Title Slide">
@@ -616,7 +1538,7 @@
           <a:p>
             <a:fld id="{6BBEF6B5-29B0-3843-BC6B-0F62F44C2C43}" type="datetimeFigureOut">
               <a:rPr lang="en-US" smtClean="0"/>
-              <a:t>5/10/17</a:t>
+              <a:t>6/22/17</a:t>
             </a:fld>
             <a:endParaRPr lang="en-US"/>
           </a:p>
@@ -781,7 +1703,7 @@
           <a:p>
             <a:fld id="{6BBEF6B5-29B0-3843-BC6B-0F62F44C2C43}" type="datetimeFigureOut">
               <a:rPr lang="en-US" smtClean="0"/>
-              <a:t>5/10/17</a:t>
+              <a:t>6/22/17</a:t>
             </a:fld>
             <a:endParaRPr lang="en-US"/>
           </a:p>
@@ -956,7 +1878,7 @@
           <a:p>
             <a:fld id="{6BBEF6B5-29B0-3843-BC6B-0F62F44C2C43}" type="datetimeFigureOut">
               <a:rPr lang="en-US" smtClean="0"/>
-              <a:t>5/10/17</a:t>
+              <a:t>6/22/17</a:t>
             </a:fld>
             <a:endParaRPr lang="en-US"/>
           </a:p>
@@ -1121,7 +2043,7 @@
           <a:p>
             <a:fld id="{6BBEF6B5-29B0-3843-BC6B-0F62F44C2C43}" type="datetimeFigureOut">
               <a:rPr lang="en-US" smtClean="0"/>
-              <a:t>5/10/17</a:t>
+              <a:t>6/22/17</a:t>
             </a:fld>
             <a:endParaRPr lang="en-US"/>
           </a:p>
@@ -1362,7 +2284,7 @@
           <a:p>
             <a:fld id="{6BBEF6B5-29B0-3843-BC6B-0F62F44C2C43}" type="datetimeFigureOut">
               <a:rPr lang="en-US" smtClean="0"/>
-              <a:t>5/10/17</a:t>
+              <a:t>6/22/17</a:t>
             </a:fld>
             <a:endParaRPr lang="en-US"/>
           </a:p>
@@ -1589,7 +2511,7 @@
           <a:p>
             <a:fld id="{6BBEF6B5-29B0-3843-BC6B-0F62F44C2C43}" type="datetimeFigureOut">
               <a:rPr lang="en-US" smtClean="0"/>
-              <a:t>5/10/17</a:t>
+              <a:t>6/22/17</a:t>
             </a:fld>
             <a:endParaRPr lang="en-US"/>
           </a:p>
@@ -1951,7 +2873,7 @@
           <a:p>
             <a:fld id="{6BBEF6B5-29B0-3843-BC6B-0F62F44C2C43}" type="datetimeFigureOut">
               <a:rPr lang="en-US" smtClean="0"/>
-              <a:t>5/10/17</a:t>
+              <a:t>6/22/17</a:t>
             </a:fld>
             <a:endParaRPr lang="en-US"/>
           </a:p>
@@ -2064,7 +2986,7 @@
           <a:p>
             <a:fld id="{6BBEF6B5-29B0-3843-BC6B-0F62F44C2C43}" type="datetimeFigureOut">
               <a:rPr lang="en-US" smtClean="0"/>
-              <a:t>5/10/17</a:t>
+              <a:t>6/22/17</a:t>
             </a:fld>
             <a:endParaRPr lang="en-US"/>
           </a:p>
@@ -2154,7 +3076,7 @@
           <a:p>
             <a:fld id="{6BBEF6B5-29B0-3843-BC6B-0F62F44C2C43}" type="datetimeFigureOut">
               <a:rPr lang="en-US" smtClean="0"/>
-              <a:t>5/10/17</a:t>
+              <a:t>6/22/17</a:t>
             </a:fld>
             <a:endParaRPr lang="en-US"/>
           </a:p>
@@ -2426,7 +3348,7 @@
           <a:p>
             <a:fld id="{6BBEF6B5-29B0-3843-BC6B-0F62F44C2C43}" type="datetimeFigureOut">
               <a:rPr lang="en-US" smtClean="0"/>
-              <a:t>5/10/17</a:t>
+              <a:t>6/22/17</a:t>
             </a:fld>
             <a:endParaRPr lang="en-US"/>
           </a:p>
@@ -2674,7 +3596,7 @@
           <a:p>
             <a:fld id="{6BBEF6B5-29B0-3843-BC6B-0F62F44C2C43}" type="datetimeFigureOut">
               <a:rPr lang="en-US" smtClean="0"/>
-              <a:t>5/10/17</a:t>
+              <a:t>6/22/17</a:t>
             </a:fld>
             <a:endParaRPr lang="en-US"/>
           </a:p>
@@ -2882,7 +3804,7 @@
           <a:p>
             <a:fld id="{6BBEF6B5-29B0-3843-BC6B-0F62F44C2C43}" type="datetimeFigureOut">
               <a:rPr lang="en-US" smtClean="0"/>
-              <a:t>5/10/17</a:t>
+              <a:t>6/22/17</a:t>
             </a:fld>
             <a:endParaRPr lang="en-US"/>
           </a:p>
@@ -3415,7 +4337,7 @@
           <a:p>
             <a:r>
               <a:rPr lang="en-US" dirty="0" smtClean="0"/>
-              <a:t>commands</a:t>
+              <a:t>demo - contributions</a:t>
             </a:r>
             <a:endParaRPr lang="en-US" dirty="0"/>
           </a:p>
@@ -3436,14 +4358,17 @@
           <a:bodyPr/>
           <a:lstStyle/>
           <a:p>
-            <a:endParaRPr lang="en-US" dirty="0" smtClean="0"/>
+            <a:r>
+              <a:rPr lang="en-US" dirty="0" smtClean="0"/>
+              <a:t>my extension contributes a new snippet to the product</a:t>
+            </a:r>
           </a:p>
         </p:txBody>
       </p:sp>
     </p:spTree>
     <p:extLst>
       <p:ext uri="{BB962C8B-B14F-4D97-AF65-F5344CB8AC3E}">
-        <p14:creationId xmlns:p14="http://schemas.microsoft.com/office/powerpoint/2010/main" val="244165674"/>
+        <p14:creationId xmlns:p14="http://schemas.microsoft.com/office/powerpoint/2010/main" val="1415727568"/>
       </p:ext>
     </p:extLst>
   </p:cSld>
@@ -3497,7 +4422,7 @@
           <a:p>
             <a:r>
               <a:rPr lang="en-US" dirty="0" smtClean="0"/>
-              <a:t>user experience</a:t>
+              <a:t>commands</a:t>
             </a:r>
             <a:endParaRPr lang="en-US" dirty="0"/>
           </a:p>
@@ -3518,14 +4443,17 @@
           <a:bodyPr/>
           <a:lstStyle/>
           <a:p>
-            <a:endParaRPr lang="en-US" dirty="0" smtClean="0"/>
+            <a:r>
+              <a:rPr lang="en-US" dirty="0" smtClean="0"/>
+              <a:t>how vs code extensions know when and how to respond</a:t>
+            </a:r>
           </a:p>
         </p:txBody>
       </p:sp>
     </p:spTree>
     <p:extLst>
       <p:ext uri="{BB962C8B-B14F-4D97-AF65-F5344CB8AC3E}">
-        <p14:creationId xmlns:p14="http://schemas.microsoft.com/office/powerpoint/2010/main" val="804474398"/>
+        <p14:creationId xmlns:p14="http://schemas.microsoft.com/office/powerpoint/2010/main" val="244165674"/>
       </p:ext>
     </p:extLst>
   </p:cSld>
@@ -3579,7 +4507,15 @@
           <a:p>
             <a:r>
               <a:rPr lang="en-US" dirty="0" smtClean="0"/>
-              <a:t>editor interaction</a:t>
+              <a:t>demo </a:t>
+            </a:r>
+            <a:r>
+              <a:rPr lang="mr-IN" dirty="0" smtClean="0"/>
+              <a:t>–</a:t>
+            </a:r>
+            <a:r>
+              <a:rPr lang="en-US" dirty="0" smtClean="0"/>
+              <a:t> creating commands</a:t>
             </a:r>
             <a:endParaRPr lang="en-US" dirty="0"/>
           </a:p>
@@ -3600,14 +4536,17 @@
           <a:bodyPr/>
           <a:lstStyle/>
           <a:p>
-            <a:endParaRPr lang="en-US" dirty="0" smtClean="0"/>
+            <a:r>
+              <a:rPr lang="en-US" dirty="0" smtClean="0"/>
+              <a:t>create a custom command that responds to being triggered </a:t>
+            </a:r>
           </a:p>
         </p:txBody>
       </p:sp>
     </p:spTree>
     <p:extLst>
       <p:ext uri="{BB962C8B-B14F-4D97-AF65-F5344CB8AC3E}">
-        <p14:creationId xmlns:p14="http://schemas.microsoft.com/office/powerpoint/2010/main" val="1998717148"/>
+        <p14:creationId xmlns:p14="http://schemas.microsoft.com/office/powerpoint/2010/main" val="1655672410"/>
       </p:ext>
     </p:extLst>
   </p:cSld>
@@ -3661,6 +4600,1437 @@
           <a:p>
             <a:r>
               <a:rPr lang="en-US" dirty="0" smtClean="0"/>
+              <a:t>demo </a:t>
+            </a:r>
+            <a:r>
+              <a:rPr lang="mr-IN" dirty="0" smtClean="0"/>
+              <a:t>–</a:t>
+            </a:r>
+            <a:r>
+              <a:rPr lang="en-US" dirty="0" smtClean="0"/>
+              <a:t> contributing commands</a:t>
+            </a:r>
+            <a:endParaRPr lang="en-US" dirty="0"/>
+          </a:p>
+        </p:txBody>
+      </p:sp>
+      <p:sp>
+        <p:nvSpPr>
+          <p:cNvPr id="5" name="Text Placeholder 4"/>
+          <p:cNvSpPr>
+            <a:spLocks noGrp="1"/>
+          </p:cNvSpPr>
+          <p:nvPr>
+            <p:ph type="body" idx="1"/>
+          </p:nvPr>
+        </p:nvSpPr>
+        <p:spPr/>
+        <p:txBody>
+          <a:bodyPr/>
+          <a:lstStyle/>
+          <a:p>
+            <a:r>
+              <a:rPr lang="en-US" dirty="0" smtClean="0"/>
+              <a:t>contributing commands to the running instance of visual studio code</a:t>
+            </a:r>
+          </a:p>
+        </p:txBody>
+      </p:sp>
+    </p:spTree>
+    <p:extLst>
+      <p:ext uri="{BB962C8B-B14F-4D97-AF65-F5344CB8AC3E}">
+        <p14:creationId xmlns:p14="http://schemas.microsoft.com/office/powerpoint/2010/main" val="307452370"/>
+      </p:ext>
+    </p:extLst>
+  </p:cSld>
+  <p:clrMapOvr>
+    <a:masterClrMapping/>
+  </p:clrMapOvr>
+  <p:transition spd="slow">
+    <p:push/>
+  </p:transition>
+  <p:timing>
+    <p:tnLst>
+      <p:par>
+        <p:cTn id="1" dur="indefinite" restart="never" nodeType="tmRoot"/>
+      </p:par>
+    </p:tnLst>
+  </p:timing>
+</p:sld>
+</file>
+
+<file path=ppt/slides/slide14.xml><?xml version="1.0" encoding="utf-8"?>
+<p:sld xmlns:a="http://schemas.openxmlformats.org/drawingml/2006/main" xmlns:r="http://schemas.openxmlformats.org/officeDocument/2006/relationships" xmlns:p="http://schemas.openxmlformats.org/presentationml/2006/main">
+  <p:cSld>
+    <p:spTree>
+      <p:nvGrpSpPr>
+        <p:cNvPr id="1" name=""/>
+        <p:cNvGrpSpPr/>
+        <p:nvPr/>
+      </p:nvGrpSpPr>
+      <p:grpSpPr>
+        <a:xfrm>
+          <a:off x="0" y="0"/>
+          <a:ext cx="0" cy="0"/>
+          <a:chOff x="0" y="0"/>
+          <a:chExt cx="0" cy="0"/>
+        </a:xfrm>
+      </p:grpSpPr>
+      <p:sp>
+        <p:nvSpPr>
+          <p:cNvPr id="4" name="Title 3"/>
+          <p:cNvSpPr>
+            <a:spLocks noGrp="1"/>
+          </p:cNvSpPr>
+          <p:nvPr>
+            <p:ph type="title"/>
+          </p:nvPr>
+        </p:nvSpPr>
+        <p:spPr/>
+        <p:txBody>
+          <a:bodyPr/>
+          <a:lstStyle/>
+          <a:p>
+            <a:r>
+              <a:rPr lang="en-US" dirty="0" smtClean="0"/>
+              <a:t>demo </a:t>
+            </a:r>
+            <a:r>
+              <a:rPr lang="mr-IN" dirty="0" smtClean="0"/>
+              <a:t>–</a:t>
+            </a:r>
+            <a:r>
+              <a:rPr lang="en-US" dirty="0" smtClean="0"/>
+              <a:t> registering commands</a:t>
+            </a:r>
+            <a:endParaRPr lang="en-US" dirty="0"/>
+          </a:p>
+        </p:txBody>
+      </p:sp>
+      <p:sp>
+        <p:nvSpPr>
+          <p:cNvPr id="5" name="Text Placeholder 4"/>
+          <p:cNvSpPr>
+            <a:spLocks noGrp="1"/>
+          </p:cNvSpPr>
+          <p:nvPr>
+            <p:ph type="body" idx="1"/>
+          </p:nvPr>
+        </p:nvSpPr>
+        <p:spPr/>
+        <p:txBody>
+          <a:bodyPr/>
+          <a:lstStyle/>
+          <a:p>
+            <a:r>
+              <a:rPr lang="en-US" dirty="0" smtClean="0"/>
+              <a:t>wiring custom commands up to the custom extension’s context</a:t>
+            </a:r>
+          </a:p>
+        </p:txBody>
+      </p:sp>
+    </p:spTree>
+    <p:extLst>
+      <p:ext uri="{BB962C8B-B14F-4D97-AF65-F5344CB8AC3E}">
+        <p14:creationId xmlns:p14="http://schemas.microsoft.com/office/powerpoint/2010/main" val="742084374"/>
+      </p:ext>
+    </p:extLst>
+  </p:cSld>
+  <p:clrMapOvr>
+    <a:masterClrMapping/>
+  </p:clrMapOvr>
+  <p:transition spd="slow">
+    <p:push/>
+  </p:transition>
+  <p:timing>
+    <p:tnLst>
+      <p:par>
+        <p:cTn id="1" dur="indefinite" restart="never" nodeType="tmRoot"/>
+      </p:par>
+    </p:tnLst>
+  </p:timing>
+</p:sld>
+</file>
+
+<file path=ppt/slides/slide15.xml><?xml version="1.0" encoding="utf-8"?>
+<p:sld xmlns:a="http://schemas.openxmlformats.org/drawingml/2006/main" xmlns:r="http://schemas.openxmlformats.org/officeDocument/2006/relationships" xmlns:p="http://schemas.openxmlformats.org/presentationml/2006/main">
+  <p:cSld>
+    <p:spTree>
+      <p:nvGrpSpPr>
+        <p:cNvPr id="1" name=""/>
+        <p:cNvGrpSpPr/>
+        <p:nvPr/>
+      </p:nvGrpSpPr>
+      <p:grpSpPr>
+        <a:xfrm>
+          <a:off x="0" y="0"/>
+          <a:ext cx="0" cy="0"/>
+          <a:chOff x="0" y="0"/>
+          <a:chExt cx="0" cy="0"/>
+        </a:xfrm>
+      </p:grpSpPr>
+      <p:sp>
+        <p:nvSpPr>
+          <p:cNvPr id="4" name="Title 3"/>
+          <p:cNvSpPr>
+            <a:spLocks noGrp="1"/>
+          </p:cNvSpPr>
+          <p:nvPr>
+            <p:ph type="title"/>
+          </p:nvPr>
+        </p:nvSpPr>
+        <p:spPr/>
+        <p:txBody>
+          <a:bodyPr/>
+          <a:lstStyle/>
+          <a:p>
+            <a:r>
+              <a:rPr lang="en-US" dirty="0" smtClean="0"/>
+              <a:t>user experience</a:t>
+            </a:r>
+            <a:endParaRPr lang="en-US" dirty="0"/>
+          </a:p>
+        </p:txBody>
+      </p:sp>
+      <p:sp>
+        <p:nvSpPr>
+          <p:cNvPr id="5" name="Text Placeholder 4"/>
+          <p:cNvSpPr>
+            <a:spLocks noGrp="1"/>
+          </p:cNvSpPr>
+          <p:nvPr>
+            <p:ph type="body" idx="1"/>
+          </p:nvPr>
+        </p:nvSpPr>
+        <p:spPr/>
+        <p:txBody>
+          <a:bodyPr/>
+          <a:lstStyle/>
+          <a:p>
+            <a:endParaRPr lang="en-US" dirty="0" smtClean="0"/>
+          </a:p>
+        </p:txBody>
+      </p:sp>
+    </p:spTree>
+    <p:extLst>
+      <p:ext uri="{BB962C8B-B14F-4D97-AF65-F5344CB8AC3E}">
+        <p14:creationId xmlns:p14="http://schemas.microsoft.com/office/powerpoint/2010/main" val="804474398"/>
+      </p:ext>
+    </p:extLst>
+  </p:cSld>
+  <p:clrMapOvr>
+    <a:masterClrMapping/>
+  </p:clrMapOvr>
+  <p:transition spd="slow">
+    <p:push/>
+  </p:transition>
+  <p:timing>
+    <p:tnLst>
+      <p:par>
+        <p:cTn id="1" dur="indefinite" restart="never" nodeType="tmRoot"/>
+      </p:par>
+    </p:tnLst>
+  </p:timing>
+</p:sld>
+</file>
+
+<file path=ppt/slides/slide16.xml><?xml version="1.0" encoding="utf-8"?>
+<p:sld xmlns:a="http://schemas.openxmlformats.org/drawingml/2006/main" xmlns:r="http://schemas.openxmlformats.org/officeDocument/2006/relationships" xmlns:p="http://schemas.openxmlformats.org/presentationml/2006/main">
+  <p:cSld>
+    <p:spTree>
+      <p:nvGrpSpPr>
+        <p:cNvPr id="1" name=""/>
+        <p:cNvGrpSpPr/>
+        <p:nvPr/>
+      </p:nvGrpSpPr>
+      <p:grpSpPr>
+        <a:xfrm>
+          <a:off x="0" y="0"/>
+          <a:ext cx="0" cy="0"/>
+          <a:chOff x="0" y="0"/>
+          <a:chExt cx="0" cy="0"/>
+        </a:xfrm>
+      </p:grpSpPr>
+      <p:sp>
+        <p:nvSpPr>
+          <p:cNvPr id="4" name="Title 3"/>
+          <p:cNvSpPr>
+            <a:spLocks noGrp="1"/>
+          </p:cNvSpPr>
+          <p:nvPr>
+            <p:ph type="title"/>
+          </p:nvPr>
+        </p:nvSpPr>
+        <p:spPr/>
+        <p:txBody>
+          <a:bodyPr/>
+          <a:lstStyle/>
+          <a:p>
+            <a:r>
+              <a:rPr lang="en-US" dirty="0" smtClean="0"/>
+              <a:t>user experience in vs code</a:t>
+            </a:r>
+            <a:endParaRPr lang="en-US" dirty="0"/>
+          </a:p>
+        </p:txBody>
+      </p:sp>
+      <p:sp>
+        <p:nvSpPr>
+          <p:cNvPr id="7" name="Text Placeholder 6"/>
+          <p:cNvSpPr>
+            <a:spLocks noGrp="1"/>
+          </p:cNvSpPr>
+          <p:nvPr>
+            <p:ph type="body" idx="1"/>
+          </p:nvPr>
+        </p:nvSpPr>
+        <p:spPr>
+          <a:xfrm>
+            <a:off x="839788" y="1243840"/>
+            <a:ext cx="5157787" cy="823912"/>
+          </a:xfrm>
+        </p:spPr>
+        <p:txBody>
+          <a:bodyPr/>
+          <a:lstStyle/>
+          <a:p>
+            <a:r>
+              <a:rPr lang="en-US" dirty="0" smtClean="0"/>
+              <a:t>purpose</a:t>
+            </a:r>
+            <a:endParaRPr lang="en-US" dirty="0"/>
+          </a:p>
+        </p:txBody>
+      </p:sp>
+      <p:sp>
+        <p:nvSpPr>
+          <p:cNvPr id="8" name="Content Placeholder 7"/>
+          <p:cNvSpPr>
+            <a:spLocks noGrp="1"/>
+          </p:cNvSpPr>
+          <p:nvPr>
+            <p:ph sz="half" idx="2"/>
+          </p:nvPr>
+        </p:nvSpPr>
+        <p:spPr>
+          <a:xfrm>
+            <a:off x="839788" y="2067752"/>
+            <a:ext cx="5157787" cy="3684588"/>
+          </a:xfrm>
+        </p:spPr>
+        <p:txBody>
+          <a:bodyPr/>
+          <a:lstStyle/>
+          <a:p>
+            <a:pPr marL="0" indent="0">
+              <a:buNone/>
+            </a:pPr>
+            <a:r>
+              <a:rPr lang="en-US" sz="2000" dirty="0" smtClean="0"/>
+              <a:t>progress updates</a:t>
+            </a:r>
+          </a:p>
+          <a:p>
+            <a:pPr marL="0" indent="0">
+              <a:buNone/>
+            </a:pPr>
+            <a:r>
+              <a:rPr lang="en-US" sz="2000" dirty="0" smtClean="0"/>
+              <a:t>toolbar buttons</a:t>
+            </a:r>
+          </a:p>
+          <a:p>
+            <a:pPr marL="0" indent="0">
+              <a:buNone/>
+            </a:pPr>
+            <a:r>
+              <a:rPr lang="en-US" sz="2000" dirty="0" smtClean="0"/>
+              <a:t>select lists or combo boxes</a:t>
+            </a:r>
+          </a:p>
+          <a:p>
+            <a:pPr marL="0" indent="0">
+              <a:buNone/>
+            </a:pPr>
+            <a:r>
+              <a:rPr lang="en-US" sz="2000" dirty="0" smtClean="0"/>
+              <a:t>collecting input</a:t>
+            </a:r>
+          </a:p>
+          <a:p>
+            <a:pPr marL="0" indent="0">
+              <a:buNone/>
+            </a:pPr>
+            <a:r>
+              <a:rPr lang="en-US" sz="2000" dirty="0" smtClean="0"/>
+              <a:t>tell the customer something happened</a:t>
+            </a:r>
+          </a:p>
+          <a:p>
+            <a:pPr marL="0" indent="0">
+              <a:buNone/>
+            </a:pPr>
+            <a:r>
+              <a:rPr lang="en-US" sz="2000" dirty="0" smtClean="0"/>
+              <a:t>tell the customer something broke</a:t>
+            </a:r>
+            <a:endParaRPr lang="en-US" sz="2000" dirty="0"/>
+          </a:p>
+        </p:txBody>
+      </p:sp>
+      <p:sp>
+        <p:nvSpPr>
+          <p:cNvPr id="9" name="Text Placeholder 8"/>
+          <p:cNvSpPr>
+            <a:spLocks noGrp="1"/>
+          </p:cNvSpPr>
+          <p:nvPr>
+            <p:ph type="body" sz="quarter" idx="3"/>
+          </p:nvPr>
+        </p:nvSpPr>
+        <p:spPr>
+          <a:xfrm>
+            <a:off x="6172200" y="1243840"/>
+            <a:ext cx="5183188" cy="823912"/>
+          </a:xfrm>
+        </p:spPr>
+        <p:txBody>
+          <a:bodyPr/>
+          <a:lstStyle/>
+          <a:p>
+            <a:r>
+              <a:rPr lang="en-US" dirty="0" err="1" smtClean="0"/>
+              <a:t>api</a:t>
+            </a:r>
+            <a:endParaRPr lang="en-US" dirty="0"/>
+          </a:p>
+        </p:txBody>
+      </p:sp>
+      <p:sp>
+        <p:nvSpPr>
+          <p:cNvPr id="10" name="Content Placeholder 9"/>
+          <p:cNvSpPr>
+            <a:spLocks noGrp="1"/>
+          </p:cNvSpPr>
+          <p:nvPr>
+            <p:ph sz="quarter" idx="4"/>
+          </p:nvPr>
+        </p:nvSpPr>
+        <p:spPr>
+          <a:xfrm>
+            <a:off x="6172200" y="2067752"/>
+            <a:ext cx="5183188" cy="3684588"/>
+          </a:xfrm>
+        </p:spPr>
+        <p:txBody>
+          <a:bodyPr>
+            <a:normAutofit/>
+          </a:bodyPr>
+          <a:lstStyle/>
+          <a:p>
+            <a:pPr marL="0" indent="0">
+              <a:buNone/>
+            </a:pPr>
+            <a:r>
+              <a:rPr lang="en-US" sz="2000" dirty="0" err="1" smtClean="0"/>
+              <a:t>window.createOutputChannel</a:t>
+            </a:r>
+            <a:endParaRPr lang="en-US" sz="2000" dirty="0" smtClean="0"/>
+          </a:p>
+          <a:p>
+            <a:pPr marL="0" indent="0">
+              <a:buNone/>
+            </a:pPr>
+            <a:r>
+              <a:rPr lang="en-US" sz="2000" dirty="0" err="1"/>
+              <a:t>window.createStatusBarItem</a:t>
+            </a:r>
+            <a:endParaRPr lang="en-US" sz="2000" dirty="0"/>
+          </a:p>
+          <a:p>
+            <a:pPr marL="0" indent="0">
+              <a:buNone/>
+            </a:pPr>
+            <a:r>
+              <a:rPr lang="en-US" sz="2000" dirty="0" err="1" smtClean="0"/>
+              <a:t>window.showQuickPick</a:t>
+            </a:r>
+            <a:endParaRPr lang="en-US" sz="2000" dirty="0" smtClean="0"/>
+          </a:p>
+          <a:p>
+            <a:pPr marL="0" indent="0">
+              <a:buNone/>
+            </a:pPr>
+            <a:r>
+              <a:rPr lang="en-US" sz="2000" dirty="0" err="1" smtClean="0"/>
+              <a:t>window.showInputBox</a:t>
+            </a:r>
+            <a:endParaRPr lang="en-US" sz="2000" dirty="0" smtClean="0"/>
+          </a:p>
+          <a:p>
+            <a:pPr marL="0" indent="0">
+              <a:buNone/>
+            </a:pPr>
+            <a:r>
+              <a:rPr lang="en-US" sz="2000" dirty="0" err="1" smtClean="0"/>
+              <a:t>window.showInformationMessage</a:t>
+            </a:r>
+            <a:endParaRPr lang="en-US" sz="2000" dirty="0" smtClean="0"/>
+          </a:p>
+          <a:p>
+            <a:pPr marL="0" indent="0">
+              <a:buNone/>
+            </a:pPr>
+            <a:r>
+              <a:rPr lang="en-US" sz="2000" dirty="0" err="1" smtClean="0"/>
+              <a:t>window.showErrorMessage</a:t>
+            </a:r>
+            <a:endParaRPr lang="en-US" sz="2000" dirty="0"/>
+          </a:p>
+        </p:txBody>
+      </p:sp>
+    </p:spTree>
+    <p:extLst>
+      <p:ext uri="{BB962C8B-B14F-4D97-AF65-F5344CB8AC3E}">
+        <p14:creationId xmlns:p14="http://schemas.microsoft.com/office/powerpoint/2010/main" val="1796135866"/>
+      </p:ext>
+    </p:extLst>
+  </p:cSld>
+  <p:clrMapOvr>
+    <a:masterClrMapping/>
+  </p:clrMapOvr>
+  <p:timing>
+    <p:tnLst>
+      <p:par>
+        <p:cTn id="1" dur="indefinite" restart="never" nodeType="tmRoot"/>
+      </p:par>
+    </p:tnLst>
+  </p:timing>
+</p:sld>
+</file>
+
+<file path=ppt/slides/slide17.xml><?xml version="1.0" encoding="utf-8"?>
+<p:sld xmlns:a="http://schemas.openxmlformats.org/drawingml/2006/main" xmlns:r="http://schemas.openxmlformats.org/officeDocument/2006/relationships" xmlns:p="http://schemas.openxmlformats.org/presentationml/2006/main">
+  <p:cSld>
+    <p:spTree>
+      <p:nvGrpSpPr>
+        <p:cNvPr id="1" name=""/>
+        <p:cNvGrpSpPr/>
+        <p:nvPr/>
+      </p:nvGrpSpPr>
+      <p:grpSpPr>
+        <a:xfrm>
+          <a:off x="0" y="0"/>
+          <a:ext cx="0" cy="0"/>
+          <a:chOff x="0" y="0"/>
+          <a:chExt cx="0" cy="0"/>
+        </a:xfrm>
+      </p:grpSpPr>
+      <p:sp>
+        <p:nvSpPr>
+          <p:cNvPr id="4" name="Title 3"/>
+          <p:cNvSpPr>
+            <a:spLocks noGrp="1"/>
+          </p:cNvSpPr>
+          <p:nvPr>
+            <p:ph type="title"/>
+          </p:nvPr>
+        </p:nvSpPr>
+        <p:spPr/>
+        <p:txBody>
+          <a:bodyPr/>
+          <a:lstStyle/>
+          <a:p>
+            <a:r>
+              <a:rPr lang="en-US" dirty="0" smtClean="0"/>
+              <a:t>demo </a:t>
+            </a:r>
+            <a:r>
+              <a:rPr lang="mr-IN" dirty="0" smtClean="0"/>
+              <a:t>–</a:t>
+            </a:r>
+            <a:r>
+              <a:rPr lang="en-US" dirty="0" smtClean="0"/>
+              <a:t> outputting messages</a:t>
+            </a:r>
+            <a:endParaRPr lang="en-US" dirty="0"/>
+          </a:p>
+        </p:txBody>
+      </p:sp>
+      <p:sp>
+        <p:nvSpPr>
+          <p:cNvPr id="5" name="Text Placeholder 4"/>
+          <p:cNvSpPr>
+            <a:spLocks noGrp="1"/>
+          </p:cNvSpPr>
+          <p:nvPr>
+            <p:ph type="body" idx="1"/>
+          </p:nvPr>
+        </p:nvSpPr>
+        <p:spPr/>
+        <p:txBody>
+          <a:bodyPr/>
+          <a:lstStyle/>
+          <a:p>
+            <a:r>
+              <a:rPr lang="en-US" dirty="0" smtClean="0"/>
+              <a:t>don’t forget to keep the user informed on progress and activity</a:t>
+            </a:r>
+          </a:p>
+        </p:txBody>
+      </p:sp>
+    </p:spTree>
+    <p:extLst>
+      <p:ext uri="{BB962C8B-B14F-4D97-AF65-F5344CB8AC3E}">
+        <p14:creationId xmlns:p14="http://schemas.microsoft.com/office/powerpoint/2010/main" val="2075093695"/>
+      </p:ext>
+    </p:extLst>
+  </p:cSld>
+  <p:clrMapOvr>
+    <a:masterClrMapping/>
+  </p:clrMapOvr>
+  <p:transition spd="slow">
+    <p:push/>
+  </p:transition>
+  <p:timing>
+    <p:tnLst>
+      <p:par>
+        <p:cTn id="1" dur="indefinite" restart="never" nodeType="tmRoot"/>
+      </p:par>
+    </p:tnLst>
+  </p:timing>
+</p:sld>
+</file>
+
+<file path=ppt/slides/slide18.xml><?xml version="1.0" encoding="utf-8"?>
+<p:sld xmlns:a="http://schemas.openxmlformats.org/drawingml/2006/main" xmlns:r="http://schemas.openxmlformats.org/officeDocument/2006/relationships" xmlns:p="http://schemas.openxmlformats.org/presentationml/2006/main">
+  <p:cSld>
+    <p:spTree>
+      <p:nvGrpSpPr>
+        <p:cNvPr id="1" name=""/>
+        <p:cNvGrpSpPr/>
+        <p:nvPr/>
+      </p:nvGrpSpPr>
+      <p:grpSpPr>
+        <a:xfrm>
+          <a:off x="0" y="0"/>
+          <a:ext cx="0" cy="0"/>
+          <a:chOff x="0" y="0"/>
+          <a:chExt cx="0" cy="0"/>
+        </a:xfrm>
+      </p:grpSpPr>
+      <p:sp>
+        <p:nvSpPr>
+          <p:cNvPr id="4" name="Title 3"/>
+          <p:cNvSpPr>
+            <a:spLocks noGrp="1"/>
+          </p:cNvSpPr>
+          <p:nvPr>
+            <p:ph type="title"/>
+          </p:nvPr>
+        </p:nvSpPr>
+        <p:spPr/>
+        <p:txBody>
+          <a:bodyPr/>
+          <a:lstStyle/>
+          <a:p>
+            <a:r>
+              <a:rPr lang="en-US" dirty="0" smtClean="0"/>
+              <a:t>demo </a:t>
+            </a:r>
+            <a:r>
+              <a:rPr lang="mr-IN" dirty="0" smtClean="0"/>
+              <a:t>–</a:t>
+            </a:r>
+            <a:r>
+              <a:rPr lang="en-US" dirty="0" smtClean="0"/>
+              <a:t> </a:t>
+            </a:r>
+            <a:r>
+              <a:rPr lang="en-US" dirty="0" smtClean="0"/>
+              <a:t>toolbars &amp; buttons</a:t>
+            </a:r>
+            <a:endParaRPr lang="en-US" dirty="0"/>
+          </a:p>
+        </p:txBody>
+      </p:sp>
+      <p:sp>
+        <p:nvSpPr>
+          <p:cNvPr id="5" name="Text Placeholder 4"/>
+          <p:cNvSpPr>
+            <a:spLocks noGrp="1"/>
+          </p:cNvSpPr>
+          <p:nvPr>
+            <p:ph type="body" idx="1"/>
+          </p:nvPr>
+        </p:nvSpPr>
+        <p:spPr/>
+        <p:txBody>
+          <a:bodyPr/>
+          <a:lstStyle/>
+          <a:p>
+            <a:r>
+              <a:rPr lang="en-US" dirty="0" smtClean="0"/>
+              <a:t>add a button to the toolbar to make it easy for users to discover commands</a:t>
+            </a:r>
+            <a:endParaRPr lang="en-US" dirty="0" smtClean="0"/>
+          </a:p>
+        </p:txBody>
+      </p:sp>
+    </p:spTree>
+    <p:extLst>
+      <p:ext uri="{BB962C8B-B14F-4D97-AF65-F5344CB8AC3E}">
+        <p14:creationId xmlns:p14="http://schemas.microsoft.com/office/powerpoint/2010/main" val="1804641110"/>
+      </p:ext>
+    </p:extLst>
+  </p:cSld>
+  <p:clrMapOvr>
+    <a:masterClrMapping/>
+  </p:clrMapOvr>
+  <p:transition spd="slow">
+    <p:push/>
+  </p:transition>
+  <p:timing>
+    <p:tnLst>
+      <p:par>
+        <p:cTn id="1" dur="indefinite" restart="never" nodeType="tmRoot"/>
+      </p:par>
+    </p:tnLst>
+  </p:timing>
+</p:sld>
+</file>
+
+<file path=ppt/slides/slide19.xml><?xml version="1.0" encoding="utf-8"?>
+<p:sld xmlns:a="http://schemas.openxmlformats.org/drawingml/2006/main" xmlns:r="http://schemas.openxmlformats.org/officeDocument/2006/relationships" xmlns:p="http://schemas.openxmlformats.org/presentationml/2006/main">
+  <p:cSld>
+    <p:spTree>
+      <p:nvGrpSpPr>
+        <p:cNvPr id="1" name=""/>
+        <p:cNvGrpSpPr/>
+        <p:nvPr/>
+      </p:nvGrpSpPr>
+      <p:grpSpPr>
+        <a:xfrm>
+          <a:off x="0" y="0"/>
+          <a:ext cx="0" cy="0"/>
+          <a:chOff x="0" y="0"/>
+          <a:chExt cx="0" cy="0"/>
+        </a:xfrm>
+      </p:grpSpPr>
+      <p:sp>
+        <p:nvSpPr>
+          <p:cNvPr id="4" name="Title 3"/>
+          <p:cNvSpPr>
+            <a:spLocks noGrp="1"/>
+          </p:cNvSpPr>
+          <p:nvPr>
+            <p:ph type="title"/>
+          </p:nvPr>
+        </p:nvSpPr>
+        <p:spPr>
+          <a:xfrm>
+            <a:off x="831850" y="1709738"/>
+            <a:ext cx="11103058" cy="2852737"/>
+          </a:xfrm>
+        </p:spPr>
+        <p:txBody>
+          <a:bodyPr/>
+          <a:lstStyle/>
+          <a:p>
+            <a:r>
+              <a:rPr lang="en-US" dirty="0" smtClean="0"/>
+              <a:t>demo </a:t>
+            </a:r>
+            <a:r>
+              <a:rPr lang="mr-IN" dirty="0" smtClean="0"/>
+              <a:t>–</a:t>
+            </a:r>
+            <a:r>
+              <a:rPr lang="en-US" dirty="0" smtClean="0"/>
+              <a:t> </a:t>
+            </a:r>
+            <a:r>
+              <a:rPr lang="en-US" dirty="0" smtClean="0"/>
+              <a:t>input, inform, error</a:t>
+            </a:r>
+            <a:endParaRPr lang="en-US" dirty="0"/>
+          </a:p>
+        </p:txBody>
+      </p:sp>
+      <p:sp>
+        <p:nvSpPr>
+          <p:cNvPr id="5" name="Text Placeholder 4"/>
+          <p:cNvSpPr>
+            <a:spLocks noGrp="1"/>
+          </p:cNvSpPr>
+          <p:nvPr>
+            <p:ph type="body" idx="1"/>
+          </p:nvPr>
+        </p:nvSpPr>
+        <p:spPr/>
+        <p:txBody>
+          <a:bodyPr/>
+          <a:lstStyle/>
+          <a:p>
+            <a:r>
+              <a:rPr lang="en-US" dirty="0" smtClean="0"/>
+              <a:t>confirm when things complete, report when things break, and collect input</a:t>
+            </a:r>
+            <a:endParaRPr lang="en-US" dirty="0" smtClean="0"/>
+          </a:p>
+        </p:txBody>
+      </p:sp>
+    </p:spTree>
+    <p:extLst>
+      <p:ext uri="{BB962C8B-B14F-4D97-AF65-F5344CB8AC3E}">
+        <p14:creationId xmlns:p14="http://schemas.microsoft.com/office/powerpoint/2010/main" val="1775799534"/>
+      </p:ext>
+    </p:extLst>
+  </p:cSld>
+  <p:clrMapOvr>
+    <a:masterClrMapping/>
+  </p:clrMapOvr>
+  <p:transition spd="slow">
+    <p:push/>
+  </p:transition>
+  <p:timing>
+    <p:tnLst>
+      <p:par>
+        <p:cTn id="1" dur="indefinite" restart="never" nodeType="tmRoot"/>
+      </p:par>
+    </p:tnLst>
+  </p:timing>
+</p:sld>
+</file>
+
+<file path=ppt/slides/slide2.xml><?xml version="1.0" encoding="utf-8"?>
+<p:sld xmlns:a="http://schemas.openxmlformats.org/drawingml/2006/main" xmlns:r="http://schemas.openxmlformats.org/officeDocument/2006/relationships" xmlns:p="http://schemas.openxmlformats.org/presentationml/2006/main">
+  <p:cSld>
+    <p:spTree>
+      <p:nvGrpSpPr>
+        <p:cNvPr id="1" name=""/>
+        <p:cNvGrpSpPr/>
+        <p:nvPr/>
+      </p:nvGrpSpPr>
+      <p:grpSpPr>
+        <a:xfrm>
+          <a:off x="0" y="0"/>
+          <a:ext cx="0" cy="0"/>
+          <a:chOff x="0" y="0"/>
+          <a:chExt cx="0" cy="0"/>
+        </a:xfrm>
+      </p:grpSpPr>
+      <p:sp>
+        <p:nvSpPr>
+          <p:cNvPr id="2" name="Title 1"/>
+          <p:cNvSpPr>
+            <a:spLocks noGrp="1"/>
+          </p:cNvSpPr>
+          <p:nvPr>
+            <p:ph type="title"/>
+          </p:nvPr>
+        </p:nvSpPr>
+        <p:spPr/>
+        <p:txBody>
+          <a:bodyPr/>
+          <a:lstStyle/>
+          <a:p>
+            <a:r>
+              <a:rPr lang="en-US" dirty="0"/>
+              <a:t>a</a:t>
+            </a:r>
+            <a:r>
+              <a:rPr lang="en-US" dirty="0" smtClean="0"/>
+              <a:t>genda</a:t>
+            </a:r>
+            <a:endParaRPr lang="en-US" dirty="0"/>
+          </a:p>
+        </p:txBody>
+      </p:sp>
+      <p:sp>
+        <p:nvSpPr>
+          <p:cNvPr id="3" name="Content Placeholder 2"/>
+          <p:cNvSpPr>
+            <a:spLocks noGrp="1"/>
+          </p:cNvSpPr>
+          <p:nvPr>
+            <p:ph idx="1"/>
+          </p:nvPr>
+        </p:nvSpPr>
+        <p:spPr/>
+        <p:txBody>
+          <a:bodyPr/>
+          <a:lstStyle/>
+          <a:p>
+            <a:r>
+              <a:rPr lang="en-US" dirty="0"/>
+              <a:t>p</a:t>
+            </a:r>
+            <a:r>
+              <a:rPr lang="en-US" dirty="0" smtClean="0"/>
+              <a:t>rerequisites</a:t>
+            </a:r>
+          </a:p>
+          <a:p>
+            <a:r>
+              <a:rPr lang="en-US" dirty="0"/>
+              <a:t>s</a:t>
+            </a:r>
+            <a:r>
+              <a:rPr lang="en-US" dirty="0" smtClean="0"/>
+              <a:t>caffolding extension projects</a:t>
+            </a:r>
+          </a:p>
+          <a:p>
+            <a:r>
+              <a:rPr lang="en-US" dirty="0" smtClean="0"/>
+              <a:t>snippets</a:t>
+            </a:r>
+          </a:p>
+          <a:p>
+            <a:r>
+              <a:rPr lang="en-US" dirty="0"/>
+              <a:t>c</a:t>
+            </a:r>
+            <a:r>
+              <a:rPr lang="en-US" dirty="0" smtClean="0"/>
+              <a:t>ommands</a:t>
+            </a:r>
+          </a:p>
+          <a:p>
+            <a:r>
+              <a:rPr lang="en-US" dirty="0" smtClean="0"/>
+              <a:t>user experience</a:t>
+            </a:r>
+          </a:p>
+          <a:p>
+            <a:r>
+              <a:rPr lang="en-US" dirty="0"/>
+              <a:t>e</a:t>
+            </a:r>
+            <a:r>
+              <a:rPr lang="en-US" dirty="0" smtClean="0"/>
+              <a:t>ditor interaction</a:t>
+            </a:r>
+          </a:p>
+          <a:p>
+            <a:r>
+              <a:rPr lang="en-US" dirty="0" smtClean="0"/>
+              <a:t>publishing</a:t>
+            </a:r>
+          </a:p>
+          <a:p>
+            <a:r>
+              <a:rPr lang="en-US" dirty="0"/>
+              <a:t>d</a:t>
+            </a:r>
+            <a:r>
+              <a:rPr lang="en-US" dirty="0" smtClean="0"/>
+              <a:t>esign considerations</a:t>
+            </a:r>
+            <a:endParaRPr lang="en-US" dirty="0"/>
+          </a:p>
+        </p:txBody>
+      </p:sp>
+    </p:spTree>
+    <p:extLst>
+      <p:ext uri="{BB962C8B-B14F-4D97-AF65-F5344CB8AC3E}">
+        <p14:creationId xmlns:p14="http://schemas.microsoft.com/office/powerpoint/2010/main" val="1585046851"/>
+      </p:ext>
+    </p:extLst>
+  </p:cSld>
+  <p:clrMapOvr>
+    <a:masterClrMapping/>
+  </p:clrMapOvr>
+  <p:timing>
+    <p:tnLst>
+      <p:par>
+        <p:cTn id="1" dur="indefinite" restart="never" nodeType="tmRoot"/>
+      </p:par>
+    </p:tnLst>
+  </p:timing>
+</p:sld>
+</file>
+
+<file path=ppt/slides/slide20.xml><?xml version="1.0" encoding="utf-8"?>
+<p:sld xmlns:a="http://schemas.openxmlformats.org/drawingml/2006/main" xmlns:r="http://schemas.openxmlformats.org/officeDocument/2006/relationships" xmlns:p="http://schemas.openxmlformats.org/presentationml/2006/main">
+  <p:cSld>
+    <p:spTree>
+      <p:nvGrpSpPr>
+        <p:cNvPr id="1" name=""/>
+        <p:cNvGrpSpPr/>
+        <p:nvPr/>
+      </p:nvGrpSpPr>
+      <p:grpSpPr>
+        <a:xfrm>
+          <a:off x="0" y="0"/>
+          <a:ext cx="0" cy="0"/>
+          <a:chOff x="0" y="0"/>
+          <a:chExt cx="0" cy="0"/>
+        </a:xfrm>
+      </p:grpSpPr>
+      <p:sp>
+        <p:nvSpPr>
+          <p:cNvPr id="4" name="Title 3"/>
+          <p:cNvSpPr>
+            <a:spLocks noGrp="1"/>
+          </p:cNvSpPr>
+          <p:nvPr>
+            <p:ph type="title"/>
+          </p:nvPr>
+        </p:nvSpPr>
+        <p:spPr/>
+        <p:txBody>
+          <a:bodyPr/>
+          <a:lstStyle/>
+          <a:p>
+            <a:r>
+              <a:rPr lang="en-US" dirty="0" smtClean="0"/>
+              <a:t>editor interaction</a:t>
+            </a:r>
+            <a:endParaRPr lang="en-US" dirty="0"/>
+          </a:p>
+        </p:txBody>
+      </p:sp>
+      <p:sp>
+        <p:nvSpPr>
+          <p:cNvPr id="5" name="Text Placeholder 4"/>
+          <p:cNvSpPr>
+            <a:spLocks noGrp="1"/>
+          </p:cNvSpPr>
+          <p:nvPr>
+            <p:ph type="body" idx="1"/>
+          </p:nvPr>
+        </p:nvSpPr>
+        <p:spPr/>
+        <p:txBody>
+          <a:bodyPr/>
+          <a:lstStyle/>
+          <a:p>
+            <a:endParaRPr lang="en-US" dirty="0" smtClean="0"/>
+          </a:p>
+        </p:txBody>
+      </p:sp>
+    </p:spTree>
+    <p:extLst>
+      <p:ext uri="{BB962C8B-B14F-4D97-AF65-F5344CB8AC3E}">
+        <p14:creationId xmlns:p14="http://schemas.microsoft.com/office/powerpoint/2010/main" val="1998717148"/>
+      </p:ext>
+    </p:extLst>
+  </p:cSld>
+  <p:clrMapOvr>
+    <a:masterClrMapping/>
+  </p:clrMapOvr>
+  <p:transition spd="slow">
+    <p:push/>
+  </p:transition>
+  <p:timing>
+    <p:tnLst>
+      <p:par>
+        <p:cTn id="1" dur="indefinite" restart="never" nodeType="tmRoot"/>
+      </p:par>
+    </p:tnLst>
+  </p:timing>
+</p:sld>
+</file>
+
+<file path=ppt/slides/slide21.xml><?xml version="1.0" encoding="utf-8"?>
+<p:sld xmlns:a="http://schemas.openxmlformats.org/drawingml/2006/main" xmlns:r="http://schemas.openxmlformats.org/officeDocument/2006/relationships" xmlns:p="http://schemas.openxmlformats.org/presentationml/2006/main">
+  <p:cSld>
+    <p:spTree>
+      <p:nvGrpSpPr>
+        <p:cNvPr id="1" name=""/>
+        <p:cNvGrpSpPr/>
+        <p:nvPr/>
+      </p:nvGrpSpPr>
+      <p:grpSpPr>
+        <a:xfrm>
+          <a:off x="0" y="0"/>
+          <a:ext cx="0" cy="0"/>
+          <a:chOff x="0" y="0"/>
+          <a:chExt cx="0" cy="0"/>
+        </a:xfrm>
+      </p:grpSpPr>
+      <p:sp>
+        <p:nvSpPr>
+          <p:cNvPr id="4" name="Title 3"/>
+          <p:cNvSpPr>
+            <a:spLocks noGrp="1"/>
+          </p:cNvSpPr>
+          <p:nvPr>
+            <p:ph type="title"/>
+          </p:nvPr>
+        </p:nvSpPr>
+        <p:spPr/>
+        <p:txBody>
+          <a:bodyPr/>
+          <a:lstStyle/>
+          <a:p>
+            <a:r>
+              <a:rPr lang="en-US" dirty="0" smtClean="0"/>
+              <a:t>some editor interaction </a:t>
+            </a:r>
+            <a:r>
+              <a:rPr lang="en-US" dirty="0" err="1" smtClean="0"/>
+              <a:t>apis</a:t>
+            </a:r>
+            <a:endParaRPr lang="en-US" dirty="0"/>
+          </a:p>
+        </p:txBody>
+      </p:sp>
+      <p:sp>
+        <p:nvSpPr>
+          <p:cNvPr id="7" name="Text Placeholder 6"/>
+          <p:cNvSpPr>
+            <a:spLocks noGrp="1"/>
+          </p:cNvSpPr>
+          <p:nvPr>
+            <p:ph type="body" idx="1"/>
+          </p:nvPr>
+        </p:nvSpPr>
+        <p:spPr>
+          <a:xfrm>
+            <a:off x="839788" y="1243840"/>
+            <a:ext cx="5157787" cy="823912"/>
+          </a:xfrm>
+        </p:spPr>
+        <p:txBody>
+          <a:bodyPr/>
+          <a:lstStyle/>
+          <a:p>
+            <a:r>
+              <a:rPr lang="en-US" dirty="0" smtClean="0"/>
+              <a:t>purpose</a:t>
+            </a:r>
+            <a:endParaRPr lang="en-US" dirty="0"/>
+          </a:p>
+        </p:txBody>
+      </p:sp>
+      <p:sp>
+        <p:nvSpPr>
+          <p:cNvPr id="8" name="Content Placeholder 7"/>
+          <p:cNvSpPr>
+            <a:spLocks noGrp="1"/>
+          </p:cNvSpPr>
+          <p:nvPr>
+            <p:ph sz="half" idx="2"/>
+          </p:nvPr>
+        </p:nvSpPr>
+        <p:spPr>
+          <a:xfrm>
+            <a:off x="839788" y="2067752"/>
+            <a:ext cx="5157787" cy="3684588"/>
+          </a:xfrm>
+        </p:spPr>
+        <p:txBody>
+          <a:bodyPr/>
+          <a:lstStyle/>
+          <a:p>
+            <a:pPr marL="0" indent="0">
+              <a:buNone/>
+            </a:pPr>
+            <a:r>
+              <a:rPr lang="en-US" sz="2000" dirty="0" smtClean="0"/>
+              <a:t>create a new text editor decoration</a:t>
+            </a:r>
+          </a:p>
+          <a:p>
+            <a:pPr marL="0" indent="0">
+              <a:buNone/>
+            </a:pPr>
+            <a:r>
+              <a:rPr lang="en-US" sz="2000" dirty="0" smtClean="0"/>
+              <a:t>get a reference to the active editor </a:t>
+            </a:r>
+          </a:p>
+          <a:p>
+            <a:pPr marL="0" indent="0">
+              <a:buNone/>
+            </a:pPr>
+            <a:r>
+              <a:rPr lang="en-US" sz="2000" dirty="0" smtClean="0"/>
+              <a:t>activate a text decoration</a:t>
+            </a:r>
+          </a:p>
+          <a:p>
+            <a:pPr marL="0" indent="0">
+              <a:buNone/>
+            </a:pPr>
+            <a:r>
+              <a:rPr lang="en-US" sz="2000" dirty="0" smtClean="0"/>
+              <a:t>handle when the text of the document changes</a:t>
+            </a:r>
+          </a:p>
+          <a:p>
+            <a:pPr marL="0" indent="0">
+              <a:buNone/>
+            </a:pPr>
+            <a:r>
+              <a:rPr lang="en-US" sz="2000" dirty="0" smtClean="0"/>
+              <a:t>handle when the active document changes</a:t>
+            </a:r>
+            <a:endParaRPr lang="en-US" sz="2000" dirty="0"/>
+          </a:p>
+        </p:txBody>
+      </p:sp>
+      <p:sp>
+        <p:nvSpPr>
+          <p:cNvPr id="9" name="Text Placeholder 8"/>
+          <p:cNvSpPr>
+            <a:spLocks noGrp="1"/>
+          </p:cNvSpPr>
+          <p:nvPr>
+            <p:ph type="body" sz="quarter" idx="3"/>
+          </p:nvPr>
+        </p:nvSpPr>
+        <p:spPr>
+          <a:xfrm>
+            <a:off x="6172200" y="1243840"/>
+            <a:ext cx="5183188" cy="823912"/>
+          </a:xfrm>
+        </p:spPr>
+        <p:txBody>
+          <a:bodyPr/>
+          <a:lstStyle/>
+          <a:p>
+            <a:r>
+              <a:rPr lang="en-US" dirty="0" err="1" smtClean="0"/>
+              <a:t>api</a:t>
+            </a:r>
+            <a:endParaRPr lang="en-US" dirty="0"/>
+          </a:p>
+        </p:txBody>
+      </p:sp>
+      <p:sp>
+        <p:nvSpPr>
+          <p:cNvPr id="10" name="Content Placeholder 9"/>
+          <p:cNvSpPr>
+            <a:spLocks noGrp="1"/>
+          </p:cNvSpPr>
+          <p:nvPr>
+            <p:ph sz="quarter" idx="4"/>
+          </p:nvPr>
+        </p:nvSpPr>
+        <p:spPr>
+          <a:xfrm>
+            <a:off x="6172200" y="2067752"/>
+            <a:ext cx="5183188" cy="3684588"/>
+          </a:xfrm>
+        </p:spPr>
+        <p:txBody>
+          <a:bodyPr>
+            <a:normAutofit/>
+          </a:bodyPr>
+          <a:lstStyle/>
+          <a:p>
+            <a:pPr marL="0" indent="0">
+              <a:buNone/>
+            </a:pPr>
+            <a:r>
+              <a:rPr lang="en-US" sz="2000" dirty="0" err="1"/>
+              <a:t>window.createTextEditorDecorationType</a:t>
+            </a:r>
+            <a:endParaRPr lang="en-US" sz="2000" dirty="0"/>
+          </a:p>
+          <a:p>
+            <a:pPr marL="0" indent="0">
+              <a:buNone/>
+            </a:pPr>
+            <a:r>
+              <a:rPr lang="en-US" sz="2000" dirty="0" err="1"/>
+              <a:t>window.activeTextEditor</a:t>
+            </a:r>
+            <a:endParaRPr lang="en-US" sz="2000" dirty="0"/>
+          </a:p>
+          <a:p>
+            <a:pPr marL="0" indent="0">
+              <a:buNone/>
+            </a:pPr>
+            <a:r>
+              <a:rPr lang="en-US" sz="2000" dirty="0" err="1" smtClean="0"/>
+              <a:t>window.activeTextEditor.setDecorations</a:t>
+            </a:r>
+            <a:endParaRPr lang="en-US" sz="2000" dirty="0" smtClean="0"/>
+          </a:p>
+          <a:p>
+            <a:pPr marL="0" indent="0">
+              <a:buNone/>
+            </a:pPr>
+            <a:r>
+              <a:rPr lang="en-US" sz="2000" dirty="0" err="1" smtClean="0"/>
+              <a:t>window.onDidChangeActiveTextEditor</a:t>
+            </a:r>
+            <a:endParaRPr lang="en-US" sz="2000" dirty="0"/>
+          </a:p>
+          <a:p>
+            <a:pPr marL="0" indent="0">
+              <a:buNone/>
+            </a:pPr>
+            <a:r>
+              <a:rPr lang="en-US" sz="2000" dirty="0" err="1" smtClean="0"/>
+              <a:t>workspace.onDidChangeTextDocument</a:t>
+            </a:r>
+            <a:endParaRPr lang="en-US" sz="2000" dirty="0"/>
+          </a:p>
+        </p:txBody>
+      </p:sp>
+    </p:spTree>
+    <p:extLst>
+      <p:ext uri="{BB962C8B-B14F-4D97-AF65-F5344CB8AC3E}">
+        <p14:creationId xmlns:p14="http://schemas.microsoft.com/office/powerpoint/2010/main" val="2118261730"/>
+      </p:ext>
+    </p:extLst>
+  </p:cSld>
+  <p:clrMapOvr>
+    <a:masterClrMapping/>
+  </p:clrMapOvr>
+  <p:timing>
+    <p:tnLst>
+      <p:par>
+        <p:cTn id="1" dur="indefinite" restart="never" nodeType="tmRoot"/>
+      </p:par>
+    </p:tnLst>
+  </p:timing>
+</p:sld>
+</file>
+
+<file path=ppt/slides/slide22.xml><?xml version="1.0" encoding="utf-8"?>
+<p:sld xmlns:a="http://schemas.openxmlformats.org/drawingml/2006/main" xmlns:r="http://schemas.openxmlformats.org/officeDocument/2006/relationships" xmlns:p="http://schemas.openxmlformats.org/presentationml/2006/main">
+  <p:cSld>
+    <p:spTree>
+      <p:nvGrpSpPr>
+        <p:cNvPr id="1" name=""/>
+        <p:cNvGrpSpPr/>
+        <p:nvPr/>
+      </p:nvGrpSpPr>
+      <p:grpSpPr>
+        <a:xfrm>
+          <a:off x="0" y="0"/>
+          <a:ext cx="0" cy="0"/>
+          <a:chOff x="0" y="0"/>
+          <a:chExt cx="0" cy="0"/>
+        </a:xfrm>
+      </p:grpSpPr>
+      <p:sp>
+        <p:nvSpPr>
+          <p:cNvPr id="4" name="Title 3"/>
+          <p:cNvSpPr>
+            <a:spLocks noGrp="1"/>
+          </p:cNvSpPr>
+          <p:nvPr>
+            <p:ph type="title"/>
+          </p:nvPr>
+        </p:nvSpPr>
+        <p:spPr>
+          <a:xfrm>
+            <a:off x="831850" y="1709738"/>
+            <a:ext cx="11103058" cy="2852737"/>
+          </a:xfrm>
+        </p:spPr>
+        <p:txBody>
+          <a:bodyPr/>
+          <a:lstStyle/>
+          <a:p>
+            <a:r>
+              <a:rPr lang="en-US" dirty="0" smtClean="0"/>
+              <a:t>demo </a:t>
+            </a:r>
+            <a:r>
+              <a:rPr lang="mr-IN" dirty="0" smtClean="0"/>
+              <a:t>–</a:t>
+            </a:r>
+            <a:r>
+              <a:rPr lang="en-US" dirty="0" smtClean="0"/>
+              <a:t> </a:t>
+            </a:r>
+            <a:r>
+              <a:rPr lang="en-US" dirty="0" smtClean="0"/>
+              <a:t>decorate important text</a:t>
+            </a:r>
+            <a:endParaRPr lang="en-US" dirty="0"/>
+          </a:p>
+        </p:txBody>
+      </p:sp>
+      <p:sp>
+        <p:nvSpPr>
+          <p:cNvPr id="5" name="Text Placeholder 4"/>
+          <p:cNvSpPr>
+            <a:spLocks noGrp="1"/>
+          </p:cNvSpPr>
+          <p:nvPr>
+            <p:ph type="body" idx="1"/>
+          </p:nvPr>
+        </p:nvSpPr>
+        <p:spPr/>
+        <p:txBody>
+          <a:bodyPr/>
+          <a:lstStyle/>
+          <a:p>
+            <a:r>
+              <a:rPr lang="en-US" dirty="0" smtClean="0"/>
+              <a:t>highlight relevant text segments using decorations</a:t>
+            </a:r>
+            <a:endParaRPr lang="en-US" dirty="0" smtClean="0"/>
+          </a:p>
+        </p:txBody>
+      </p:sp>
+    </p:spTree>
+    <p:extLst>
+      <p:ext uri="{BB962C8B-B14F-4D97-AF65-F5344CB8AC3E}">
+        <p14:creationId xmlns:p14="http://schemas.microsoft.com/office/powerpoint/2010/main" val="1038947819"/>
+      </p:ext>
+    </p:extLst>
+  </p:cSld>
+  <p:clrMapOvr>
+    <a:masterClrMapping/>
+  </p:clrMapOvr>
+  <p:transition spd="slow">
+    <p:push/>
+  </p:transition>
+  <p:timing>
+    <p:tnLst>
+      <p:par>
+        <p:cTn id="1" dur="indefinite" restart="never" nodeType="tmRoot"/>
+      </p:par>
+    </p:tnLst>
+  </p:timing>
+</p:sld>
+</file>
+
+<file path=ppt/slides/slide23.xml><?xml version="1.0" encoding="utf-8"?>
+<p:sld xmlns:a="http://schemas.openxmlformats.org/drawingml/2006/main" xmlns:r="http://schemas.openxmlformats.org/officeDocument/2006/relationships" xmlns:p="http://schemas.openxmlformats.org/presentationml/2006/main">
+  <p:cSld>
+    <p:spTree>
+      <p:nvGrpSpPr>
+        <p:cNvPr id="1" name=""/>
+        <p:cNvGrpSpPr/>
+        <p:nvPr/>
+      </p:nvGrpSpPr>
+      <p:grpSpPr>
+        <a:xfrm>
+          <a:off x="0" y="0"/>
+          <a:ext cx="0" cy="0"/>
+          <a:chOff x="0" y="0"/>
+          <a:chExt cx="0" cy="0"/>
+        </a:xfrm>
+      </p:grpSpPr>
+      <p:sp>
+        <p:nvSpPr>
+          <p:cNvPr id="4" name="Title 3"/>
+          <p:cNvSpPr>
+            <a:spLocks noGrp="1"/>
+          </p:cNvSpPr>
+          <p:nvPr>
+            <p:ph type="title"/>
+          </p:nvPr>
+        </p:nvSpPr>
+        <p:spPr/>
+        <p:txBody>
+          <a:bodyPr/>
+          <a:lstStyle/>
+          <a:p>
+            <a:r>
+              <a:rPr lang="en-US" dirty="0" smtClean="0"/>
               <a:t>publishing</a:t>
             </a:r>
             <a:endParaRPr lang="en-US" dirty="0"/>
@@ -3709,7 +6079,7 @@
 </p:sld>
 </file>
 
-<file path=ppt/slides/slide14.xml><?xml version="1.0" encoding="utf-8"?>
+<file path=ppt/slides/slide24.xml><?xml version="1.0" encoding="utf-8"?>
 <p:sld xmlns:a="http://schemas.openxmlformats.org/drawingml/2006/main" xmlns:r="http://schemas.openxmlformats.org/officeDocument/2006/relationships" xmlns:p="http://schemas.openxmlformats.org/presentationml/2006/main">
   <p:cSld>
     <p:spTree>
@@ -3967,7 +6337,7 @@
 </p:sld>
 </file>
 
-<file path=ppt/slides/slide15.xml><?xml version="1.0" encoding="utf-8"?>
+<file path=ppt/slides/slide25.xml><?xml version="1.0" encoding="utf-8"?>
 <p:sld xmlns:a="http://schemas.openxmlformats.org/drawingml/2006/main" xmlns:r="http://schemas.openxmlformats.org/officeDocument/2006/relationships" xmlns:p="http://schemas.openxmlformats.org/presentationml/2006/main">
   <p:cSld>
     <p:spTree>
@@ -4134,7 +6504,7 @@
 </p:sld>
 </file>
 
-<file path=ppt/slides/slide16.xml><?xml version="1.0" encoding="utf-8"?>
+<file path=ppt/slides/slide26.xml><?xml version="1.0" encoding="utf-8"?>
 <p:sld xmlns:a="http://schemas.openxmlformats.org/drawingml/2006/main" xmlns:r="http://schemas.openxmlformats.org/officeDocument/2006/relationships" xmlns:p="http://schemas.openxmlformats.org/presentationml/2006/main">
   <p:cSld>
     <p:spTree>
@@ -4315,6 +6685,9 @@
                     <p:cTn id="3" fill="hold">
                       <p:stCondLst>
                         <p:cond delay="indefinite"/>
+                        <p:cond evt="onBegin" delay="0">
+                          <p:tn val="2"/>
+                        </p:cond>
                       </p:stCondLst>
                       <p:childTnLst>
                         <p:par>
@@ -4324,7 +6697,7 @@
                             </p:stCondLst>
                             <p:childTnLst>
                               <p:par>
-                                <p:cTn id="5" presetID="22" presetClass="entr" presetSubtype="2" fill="hold" nodeType="clickEffect">
+                                <p:cTn id="5" presetID="22" presetClass="entr" presetSubtype="2" fill="hold" nodeType="afterEffect">
                                   <p:stCondLst>
                                     <p:cond delay="0"/>
                                   </p:stCondLst>
@@ -4389,7 +6762,7 @@
 </p:sld>
 </file>
 
-<file path=ppt/slides/slide17.xml><?xml version="1.0" encoding="utf-8"?>
+<file path=ppt/slides/slide27.xml><?xml version="1.0" encoding="utf-8"?>
 <p:sld xmlns:a="http://schemas.openxmlformats.org/drawingml/2006/main" xmlns:r="http://schemas.openxmlformats.org/officeDocument/2006/relationships" xmlns:p="http://schemas.openxmlformats.org/presentationml/2006/main">
   <p:cSld>
     <p:spTree>
@@ -4512,6 +6885,42 @@
           </a:prstGeom>
         </p:spPr>
       </p:pic>
+      <p:cxnSp>
+        <p:nvCxnSpPr>
+          <p:cNvPr id="5" name="Straight Arrow Connector 4"/>
+          <p:cNvCxnSpPr/>
+          <p:nvPr/>
+        </p:nvCxnSpPr>
+        <p:spPr>
+          <a:xfrm flipH="1" flipV="1">
+            <a:off x="2902226" y="4381919"/>
+            <a:ext cx="1741335" cy="1175006"/>
+          </a:xfrm>
+          <a:prstGeom prst="straightConnector1">
+            <a:avLst/>
+          </a:prstGeom>
+          <a:ln w="76200">
+            <a:solidFill>
+              <a:srgbClr val="FF0000"/>
+            </a:solidFill>
+            <a:tailEnd type="triangle"/>
+          </a:ln>
+        </p:spPr>
+        <p:style>
+          <a:lnRef idx="1">
+            <a:schemeClr val="accent1"/>
+          </a:lnRef>
+          <a:fillRef idx="0">
+            <a:schemeClr val="accent1"/>
+          </a:fillRef>
+          <a:effectRef idx="0">
+            <a:schemeClr val="accent1"/>
+          </a:effectRef>
+          <a:fontRef idx="minor">
+            <a:schemeClr val="tx1"/>
+          </a:fontRef>
+        </p:style>
+      </p:cxnSp>
     </p:spTree>
     <p:extLst>
       <p:ext uri="{BB962C8B-B14F-4D97-AF65-F5344CB8AC3E}">
@@ -4525,14 +6934,93 @@
   <p:timing>
     <p:tnLst>
       <p:par>
-        <p:cTn id="1" dur="indefinite" restart="never" nodeType="tmRoot"/>
+        <p:cTn id="1" dur="indefinite" restart="never" nodeType="tmRoot">
+          <p:childTnLst>
+            <p:seq concurrent="1" nextAc="seek">
+              <p:cTn id="2" dur="indefinite" nodeType="mainSeq">
+                <p:childTnLst>
+                  <p:par>
+                    <p:cTn id="3" fill="hold">
+                      <p:stCondLst>
+                        <p:cond delay="indefinite"/>
+                        <p:cond evt="onBegin" delay="0">
+                          <p:tn val="2"/>
+                        </p:cond>
+                      </p:stCondLst>
+                      <p:childTnLst>
+                        <p:par>
+                          <p:cTn id="4" fill="hold">
+                            <p:stCondLst>
+                              <p:cond delay="0"/>
+                            </p:stCondLst>
+                            <p:childTnLst>
+                              <p:par>
+                                <p:cTn id="5" presetID="22" presetClass="entr" presetSubtype="2" fill="hold" nodeType="afterEffect">
+                                  <p:stCondLst>
+                                    <p:cond delay="0"/>
+                                  </p:stCondLst>
+                                  <p:childTnLst>
+                                    <p:set>
+                                      <p:cBhvr>
+                                        <p:cTn id="6" dur="1" fill="hold">
+                                          <p:stCondLst>
+                                            <p:cond delay="0"/>
+                                          </p:stCondLst>
+                                        </p:cTn>
+                                        <p:tgtEl>
+                                          <p:spTgt spid="5"/>
+                                        </p:tgtEl>
+                                        <p:attrNameLst>
+                                          <p:attrName>style.visibility</p:attrName>
+                                        </p:attrNameLst>
+                                      </p:cBhvr>
+                                      <p:to>
+                                        <p:strVal val="visible"/>
+                                      </p:to>
+                                    </p:set>
+                                    <p:animEffect transition="in" filter="wipe(right)">
+                                      <p:cBhvr>
+                                        <p:cTn id="7" dur="500"/>
+                                        <p:tgtEl>
+                                          <p:spTgt spid="5"/>
+                                        </p:tgtEl>
+                                      </p:cBhvr>
+                                    </p:animEffect>
+                                  </p:childTnLst>
+                                </p:cTn>
+                              </p:par>
+                            </p:childTnLst>
+                          </p:cTn>
+                        </p:par>
+                      </p:childTnLst>
+                    </p:cTn>
+                  </p:par>
+                </p:childTnLst>
+              </p:cTn>
+              <p:prevCondLst>
+                <p:cond evt="onPrev" delay="0">
+                  <p:tgtEl>
+                    <p:sldTgt/>
+                  </p:tgtEl>
+                </p:cond>
+              </p:prevCondLst>
+              <p:nextCondLst>
+                <p:cond evt="onNext" delay="0">
+                  <p:tgtEl>
+                    <p:sldTgt/>
+                  </p:tgtEl>
+                </p:cond>
+              </p:nextCondLst>
+            </p:seq>
+          </p:childTnLst>
+        </p:cTn>
       </p:par>
     </p:tnLst>
   </p:timing>
 </p:sld>
 </file>
 
-<file path=ppt/slides/slide18.xml><?xml version="1.0" encoding="utf-8"?>
+<file path=ppt/slides/slide28.xml><?xml version="1.0" encoding="utf-8"?>
 <p:sld xmlns:a="http://schemas.openxmlformats.org/drawingml/2006/main" xmlns:r="http://schemas.openxmlformats.org/officeDocument/2006/relationships" xmlns:p="http://schemas.openxmlformats.org/presentationml/2006/main">
   <p:cSld>
     <p:spTree>
@@ -4650,7 +7138,6 @@
               <a:rPr lang="en-US" dirty="0" smtClean="0"/>
               <a:t>embrace extension</a:t>
             </a:r>
-            <a:endParaRPr lang="en-US" dirty="0" smtClean="0"/>
           </a:p>
         </p:txBody>
       </p:sp>
@@ -4844,7 +7331,6 @@
               <a:rPr lang="en-US" dirty="0" smtClean="0"/>
               <a:t>if you realize a component of your extension could be used by another extension, break your extension up and take an extension dependency on the componentized part</a:t>
             </a:r>
-            <a:endParaRPr lang="en-US" dirty="0" smtClean="0"/>
           </a:p>
         </p:txBody>
       </p:sp>
@@ -4893,7 +7379,6 @@
               <a:rPr lang="en-US" dirty="0" smtClean="0"/>
               <a:t>open-source at heart</a:t>
             </a:r>
-            <a:endParaRPr lang="en-US" dirty="0" smtClean="0"/>
           </a:p>
         </p:txBody>
       </p:sp>
@@ -5103,7 +7588,6 @@
               <a:rPr lang="en-US" dirty="0" smtClean="0"/>
               <a:t> file</a:t>
             </a:r>
-            <a:endParaRPr lang="en-US" dirty="0" smtClean="0"/>
           </a:p>
         </p:txBody>
       </p:sp>
@@ -5152,7 +7636,6 @@
               <a:rPr lang="en-US" dirty="0" smtClean="0"/>
               <a:t>data-drive feature decisions</a:t>
             </a:r>
-            <a:endParaRPr lang="en-US" dirty="0" smtClean="0"/>
           </a:p>
         </p:txBody>
       </p:sp>
@@ -5346,7 +7829,6 @@
               <a:rPr lang="en-US" dirty="0" smtClean="0"/>
               <a:t>use telemetry wisely to understand how customers are using your feature and frequently review that telemetry to understand where problem areas exist</a:t>
             </a:r>
-            <a:endParaRPr lang="en-US" dirty="0" smtClean="0"/>
           </a:p>
         </p:txBody>
       </p:sp>
@@ -5395,7 +7877,6 @@
               <a:rPr lang="en-US" sz="4400" dirty="0" smtClean="0"/>
               <a:t>design considerations</a:t>
             </a:r>
-            <a:endParaRPr lang="en-US" sz="4400" dirty="0" smtClean="0"/>
           </a:p>
         </p:txBody>
       </p:sp>
@@ -6120,7 +8601,7 @@
 </p:sld>
 </file>
 
-<file path=ppt/slides/slide19.xml><?xml version="1.0" encoding="utf-8"?>
+<file path=ppt/slides/slide29.xml><?xml version="1.0" encoding="utf-8"?>
 <p:sld xmlns:a="http://schemas.openxmlformats.org/drawingml/2006/main" xmlns:r="http://schemas.openxmlformats.org/officeDocument/2006/relationships" xmlns:p="http://schemas.openxmlformats.org/presentationml/2006/main">
   <p:cSld>
     <p:spTree>
@@ -6342,7 +8823,7 @@
 </p:sld>
 </file>
 
-<file path=ppt/slides/slide2.xml><?xml version="1.0" encoding="utf-8"?>
+<file path=ppt/slides/slide3.xml><?xml version="1.0" encoding="utf-8"?>
 <p:sld xmlns:a="http://schemas.openxmlformats.org/drawingml/2006/main" xmlns:r="http://schemas.openxmlformats.org/officeDocument/2006/relationships" xmlns:p="http://schemas.openxmlformats.org/presentationml/2006/main">
   <p:cSld>
     <p:spTree>
@@ -6359,6 +8840,30 @@
           <a:chExt cx="0" cy="0"/>
         </a:xfrm>
       </p:grpSpPr>
+      <p:pic>
+        <p:nvPicPr>
+          <p:cNvPr id="8" name="Picture 7"/>
+          <p:cNvPicPr>
+            <a:picLocks noChangeAspect="1"/>
+          </p:cNvPicPr>
+          <p:nvPr/>
+        </p:nvPicPr>
+        <p:blipFill>
+          <a:blip r:embed="rId2"/>
+          <a:stretch>
+            <a:fillRect/>
+          </a:stretch>
+        </p:blipFill>
+        <p:spPr>
+          <a:xfrm>
+            <a:off x="1619250" y="1708004"/>
+            <a:ext cx="8839200" cy="4902200"/>
+          </a:xfrm>
+          <a:prstGeom prst="rect">
+            <a:avLst/>
+          </a:prstGeom>
+        </p:spPr>
+      </p:pic>
       <p:sp>
         <p:nvSpPr>
           <p:cNvPr id="2" name="Title 1"/>
@@ -6367,33 +8872,6 @@
           </p:cNvSpPr>
           <p:nvPr>
             <p:ph type="title"/>
-          </p:nvPr>
-        </p:nvSpPr>
-        <p:spPr/>
-        <p:txBody>
-          <a:bodyPr/>
-          <a:lstStyle/>
-          <a:p>
-            <a:r>
-              <a:rPr lang="en-US" dirty="0"/>
-              <a:t>a</a:t>
-            </a:r>
-            <a:r>
-              <a:rPr lang="en-US" dirty="0" smtClean="0"/>
-              <a:t>genda</a:t>
-            </a:r>
-            <a:endParaRPr lang="en-US" dirty="0"/>
-          </a:p>
-        </p:txBody>
-      </p:sp>
-      <p:sp>
-        <p:nvSpPr>
-          <p:cNvPr id="3" name="Content Placeholder 2"/>
-          <p:cNvSpPr>
-            <a:spLocks noGrp="1"/>
-          </p:cNvSpPr>
-          <p:nvPr>
-            <p:ph idx="1"/>
           </p:nvPr>
         </p:nvSpPr>
         <p:spPr/>
@@ -6408,73 +8886,6 @@
             <a:r>
               <a:rPr lang="en-US" dirty="0" smtClean="0"/>
               <a:t>rerequisites</a:t>
-            </a:r>
-            <a:endParaRPr lang="en-US" dirty="0" smtClean="0"/>
-          </a:p>
-          <a:p>
-            <a:r>
-              <a:rPr lang="en-US" dirty="0"/>
-              <a:t>s</a:t>
-            </a:r>
-            <a:r>
-              <a:rPr lang="en-US" dirty="0" smtClean="0"/>
-              <a:t>caffolding </a:t>
-            </a:r>
-            <a:r>
-              <a:rPr lang="en-US" dirty="0" smtClean="0"/>
-              <a:t>extension projects</a:t>
-            </a:r>
-          </a:p>
-          <a:p>
-            <a:r>
-              <a:rPr lang="en-US" dirty="0" smtClean="0"/>
-              <a:t>snippets</a:t>
-            </a:r>
-            <a:endParaRPr lang="en-US" dirty="0" smtClean="0"/>
-          </a:p>
-          <a:p>
-            <a:r>
-              <a:rPr lang="en-US" dirty="0"/>
-              <a:t>c</a:t>
-            </a:r>
-            <a:r>
-              <a:rPr lang="en-US" dirty="0" smtClean="0"/>
-              <a:t>ommands</a:t>
-            </a:r>
-            <a:endParaRPr lang="en-US" dirty="0" smtClean="0"/>
-          </a:p>
-          <a:p>
-            <a:r>
-              <a:rPr lang="en-US" dirty="0" smtClean="0"/>
-              <a:t>user experience</a:t>
-            </a:r>
-            <a:endParaRPr lang="en-US" dirty="0" smtClean="0"/>
-          </a:p>
-          <a:p>
-            <a:r>
-              <a:rPr lang="en-US" dirty="0"/>
-              <a:t>e</a:t>
-            </a:r>
-            <a:r>
-              <a:rPr lang="en-US" dirty="0" smtClean="0"/>
-              <a:t>ditor interaction</a:t>
-            </a:r>
-            <a:endParaRPr lang="en-US" dirty="0" smtClean="0"/>
-          </a:p>
-          <a:p>
-            <a:r>
-              <a:rPr lang="en-US" dirty="0" smtClean="0"/>
-              <a:t>publishing</a:t>
-            </a:r>
-          </a:p>
-          <a:p>
-            <a:r>
-              <a:rPr lang="en-US" dirty="0"/>
-              <a:t>d</a:t>
-            </a:r>
-            <a:r>
-              <a:rPr lang="en-US" dirty="0" smtClean="0"/>
-              <a:t>esign considerations</a:t>
             </a:r>
             <a:endParaRPr lang="en-US" dirty="0"/>
           </a:p>
@@ -6483,7 +8894,7 @@
     </p:spTree>
     <p:extLst>
       <p:ext uri="{BB962C8B-B14F-4D97-AF65-F5344CB8AC3E}">
-        <p14:creationId xmlns:p14="http://schemas.microsoft.com/office/powerpoint/2010/main" val="1585046851"/>
+        <p14:creationId xmlns:p14="http://schemas.microsoft.com/office/powerpoint/2010/main" val="1374431568"/>
       </p:ext>
     </p:extLst>
   </p:cSld>
@@ -6500,7 +8911,7 @@
 </p:sld>
 </file>
 
-<file path=ppt/slides/slide20.xml><?xml version="1.0" encoding="utf-8"?>
+<file path=ppt/slides/slide30.xml><?xml version="1.0" encoding="utf-8"?>
 <p:sld xmlns:a="http://schemas.openxmlformats.org/drawingml/2006/main" xmlns:r="http://schemas.openxmlformats.org/officeDocument/2006/relationships" xmlns:p="http://schemas.openxmlformats.org/presentationml/2006/main">
   <p:cSld>
     <p:spTree>
@@ -6731,7 +9142,7 @@
 </p:sld>
 </file>
 
-<file path=ppt/slides/slide21.xml><?xml version="1.0" encoding="utf-8"?>
+<file path=ppt/slides/slide31.xml><?xml version="1.0" encoding="utf-8"?>
 <p:sld xmlns:a="http://schemas.openxmlformats.org/drawingml/2006/main" xmlns:r="http://schemas.openxmlformats.org/officeDocument/2006/relationships" xmlns:p="http://schemas.openxmlformats.org/presentationml/2006/main">
   <p:cSld>
     <p:spTree>
@@ -6803,94 +9214,6 @@
   <p:transition spd="slow">
     <p:push/>
   </p:transition>
-  <p:timing>
-    <p:tnLst>
-      <p:par>
-        <p:cTn id="1" dur="indefinite" restart="never" nodeType="tmRoot"/>
-      </p:par>
-    </p:tnLst>
-  </p:timing>
-</p:sld>
-</file>
-
-<file path=ppt/slides/slide3.xml><?xml version="1.0" encoding="utf-8"?>
-<p:sld xmlns:a="http://schemas.openxmlformats.org/drawingml/2006/main" xmlns:r="http://schemas.openxmlformats.org/officeDocument/2006/relationships" xmlns:p="http://schemas.openxmlformats.org/presentationml/2006/main">
-  <p:cSld>
-    <p:spTree>
-      <p:nvGrpSpPr>
-        <p:cNvPr id="1" name=""/>
-        <p:cNvGrpSpPr/>
-        <p:nvPr/>
-      </p:nvGrpSpPr>
-      <p:grpSpPr>
-        <a:xfrm>
-          <a:off x="0" y="0"/>
-          <a:ext cx="0" cy="0"/>
-          <a:chOff x="0" y="0"/>
-          <a:chExt cx="0" cy="0"/>
-        </a:xfrm>
-      </p:grpSpPr>
-      <p:pic>
-        <p:nvPicPr>
-          <p:cNvPr id="8" name="Picture 7"/>
-          <p:cNvPicPr>
-            <a:picLocks noChangeAspect="1"/>
-          </p:cNvPicPr>
-          <p:nvPr/>
-        </p:nvPicPr>
-        <p:blipFill>
-          <a:blip r:embed="rId2"/>
-          <a:stretch>
-            <a:fillRect/>
-          </a:stretch>
-        </p:blipFill>
-        <p:spPr>
-          <a:xfrm>
-            <a:off x="1619250" y="1708004"/>
-            <a:ext cx="8839200" cy="4902200"/>
-          </a:xfrm>
-          <a:prstGeom prst="rect">
-            <a:avLst/>
-          </a:prstGeom>
-        </p:spPr>
-      </p:pic>
-      <p:sp>
-        <p:nvSpPr>
-          <p:cNvPr id="2" name="Title 1"/>
-          <p:cNvSpPr>
-            <a:spLocks noGrp="1"/>
-          </p:cNvSpPr>
-          <p:nvPr>
-            <p:ph type="title"/>
-          </p:nvPr>
-        </p:nvSpPr>
-        <p:spPr/>
-        <p:txBody>
-          <a:bodyPr/>
-          <a:lstStyle/>
-          <a:p>
-            <a:r>
-              <a:rPr lang="en-US" dirty="0"/>
-              <a:t>p</a:t>
-            </a:r>
-            <a:r>
-              <a:rPr lang="en-US" dirty="0" smtClean="0"/>
-              <a:t>rerequisites</a:t>
-            </a:r>
-            <a:endParaRPr lang="en-US" dirty="0"/>
-          </a:p>
-        </p:txBody>
-      </p:sp>
-    </p:spTree>
-    <p:extLst>
-      <p:ext uri="{BB962C8B-B14F-4D97-AF65-F5344CB8AC3E}">
-        <p14:creationId xmlns:p14="http://schemas.microsoft.com/office/powerpoint/2010/main" val="1374431568"/>
-      </p:ext>
-    </p:extLst>
-  </p:cSld>
-  <p:clrMapOvr>
-    <a:masterClrMapping/>
-  </p:clrMapOvr>
   <p:timing>
     <p:tnLst>
       <p:par>
@@ -8381,7 +10704,7 @@
           <a:p>
             <a:r>
               <a:rPr lang="en-US" dirty="0" smtClean="0"/>
-              <a:t>snippets</a:t>
+              <a:t>demo - snippets</a:t>
             </a:r>
             <a:endParaRPr lang="en-US" dirty="0"/>
           </a:p>
@@ -8402,7 +10725,10 @@
           <a:bodyPr/>
           <a:lstStyle/>
           <a:p>
-            <a:endParaRPr lang="en-US" dirty="0" smtClean="0"/>
+            <a:r>
+              <a:rPr lang="en-US" dirty="0" smtClean="0"/>
+              <a:t>authoring custom snippets that are distributed with your extension</a:t>
+            </a:r>
           </a:p>
         </p:txBody>
       </p:sp>

</xml_diff>